<commit_message>
Ajuste de mapa a formato MA_10_03_CO
</commit_message>
<xml_diff>
--- a/fuentes/contenidos/grado10/guion03/MA_10_03_CO_MapaConceptual.pptx
+++ b/fuentes/contenidos/grado10/guion03/MA_10_03_CO_MapaConceptual.pptx
@@ -2,12 +2,12 @@
 <file path=ppt/presentation.xml><?xml version="1.0" encoding="utf-8"?>
 <p:presentation xmlns:a="http://schemas.openxmlformats.org/drawingml/2006/main" xmlns:r="http://schemas.openxmlformats.org/officeDocument/2006/relationships" xmlns:p="http://schemas.openxmlformats.org/presentationml/2006/main" saveSubsetFonts="1">
   <p:sldMasterIdLst>
-    <p:sldMasterId id="2147483672" r:id="rId1"/>
+    <p:sldMasterId id="2147483684" r:id="rId1"/>
   </p:sldMasterIdLst>
   <p:sldIdLst>
     <p:sldId id="256" r:id="rId2"/>
   </p:sldIdLst>
-  <p:sldSz cx="12192000" cy="6858000"/>
+  <p:sldSz cx="9144000" cy="6858000" type="screen4x3"/>
   <p:notesSz cx="6794500" cy="9918700"/>
   <p:defaultTextStyle>
     <a:defPPr>
@@ -141,8 +141,8 @@
         </p:nvSpPr>
         <p:spPr>
           <a:xfrm>
-            <a:off x="1524000" y="1122363"/>
-            <a:ext cx="9144000" cy="2387600"/>
+            <a:off x="685800" y="1122363"/>
+            <a:ext cx="7772400" cy="2387600"/>
           </a:xfrm>
         </p:spPr>
         <p:txBody>
@@ -173,8 +173,8 @@
         </p:nvSpPr>
         <p:spPr>
           <a:xfrm>
-            <a:off x="1524000" y="3602038"/>
-            <a:ext cx="9144000" cy="1655762"/>
+            <a:off x="1143000" y="3602038"/>
+            <a:ext cx="6858000" cy="1655762"/>
           </a:xfrm>
         </p:spPr>
         <p:txBody>
@@ -242,8 +242,8 @@
           <a:lstStyle/>
           <a:p>
             <a:fld id="{C764DE79-268F-4C1A-8933-263129D2AF90}" type="datetimeFigureOut">
-              <a:rPr lang="en-US" dirty="0"/>
-              <a:t>6/14/2016</a:t>
+              <a:rPr lang="en-US" smtClean="0"/>
+              <a:t>6/15/2016</a:t>
             </a:fld>
             <a:endParaRPr lang="en-US" dirty="0"/>
           </a:p>
@@ -284,7 +284,7 @@
           <a:lstStyle/>
           <a:p>
             <a:fld id="{48F63A3B-78C7-47BE-AE5E-E10140E04643}" type="slidenum">
-              <a:rPr lang="en-US" dirty="0"/>
+              <a:rPr lang="en-US" smtClean="0"/>
               <a:t>‹Nº›</a:t>
             </a:fld>
             <a:endParaRPr lang="en-US" dirty="0"/>
@@ -294,7 +294,7 @@
     </p:spTree>
     <p:extLst>
       <p:ext uri="{BB962C8B-B14F-4D97-AF65-F5344CB8AC3E}">
-        <p14:creationId xmlns:p14="http://schemas.microsoft.com/office/powerpoint/2010/main" val="1939965658"/>
+        <p14:creationId xmlns:p14="http://schemas.microsoft.com/office/powerpoint/2010/main" val="3936341165"/>
       </p:ext>
     </p:extLst>
   </p:cSld>
@@ -412,8 +412,8 @@
           <a:lstStyle/>
           <a:p>
             <a:fld id="{C764DE79-268F-4C1A-8933-263129D2AF90}" type="datetimeFigureOut">
-              <a:rPr lang="en-US" dirty="0"/>
-              <a:t>6/14/2016</a:t>
+              <a:rPr lang="en-US" smtClean="0"/>
+              <a:t>6/15/2016</a:t>
             </a:fld>
             <a:endParaRPr lang="en-US" dirty="0"/>
           </a:p>
@@ -454,7 +454,7 @@
           <a:lstStyle/>
           <a:p>
             <a:fld id="{48F63A3B-78C7-47BE-AE5E-E10140E04643}" type="slidenum">
-              <a:rPr lang="en-US" dirty="0"/>
+              <a:rPr lang="en-US" smtClean="0"/>
               <a:t>‹Nº›</a:t>
             </a:fld>
             <a:endParaRPr lang="en-US" dirty="0"/>
@@ -464,7 +464,7 @@
     </p:spTree>
     <p:extLst>
       <p:ext uri="{BB962C8B-B14F-4D97-AF65-F5344CB8AC3E}">
-        <p14:creationId xmlns:p14="http://schemas.microsoft.com/office/powerpoint/2010/main" val="3412489404"/>
+        <p14:creationId xmlns:p14="http://schemas.microsoft.com/office/powerpoint/2010/main" val="4100875473"/>
       </p:ext>
     </p:extLst>
   </p:cSld>
@@ -503,8 +503,8 @@
         </p:nvSpPr>
         <p:spPr>
           <a:xfrm>
-            <a:off x="8724900" y="365125"/>
-            <a:ext cx="2628900" cy="5811838"/>
+            <a:off x="6543675" y="365125"/>
+            <a:ext cx="1971675" cy="5811838"/>
           </a:xfrm>
         </p:spPr>
         <p:txBody>
@@ -531,8 +531,8 @@
         </p:nvSpPr>
         <p:spPr>
           <a:xfrm>
-            <a:off x="838200" y="365125"/>
-            <a:ext cx="7734300" cy="5811838"/>
+            <a:off x="628650" y="365125"/>
+            <a:ext cx="5800725" cy="5811838"/>
           </a:xfrm>
         </p:spPr>
         <p:txBody>
@@ -592,8 +592,8 @@
           <a:lstStyle/>
           <a:p>
             <a:fld id="{C764DE79-268F-4C1A-8933-263129D2AF90}" type="datetimeFigureOut">
-              <a:rPr lang="en-US" dirty="0"/>
-              <a:t>6/14/2016</a:t>
+              <a:rPr lang="en-US" smtClean="0"/>
+              <a:t>6/15/2016</a:t>
             </a:fld>
             <a:endParaRPr lang="en-US" dirty="0"/>
           </a:p>
@@ -634,7 +634,7 @@
           <a:lstStyle/>
           <a:p>
             <a:fld id="{48F63A3B-78C7-47BE-AE5E-E10140E04643}" type="slidenum">
-              <a:rPr lang="en-US" dirty="0"/>
+              <a:rPr lang="en-US" smtClean="0"/>
               <a:t>‹Nº›</a:t>
             </a:fld>
             <a:endParaRPr lang="en-US" dirty="0"/>
@@ -644,7 +644,7 @@
     </p:spTree>
     <p:extLst>
       <p:ext uri="{BB962C8B-B14F-4D97-AF65-F5344CB8AC3E}">
-        <p14:creationId xmlns:p14="http://schemas.microsoft.com/office/powerpoint/2010/main" val="894242140"/>
+        <p14:creationId xmlns:p14="http://schemas.microsoft.com/office/powerpoint/2010/main" val="1048685943"/>
       </p:ext>
     </p:extLst>
   </p:cSld>
@@ -1058,8 +1058,8 @@
           <a:lstStyle/>
           <a:p>
             <a:fld id="{C764DE79-268F-4C1A-8933-263129D2AF90}" type="datetimeFigureOut">
-              <a:rPr lang="en-US" dirty="0"/>
-              <a:t>6/14/2016</a:t>
+              <a:rPr lang="en-US" smtClean="0"/>
+              <a:t>6/15/2016</a:t>
             </a:fld>
             <a:endParaRPr lang="en-US" dirty="0"/>
           </a:p>
@@ -1100,7 +1100,7 @@
           <a:lstStyle/>
           <a:p>
             <a:fld id="{48F63A3B-78C7-47BE-AE5E-E10140E04643}" type="slidenum">
-              <a:rPr lang="en-US" dirty="0"/>
+              <a:rPr lang="en-US" smtClean="0"/>
               <a:t>‹Nº›</a:t>
             </a:fld>
             <a:endParaRPr lang="en-US" dirty="0"/>
@@ -1110,7 +1110,7 @@
     </p:spTree>
     <p:extLst>
       <p:ext uri="{BB962C8B-B14F-4D97-AF65-F5344CB8AC3E}">
-        <p14:creationId xmlns:p14="http://schemas.microsoft.com/office/powerpoint/2010/main" val="2790674112"/>
+        <p14:creationId xmlns:p14="http://schemas.microsoft.com/office/powerpoint/2010/main" val="153210190"/>
       </p:ext>
     </p:extLst>
   </p:cSld>
@@ -1223,8 +1223,8 @@
         </p:nvSpPr>
         <p:spPr>
           <a:xfrm>
-            <a:off x="831850" y="1709738"/>
-            <a:ext cx="10515600" cy="2852737"/>
+            <a:off x="623888" y="1709739"/>
+            <a:ext cx="7886700" cy="2852737"/>
           </a:xfrm>
         </p:spPr>
         <p:txBody>
@@ -1255,8 +1255,8 @@
         </p:nvSpPr>
         <p:spPr>
           <a:xfrm>
-            <a:off x="831850" y="4589463"/>
-            <a:ext cx="10515600" cy="1500187"/>
+            <a:off x="623888" y="4589464"/>
+            <a:ext cx="7886700" cy="1500187"/>
           </a:xfrm>
         </p:spPr>
         <p:txBody>
@@ -1266,9 +1266,7 @@
               <a:buNone/>
               <a:defRPr sz="2400">
                 <a:solidFill>
-                  <a:schemeClr val="tx1">
-                    <a:tint val="75000"/>
-                  </a:schemeClr>
+                  <a:schemeClr val="tx1"/>
                 </a:solidFill>
               </a:defRPr>
             </a:lvl1pPr>
@@ -1378,8 +1376,8 @@
           <a:lstStyle/>
           <a:p>
             <a:fld id="{C764DE79-268F-4C1A-8933-263129D2AF90}" type="datetimeFigureOut">
-              <a:rPr lang="en-US" dirty="0"/>
-              <a:t>6/14/2016</a:t>
+              <a:rPr lang="en-US" smtClean="0"/>
+              <a:t>6/15/2016</a:t>
             </a:fld>
             <a:endParaRPr lang="en-US" dirty="0"/>
           </a:p>
@@ -1420,7 +1418,7 @@
           <a:lstStyle/>
           <a:p>
             <a:fld id="{48F63A3B-78C7-47BE-AE5E-E10140E04643}" type="slidenum">
-              <a:rPr lang="en-US" dirty="0"/>
+              <a:rPr lang="en-US" smtClean="0"/>
               <a:t>‹Nº›</a:t>
             </a:fld>
             <a:endParaRPr lang="en-US" dirty="0"/>
@@ -1430,7 +1428,7 @@
     </p:spTree>
     <p:extLst>
       <p:ext uri="{BB962C8B-B14F-4D97-AF65-F5344CB8AC3E}">
-        <p14:creationId xmlns:p14="http://schemas.microsoft.com/office/powerpoint/2010/main" val="2321364115"/>
+        <p14:creationId xmlns:p14="http://schemas.microsoft.com/office/powerpoint/2010/main" val="421312124"/>
       </p:ext>
     </p:extLst>
   </p:cSld>
@@ -1492,8 +1490,8 @@
         </p:nvSpPr>
         <p:spPr>
           <a:xfrm>
-            <a:off x="838200" y="1825625"/>
-            <a:ext cx="5181600" cy="4351338"/>
+            <a:off x="628650" y="1825625"/>
+            <a:ext cx="3886200" cy="4351338"/>
           </a:xfrm>
         </p:spPr>
         <p:txBody>
@@ -1549,8 +1547,8 @@
         </p:nvSpPr>
         <p:spPr>
           <a:xfrm>
-            <a:off x="6172200" y="1825625"/>
-            <a:ext cx="5181600" cy="4351338"/>
+            <a:off x="4629150" y="1825625"/>
+            <a:ext cx="3886200" cy="4351338"/>
           </a:xfrm>
         </p:spPr>
         <p:txBody>
@@ -1610,8 +1608,8 @@
           <a:lstStyle/>
           <a:p>
             <a:fld id="{C764DE79-268F-4C1A-8933-263129D2AF90}" type="datetimeFigureOut">
-              <a:rPr lang="en-US" dirty="0"/>
-              <a:t>6/14/2016</a:t>
+              <a:rPr lang="en-US" smtClean="0"/>
+              <a:t>6/15/2016</a:t>
             </a:fld>
             <a:endParaRPr lang="en-US" dirty="0"/>
           </a:p>
@@ -1652,7 +1650,7 @@
           <a:lstStyle/>
           <a:p>
             <a:fld id="{48F63A3B-78C7-47BE-AE5E-E10140E04643}" type="slidenum">
-              <a:rPr lang="en-US" dirty="0"/>
+              <a:rPr lang="en-US" smtClean="0"/>
               <a:t>‹Nº›</a:t>
             </a:fld>
             <a:endParaRPr lang="en-US" dirty="0"/>
@@ -1662,7 +1660,7 @@
     </p:spTree>
     <p:extLst>
       <p:ext uri="{BB962C8B-B14F-4D97-AF65-F5344CB8AC3E}">
-        <p14:creationId xmlns:p14="http://schemas.microsoft.com/office/powerpoint/2010/main" val="3629281590"/>
+        <p14:creationId xmlns:p14="http://schemas.microsoft.com/office/powerpoint/2010/main" val="2417106590"/>
       </p:ext>
     </p:extLst>
   </p:cSld>
@@ -1701,8 +1699,8 @@
         </p:nvSpPr>
         <p:spPr>
           <a:xfrm>
-            <a:off x="839788" y="365125"/>
-            <a:ext cx="10515600" cy="1325563"/>
+            <a:off x="629841" y="365126"/>
+            <a:ext cx="7886700" cy="1325563"/>
           </a:xfrm>
         </p:spPr>
         <p:txBody>
@@ -1729,8 +1727,8 @@
         </p:nvSpPr>
         <p:spPr>
           <a:xfrm>
-            <a:off x="839788" y="1681163"/>
-            <a:ext cx="5157787" cy="823912"/>
+            <a:off x="629842" y="1681163"/>
+            <a:ext cx="3868340" cy="823912"/>
           </a:xfrm>
         </p:spPr>
         <p:txBody>
@@ -1794,8 +1792,8 @@
         </p:nvSpPr>
         <p:spPr>
           <a:xfrm>
-            <a:off x="839788" y="2505075"/>
-            <a:ext cx="5157787" cy="3684588"/>
+            <a:off x="629842" y="2505075"/>
+            <a:ext cx="3868340" cy="3684588"/>
           </a:xfrm>
         </p:spPr>
         <p:txBody>
@@ -1851,8 +1849,8 @@
         </p:nvSpPr>
         <p:spPr>
           <a:xfrm>
-            <a:off x="6172200" y="1681163"/>
-            <a:ext cx="5183188" cy="823912"/>
+            <a:off x="4629150" y="1681163"/>
+            <a:ext cx="3887391" cy="823912"/>
           </a:xfrm>
         </p:spPr>
         <p:txBody>
@@ -1916,8 +1914,8 @@
         </p:nvSpPr>
         <p:spPr>
           <a:xfrm>
-            <a:off x="6172200" y="2505075"/>
-            <a:ext cx="5183188" cy="3684588"/>
+            <a:off x="4629150" y="2505075"/>
+            <a:ext cx="3887391" cy="3684588"/>
           </a:xfrm>
         </p:spPr>
         <p:txBody>
@@ -1977,8 +1975,8 @@
           <a:lstStyle/>
           <a:p>
             <a:fld id="{C764DE79-268F-4C1A-8933-263129D2AF90}" type="datetimeFigureOut">
-              <a:rPr lang="en-US" dirty="0"/>
-              <a:t>6/14/2016</a:t>
+              <a:rPr lang="en-US" smtClean="0"/>
+              <a:t>6/15/2016</a:t>
             </a:fld>
             <a:endParaRPr lang="en-US" dirty="0"/>
           </a:p>
@@ -2019,7 +2017,7 @@
           <a:lstStyle/>
           <a:p>
             <a:fld id="{48F63A3B-78C7-47BE-AE5E-E10140E04643}" type="slidenum">
-              <a:rPr lang="en-US" dirty="0"/>
+              <a:rPr lang="en-US" smtClean="0"/>
               <a:t>‹Nº›</a:t>
             </a:fld>
             <a:endParaRPr lang="en-US" dirty="0"/>
@@ -2029,7 +2027,7 @@
     </p:spTree>
     <p:extLst>
       <p:ext uri="{BB962C8B-B14F-4D97-AF65-F5344CB8AC3E}">
-        <p14:creationId xmlns:p14="http://schemas.microsoft.com/office/powerpoint/2010/main" val="2571771202"/>
+        <p14:creationId xmlns:p14="http://schemas.microsoft.com/office/powerpoint/2010/main" val="2988755841"/>
       </p:ext>
     </p:extLst>
   </p:cSld>
@@ -2095,8 +2093,8 @@
           <a:lstStyle/>
           <a:p>
             <a:fld id="{C764DE79-268F-4C1A-8933-263129D2AF90}" type="datetimeFigureOut">
-              <a:rPr lang="en-US" dirty="0"/>
-              <a:t>6/14/2016</a:t>
+              <a:rPr lang="en-US" smtClean="0"/>
+              <a:t>6/15/2016</a:t>
             </a:fld>
             <a:endParaRPr lang="en-US" dirty="0"/>
           </a:p>
@@ -2137,7 +2135,7 @@
           <a:lstStyle/>
           <a:p>
             <a:fld id="{48F63A3B-78C7-47BE-AE5E-E10140E04643}" type="slidenum">
-              <a:rPr lang="en-US" dirty="0"/>
+              <a:rPr lang="en-US" smtClean="0"/>
               <a:t>‹Nº›</a:t>
             </a:fld>
             <a:endParaRPr lang="en-US" dirty="0"/>
@@ -2147,7 +2145,7 @@
     </p:spTree>
     <p:extLst>
       <p:ext uri="{BB962C8B-B14F-4D97-AF65-F5344CB8AC3E}">
-        <p14:creationId xmlns:p14="http://schemas.microsoft.com/office/powerpoint/2010/main" val="2699023798"/>
+        <p14:creationId xmlns:p14="http://schemas.microsoft.com/office/powerpoint/2010/main" val="1444846307"/>
       </p:ext>
     </p:extLst>
   </p:cSld>
@@ -2191,7 +2189,7 @@
           <a:p>
             <a:fld id="{5001C876-01F7-4317-94B9-1AE222133113}" type="datetimeFigureOut">
               <a:rPr lang="es-ES" smtClean="0"/>
-              <a:t>14/06/2016</a:t>
+              <a:t>15/06/2016</a:t>
             </a:fld>
             <a:endParaRPr lang="es-ES"/>
           </a:p>
@@ -2242,7 +2240,7 @@
     </p:spTree>
     <p:extLst>
       <p:ext uri="{BB962C8B-B14F-4D97-AF65-F5344CB8AC3E}">
-        <p14:creationId xmlns:p14="http://schemas.microsoft.com/office/powerpoint/2010/main" val="2158236134"/>
+        <p14:creationId xmlns:p14="http://schemas.microsoft.com/office/powerpoint/2010/main" val="143802000"/>
       </p:ext>
     </p:extLst>
   </p:cSld>
@@ -2281,8 +2279,8 @@
         </p:nvSpPr>
         <p:spPr>
           <a:xfrm>
-            <a:off x="839788" y="457200"/>
-            <a:ext cx="3932237" cy="1600200"/>
+            <a:off x="629841" y="457200"/>
+            <a:ext cx="2949178" cy="1600200"/>
           </a:xfrm>
         </p:spPr>
         <p:txBody>
@@ -2313,8 +2311,8 @@
         </p:nvSpPr>
         <p:spPr>
           <a:xfrm>
-            <a:off x="5183188" y="987425"/>
-            <a:ext cx="6172200" cy="4873625"/>
+            <a:off x="3887391" y="987426"/>
+            <a:ext cx="4629150" cy="4873625"/>
           </a:xfrm>
         </p:spPr>
         <p:txBody>
@@ -2398,8 +2396,8 @@
         </p:nvSpPr>
         <p:spPr>
           <a:xfrm>
-            <a:off x="839788" y="2057400"/>
-            <a:ext cx="3932237" cy="3811588"/>
+            <a:off x="629841" y="2057400"/>
+            <a:ext cx="2949178" cy="3811588"/>
           </a:xfrm>
         </p:spPr>
         <p:txBody>
@@ -2467,8 +2465,8 @@
           <a:lstStyle/>
           <a:p>
             <a:fld id="{C764DE79-268F-4C1A-8933-263129D2AF90}" type="datetimeFigureOut">
-              <a:rPr lang="en-US" dirty="0"/>
-              <a:t>6/14/2016</a:t>
+              <a:rPr lang="en-US" smtClean="0"/>
+              <a:t>6/15/2016</a:t>
             </a:fld>
             <a:endParaRPr lang="en-US" dirty="0"/>
           </a:p>
@@ -2509,7 +2507,7 @@
           <a:lstStyle/>
           <a:p>
             <a:fld id="{48F63A3B-78C7-47BE-AE5E-E10140E04643}" type="slidenum">
-              <a:rPr lang="en-US" dirty="0"/>
+              <a:rPr lang="en-US" smtClean="0"/>
               <a:t>‹Nº›</a:t>
             </a:fld>
             <a:endParaRPr lang="en-US" dirty="0"/>
@@ -2519,7 +2517,7 @@
     </p:spTree>
     <p:extLst>
       <p:ext uri="{BB962C8B-B14F-4D97-AF65-F5344CB8AC3E}">
-        <p14:creationId xmlns:p14="http://schemas.microsoft.com/office/powerpoint/2010/main" val="1891650421"/>
+        <p14:creationId xmlns:p14="http://schemas.microsoft.com/office/powerpoint/2010/main" val="3670784371"/>
       </p:ext>
     </p:extLst>
   </p:cSld>
@@ -2558,8 +2556,8 @@
         </p:nvSpPr>
         <p:spPr>
           <a:xfrm>
-            <a:off x="839788" y="457200"/>
-            <a:ext cx="3932237" cy="1600200"/>
+            <a:off x="629841" y="457200"/>
+            <a:ext cx="2949178" cy="1600200"/>
           </a:xfrm>
         </p:spPr>
         <p:txBody>
@@ -2590,8 +2588,8 @@
         </p:nvSpPr>
         <p:spPr>
           <a:xfrm>
-            <a:off x="5183188" y="987425"/>
-            <a:ext cx="6172200" cy="4873625"/>
+            <a:off x="3887391" y="987426"/>
+            <a:ext cx="4629150" cy="4873625"/>
           </a:xfrm>
         </p:spPr>
         <p:txBody>
@@ -2655,8 +2653,8 @@
         </p:nvSpPr>
         <p:spPr>
           <a:xfrm>
-            <a:off x="839788" y="2057400"/>
-            <a:ext cx="3932237" cy="3811588"/>
+            <a:off x="629841" y="2057400"/>
+            <a:ext cx="2949178" cy="3811588"/>
           </a:xfrm>
         </p:spPr>
         <p:txBody>
@@ -2724,8 +2722,8 @@
           <a:lstStyle/>
           <a:p>
             <a:fld id="{C764DE79-268F-4C1A-8933-263129D2AF90}" type="datetimeFigureOut">
-              <a:rPr lang="en-US" dirty="0"/>
-              <a:t>6/14/2016</a:t>
+              <a:rPr lang="en-US" smtClean="0"/>
+              <a:t>6/15/2016</a:t>
             </a:fld>
             <a:endParaRPr lang="en-US" dirty="0"/>
           </a:p>
@@ -2766,7 +2764,7 @@
           <a:lstStyle/>
           <a:p>
             <a:fld id="{48F63A3B-78C7-47BE-AE5E-E10140E04643}" type="slidenum">
-              <a:rPr lang="en-US" dirty="0"/>
+              <a:rPr lang="en-US" smtClean="0"/>
               <a:t>‹Nº›</a:t>
             </a:fld>
             <a:endParaRPr lang="en-US" dirty="0"/>
@@ -2776,7 +2774,7 @@
     </p:spTree>
     <p:extLst>
       <p:ext uri="{BB962C8B-B14F-4D97-AF65-F5344CB8AC3E}">
-        <p14:creationId xmlns:p14="http://schemas.microsoft.com/office/powerpoint/2010/main" val="2661804063"/>
+        <p14:creationId xmlns:p14="http://schemas.microsoft.com/office/powerpoint/2010/main" val="1189282864"/>
       </p:ext>
     </p:extLst>
   </p:cSld>
@@ -2820,8 +2818,8 @@
         </p:nvSpPr>
         <p:spPr>
           <a:xfrm>
-            <a:off x="838200" y="365125"/>
-            <a:ext cx="10515600" cy="1325563"/>
+            <a:off x="628650" y="365126"/>
+            <a:ext cx="7886700" cy="1325563"/>
           </a:xfrm>
           <a:prstGeom prst="rect">
             <a:avLst/>
@@ -2853,8 +2851,8 @@
         </p:nvSpPr>
         <p:spPr>
           <a:xfrm>
-            <a:off x="838200" y="1825625"/>
-            <a:ext cx="10515600" cy="4351338"/>
+            <a:off x="628650" y="1825625"/>
+            <a:ext cx="7886700" cy="4351338"/>
           </a:xfrm>
           <a:prstGeom prst="rect">
             <a:avLst/>
@@ -2915,8 +2913,8 @@
         </p:nvSpPr>
         <p:spPr>
           <a:xfrm>
-            <a:off x="838200" y="6356350"/>
-            <a:ext cx="2743200" cy="365125"/>
+            <a:off x="628650" y="6356351"/>
+            <a:ext cx="2057400" cy="365125"/>
           </a:xfrm>
           <a:prstGeom prst="rect">
             <a:avLst/>
@@ -2937,8 +2935,8 @@
           </a:lstStyle>
           <a:p>
             <a:fld id="{C764DE79-268F-4C1A-8933-263129D2AF90}" type="datetimeFigureOut">
-              <a:rPr lang="en-US" dirty="0"/>
-              <a:t>6/14/2016</a:t>
+              <a:rPr lang="en-US" smtClean="0"/>
+              <a:t>6/15/2016</a:t>
             </a:fld>
             <a:endParaRPr lang="en-US" dirty="0"/>
           </a:p>
@@ -2956,8 +2954,8 @@
         </p:nvSpPr>
         <p:spPr>
           <a:xfrm>
-            <a:off x="4038600" y="6356350"/>
-            <a:ext cx="4114800" cy="365125"/>
+            <a:off x="3028950" y="6356351"/>
+            <a:ext cx="3086100" cy="365125"/>
           </a:xfrm>
           <a:prstGeom prst="rect">
             <a:avLst/>
@@ -2993,8 +2991,8 @@
         </p:nvSpPr>
         <p:spPr>
           <a:xfrm>
-            <a:off x="8610600" y="6356350"/>
-            <a:ext cx="2743200" cy="365125"/>
+            <a:off x="6457950" y="6356351"/>
+            <a:ext cx="2057400" cy="365125"/>
           </a:xfrm>
           <a:prstGeom prst="rect">
             <a:avLst/>
@@ -3015,7 +3013,7 @@
           </a:lstStyle>
           <a:p>
             <a:fld id="{48F63A3B-78C7-47BE-AE5E-E10140E04643}" type="slidenum">
-              <a:rPr lang="en-US" dirty="0"/>
+              <a:rPr lang="en-US" smtClean="0"/>
               <a:t>‹Nº›</a:t>
             </a:fld>
             <a:endParaRPr lang="en-US" dirty="0"/>
@@ -3030,8 +3028,8 @@
         </p:nvSpPr>
         <p:spPr>
           <a:xfrm rot="16200000">
-            <a:off x="-1184920" y="1710405"/>
-            <a:ext cx="3121367" cy="276999"/>
+            <a:off x="-914178" y="1733488"/>
+            <a:ext cx="2392000" cy="230832"/>
           </a:xfrm>
           <a:prstGeom prst="rect">
             <a:avLst/>
@@ -3046,13 +3044,13 @@
           <a:p>
             <a:pPr algn="ctr"/>
             <a:r>
-              <a:rPr lang="es-ES" sz="1200" dirty="0" smtClean="0">
+              <a:rPr lang="es-ES" sz="900" dirty="0" smtClean="0">
                 <a:latin typeface="Arial" panose="020B0604020202020204" pitchFamily="34" charset="0"/>
                 <a:cs typeface="Arial" panose="020B0604020202020204" pitchFamily="34" charset="0"/>
               </a:rPr>
               <a:t>© Editorial Planeta Colombiana S.A., 2016.</a:t>
             </a:r>
-            <a:endParaRPr lang="es-ES" sz="1200" dirty="0">
+            <a:endParaRPr lang="es-ES" sz="900" dirty="0">
               <a:latin typeface="Arial" panose="020B0604020202020204" pitchFamily="34" charset="0"/>
               <a:cs typeface="Arial" panose="020B0604020202020204" pitchFamily="34" charset="0"/>
             </a:endParaRPr>
@@ -3081,8 +3079,8 @@
         </p:blipFill>
         <p:spPr>
           <a:xfrm rot="16200000">
-            <a:off x="284793" y="166927"/>
-            <a:ext cx="181942" cy="242589"/>
+            <a:off x="190852" y="197251"/>
+            <a:ext cx="181942" cy="181942"/>
           </a:xfrm>
           <a:prstGeom prst="rect">
             <a:avLst/>
@@ -3092,23 +3090,23 @@
     </p:spTree>
     <p:extLst>
       <p:ext uri="{BB962C8B-B14F-4D97-AF65-F5344CB8AC3E}">
-        <p14:creationId xmlns:p14="http://schemas.microsoft.com/office/powerpoint/2010/main" val="46636540"/>
+        <p14:creationId xmlns:p14="http://schemas.microsoft.com/office/powerpoint/2010/main" val="2571882894"/>
       </p:ext>
     </p:extLst>
   </p:cSld>
   <p:clrMap bg1="lt1" tx1="dk1" bg2="lt2" tx2="dk2" accent1="accent1" accent2="accent2" accent3="accent3" accent4="accent4" accent5="accent5" accent6="accent6" hlink="hlink" folHlink="folHlink"/>
   <p:sldLayoutIdLst>
-    <p:sldLayoutId id="2147483673" r:id="rId1"/>
-    <p:sldLayoutId id="2147483674" r:id="rId2"/>
-    <p:sldLayoutId id="2147483675" r:id="rId3"/>
-    <p:sldLayoutId id="2147483676" r:id="rId4"/>
-    <p:sldLayoutId id="2147483677" r:id="rId5"/>
-    <p:sldLayoutId id="2147483678" r:id="rId6"/>
-    <p:sldLayoutId id="2147483679" r:id="rId7"/>
-    <p:sldLayoutId id="2147483680" r:id="rId8"/>
-    <p:sldLayoutId id="2147483681" r:id="rId9"/>
-    <p:sldLayoutId id="2147483682" r:id="rId10"/>
-    <p:sldLayoutId id="2147483683" r:id="rId11"/>
+    <p:sldLayoutId id="2147483685" r:id="rId1"/>
+    <p:sldLayoutId id="2147483686" r:id="rId2"/>
+    <p:sldLayoutId id="2147483687" r:id="rId3"/>
+    <p:sldLayoutId id="2147483688" r:id="rId4"/>
+    <p:sldLayoutId id="2147483689" r:id="rId5"/>
+    <p:sldLayoutId id="2147483690" r:id="rId6"/>
+    <p:sldLayoutId id="2147483691" r:id="rId7"/>
+    <p:sldLayoutId id="2147483692" r:id="rId8"/>
+    <p:sldLayoutId id="2147483693" r:id="rId9"/>
+    <p:sldLayoutId id="2147483694" r:id="rId10"/>
+    <p:sldLayoutId id="2147483695" r:id="rId11"/>
     <p:sldLayoutId id="2147483661" r:id="rId12"/>
     <p:sldLayoutId id="2147483662" r:id="rId13"/>
     <p:sldLayoutId id="2147483663" r:id="rId14"/>
@@ -3428,8 +3426,8 @@
         </p:nvSpPr>
         <p:spPr>
           <a:xfrm>
-            <a:off x="3453160" y="897952"/>
-            <a:ext cx="5679731" cy="352691"/>
+            <a:off x="2574253" y="1108551"/>
+            <a:ext cx="4259798" cy="264518"/>
           </a:xfrm>
           <a:prstGeom prst="rect">
             <a:avLst/>
@@ -3463,13 +3461,13 @@
           <a:p>
             <a:pPr algn="ctr"/>
             <a:r>
-              <a:rPr lang="es-ES" sz="1600" dirty="0" smtClean="0">
+              <a:rPr lang="es-ES" sz="1200" dirty="0">
                 <a:latin typeface="Arial" panose="020B0604020202020204" pitchFamily="34" charset="0"/>
                 <a:cs typeface="Arial" panose="020B0604020202020204" pitchFamily="34" charset="0"/>
               </a:rPr>
               <a:t>Las funciones trigonométricas</a:t>
             </a:r>
-            <a:endParaRPr lang="es-ES" sz="1600" dirty="0">
+            <a:endParaRPr lang="es-ES" sz="1200" dirty="0">
               <a:latin typeface="Arial" panose="020B0604020202020204" pitchFamily="34" charset="0"/>
               <a:cs typeface="Arial" panose="020B0604020202020204" pitchFamily="34" charset="0"/>
             </a:endParaRPr>
@@ -3484,8 +3482,8 @@
         </p:nvSpPr>
         <p:spPr>
           <a:xfrm>
-            <a:off x="1016065" y="2104086"/>
-            <a:ext cx="864000" cy="360000"/>
+            <a:off x="716020" y="2054801"/>
+            <a:ext cx="648000" cy="270000"/>
           </a:xfrm>
           <a:prstGeom prst="rect">
             <a:avLst/>
@@ -3521,7 +3519,7 @@
           <a:p>
             <a:pPr algn="ctr"/>
             <a:r>
-              <a:rPr lang="es-ES" sz="1050" dirty="0">
+              <a:rPr lang="es-ES" sz="788" dirty="0">
                 <a:solidFill>
                   <a:schemeClr val="bg1"/>
                 </a:solidFill>
@@ -3531,7 +3529,7 @@
               <a:t>s</a:t>
             </a:r>
             <a:r>
-              <a:rPr lang="es-ES" sz="1050" dirty="0" smtClean="0">
+              <a:rPr lang="es-ES" sz="788" dirty="0">
                 <a:solidFill>
                   <a:schemeClr val="bg1"/>
                 </a:solidFill>
@@ -3540,18 +3538,11 @@
               </a:rPr>
               <a:t>eno</a:t>
             </a:r>
-            <a:endParaRPr lang="es-ES" sz="1050" dirty="0" smtClean="0">
-              <a:solidFill>
-                <a:schemeClr val="bg1"/>
-              </a:solidFill>
-              <a:latin typeface="Arial" panose="020B0604020202020204" pitchFamily="34" charset="0"/>
-              <a:cs typeface="Arial" panose="020B0604020202020204" pitchFamily="34" charset="0"/>
-            </a:endParaRPr>
           </a:p>
           <a:p>
             <a:pPr algn="ctr"/>
             <a:r>
-              <a:rPr lang="es-ES" sz="1050" i="1" dirty="0" smtClean="0">
+              <a:rPr lang="es-ES" sz="788" i="1" dirty="0">
                 <a:solidFill>
                   <a:schemeClr val="bg1"/>
                 </a:solidFill>
@@ -3561,7 +3552,7 @@
               <a:t>y</a:t>
             </a:r>
             <a:r>
-              <a:rPr lang="es-ES" sz="1050" dirty="0" smtClean="0">
+              <a:rPr lang="es-ES" sz="788" dirty="0">
                 <a:solidFill>
                   <a:schemeClr val="bg1"/>
                 </a:solidFill>
@@ -3571,7 +3562,7 @@
               <a:t> = </a:t>
             </a:r>
             <a:r>
-              <a:rPr lang="es-ES" sz="1050" dirty="0" err="1" smtClean="0">
+              <a:rPr lang="es-ES" sz="788" dirty="0" err="1">
                 <a:solidFill>
                   <a:schemeClr val="bg1"/>
                 </a:solidFill>
@@ -3581,7 +3572,7 @@
               <a:t>sen</a:t>
             </a:r>
             <a:r>
-              <a:rPr lang="es-ES" sz="1050" dirty="0" smtClean="0">
+              <a:rPr lang="es-ES" sz="788" dirty="0">
                 <a:solidFill>
                   <a:schemeClr val="bg1"/>
                 </a:solidFill>
@@ -3591,7 +3582,7 @@
               <a:t> </a:t>
             </a:r>
             <a:r>
-              <a:rPr lang="es-ES" sz="1050" i="1" dirty="0" smtClean="0">
+              <a:rPr lang="es-ES" sz="788" i="1" dirty="0">
                 <a:solidFill>
                   <a:schemeClr val="bg1"/>
                 </a:solidFill>
@@ -3600,7 +3591,7 @@
               </a:rPr>
               <a:t>x</a:t>
             </a:r>
-            <a:endParaRPr lang="es-ES" sz="1050" i="1" dirty="0">
+            <a:endParaRPr lang="es-ES" sz="788" i="1" dirty="0">
               <a:solidFill>
                 <a:schemeClr val="bg1"/>
               </a:solidFill>
@@ -3621,8 +3612,8 @@
         </p:nvCxnSpPr>
         <p:spPr>
           <a:xfrm rot="5400000">
-            <a:off x="2137573" y="1122963"/>
-            <a:ext cx="291616" cy="1670631"/>
+            <a:off x="1552068" y="1301496"/>
+            <a:ext cx="241258" cy="1265353"/>
           </a:xfrm>
           <a:prstGeom prst="bentConnector3">
             <a:avLst>
@@ -3658,8 +3649,8 @@
         </p:nvSpPr>
         <p:spPr>
           <a:xfrm>
-            <a:off x="885607" y="2606593"/>
-            <a:ext cx="1122431" cy="230832"/>
+            <a:off x="614715" y="2406172"/>
+            <a:ext cx="841823" cy="196208"/>
           </a:xfrm>
           <a:prstGeom prst="rect">
             <a:avLst/>
@@ -3674,13 +3665,13 @@
           <a:p>
             <a:pPr algn="ctr"/>
             <a:r>
-              <a:rPr lang="es-ES" sz="900" dirty="0" smtClean="0">
+              <a:rPr lang="es-ES" sz="675" dirty="0">
                 <a:latin typeface="Arial" panose="020B0604020202020204" pitchFamily="34" charset="0"/>
                 <a:cs typeface="Arial" panose="020B0604020202020204" pitchFamily="34" charset="0"/>
               </a:rPr>
               <a:t>tiene</a:t>
             </a:r>
-            <a:endParaRPr lang="es-ES" sz="900" dirty="0">
+            <a:endParaRPr lang="es-ES" sz="675" dirty="0">
               <a:latin typeface="Arial" panose="020B0604020202020204" pitchFamily="34" charset="0"/>
               <a:cs typeface="Arial" panose="020B0604020202020204" pitchFamily="34" charset="0"/>
             </a:endParaRPr>
@@ -3698,8 +3689,8 @@
         </p:nvCxnSpPr>
         <p:spPr>
           <a:xfrm rot="5400000">
-            <a:off x="1376191" y="2534718"/>
-            <a:ext cx="142507" cy="1242"/>
+            <a:off x="997139" y="2363290"/>
+            <a:ext cx="81371" cy="4393"/>
           </a:xfrm>
           <a:prstGeom prst="bentConnector3">
             <a:avLst>
@@ -3735,8 +3726,8 @@
         </p:nvSpPr>
         <p:spPr>
           <a:xfrm>
-            <a:off x="1467561" y="3009973"/>
-            <a:ext cx="756000" cy="216000"/>
+            <a:off x="1019283" y="2751197"/>
+            <a:ext cx="567000" cy="162000"/>
           </a:xfrm>
           <a:prstGeom prst="rect">
             <a:avLst/>
@@ -3772,7 +3763,7 @@
           <a:p>
             <a:pPr algn="ctr"/>
             <a:r>
-              <a:rPr lang="es-ES" sz="900" dirty="0">
+              <a:rPr lang="es-ES" sz="675" dirty="0">
                 <a:solidFill>
                   <a:schemeClr val="tx1"/>
                 </a:solidFill>
@@ -3795,8 +3786,8 @@
         </p:nvCxnSpPr>
         <p:spPr>
           <a:xfrm rot="16200000" flipH="1">
-            <a:off x="1559918" y="2724330"/>
-            <a:ext cx="172548" cy="398738"/>
+            <a:off x="1094797" y="2543210"/>
+            <a:ext cx="148817" cy="267156"/>
           </a:xfrm>
           <a:prstGeom prst="bentConnector3">
             <a:avLst>
@@ -3832,8 +3823,8 @@
         </p:nvSpPr>
         <p:spPr>
           <a:xfrm>
-            <a:off x="2690990" y="2104086"/>
-            <a:ext cx="864000" cy="360000"/>
+            <a:off x="1972214" y="2054801"/>
+            <a:ext cx="648000" cy="270000"/>
           </a:xfrm>
           <a:prstGeom prst="rect">
             <a:avLst/>
@@ -3869,7 +3860,7 @@
           <a:p>
             <a:pPr algn="ctr"/>
             <a:r>
-              <a:rPr lang="es-ES" sz="1050" dirty="0">
+              <a:rPr lang="es-ES" sz="788" dirty="0">
                 <a:solidFill>
                   <a:schemeClr val="bg1"/>
                 </a:solidFill>
@@ -3879,7 +3870,7 @@
               <a:t>c</a:t>
             </a:r>
             <a:r>
-              <a:rPr lang="es-ES" sz="1050" dirty="0" smtClean="0">
+              <a:rPr lang="es-ES" sz="788" dirty="0">
                 <a:solidFill>
                   <a:schemeClr val="bg1"/>
                 </a:solidFill>
@@ -3888,18 +3879,11 @@
               </a:rPr>
               <a:t>oseno</a:t>
             </a:r>
-            <a:endParaRPr lang="es-ES" sz="1050" dirty="0" smtClean="0">
-              <a:solidFill>
-                <a:schemeClr val="bg1"/>
-              </a:solidFill>
-              <a:latin typeface="Arial" panose="020B0604020202020204" pitchFamily="34" charset="0"/>
-              <a:cs typeface="Arial" panose="020B0604020202020204" pitchFamily="34" charset="0"/>
-            </a:endParaRPr>
           </a:p>
           <a:p>
             <a:pPr algn="ctr"/>
             <a:r>
-              <a:rPr lang="es-ES" sz="1050" i="1" dirty="0">
+              <a:rPr lang="es-ES" sz="788" i="1" dirty="0">
                 <a:solidFill>
                   <a:schemeClr val="bg1"/>
                 </a:solidFill>
@@ -3909,7 +3893,7 @@
               <a:t>y</a:t>
             </a:r>
             <a:r>
-              <a:rPr lang="es-ES" sz="1050" dirty="0">
+              <a:rPr lang="es-ES" sz="788" dirty="0">
                 <a:solidFill>
                   <a:schemeClr val="bg1"/>
                 </a:solidFill>
@@ -3919,7 +3903,7 @@
               <a:t> = </a:t>
             </a:r>
             <a:r>
-              <a:rPr lang="es-ES" sz="1050" dirty="0" err="1" smtClean="0">
+              <a:rPr lang="es-ES" sz="788" dirty="0" err="1">
                 <a:solidFill>
                   <a:schemeClr val="bg1"/>
                 </a:solidFill>
@@ -3929,7 +3913,7 @@
               <a:t>cos</a:t>
             </a:r>
             <a:r>
-              <a:rPr lang="es-ES" sz="1050" dirty="0" smtClean="0">
+              <a:rPr lang="es-ES" sz="788" dirty="0">
                 <a:solidFill>
                   <a:schemeClr val="bg1"/>
                 </a:solidFill>
@@ -3939,7 +3923,7 @@
               <a:t> </a:t>
             </a:r>
             <a:r>
-              <a:rPr lang="es-ES" sz="1050" i="1" dirty="0" smtClean="0">
+              <a:rPr lang="es-ES" sz="788" i="1" dirty="0">
                 <a:solidFill>
                   <a:schemeClr val="bg1"/>
                 </a:solidFill>
@@ -3948,7 +3932,7 @@
               </a:rPr>
               <a:t>x</a:t>
             </a:r>
-            <a:endParaRPr lang="es-ES" sz="1050" i="1" dirty="0">
+            <a:endParaRPr lang="es-ES" sz="788" i="1" dirty="0">
               <a:solidFill>
                 <a:schemeClr val="bg1"/>
               </a:solidFill>
@@ -3969,8 +3953,8 @@
         </p:nvCxnSpPr>
         <p:spPr>
           <a:xfrm rot="5400000">
-            <a:off x="4568948" y="-199609"/>
-            <a:ext cx="273827" cy="3174330"/>
+            <a:off x="3392526" y="285917"/>
+            <a:ext cx="224474" cy="2398779"/>
           </a:xfrm>
           <a:prstGeom prst="bentConnector3">
             <a:avLst>
@@ -4006,8 +3990,8 @@
         </p:nvSpPr>
         <p:spPr>
           <a:xfrm>
-            <a:off x="8105007" y="1524470"/>
-            <a:ext cx="2531637" cy="288000"/>
+            <a:off x="6045107" y="1597543"/>
+            <a:ext cx="1898728" cy="216000"/>
           </a:xfrm>
           <a:prstGeom prst="rect">
             <a:avLst/>
@@ -4048,13 +4032,13 @@
           <a:p>
             <a:pPr algn="ctr"/>
             <a:r>
-              <a:rPr lang="es-ES" sz="1200" b="1" dirty="0" smtClean="0">
+              <a:rPr lang="es-ES" sz="900" b="1" dirty="0">
                 <a:latin typeface="Arial" panose="020B0604020202020204" pitchFamily="34" charset="0"/>
                 <a:cs typeface="Arial" panose="020B0604020202020204" pitchFamily="34" charset="0"/>
               </a:rPr>
               <a:t>Análisis de gráficas</a:t>
             </a:r>
-            <a:endParaRPr lang="es-ES" sz="1200" b="1" dirty="0">
+            <a:endParaRPr lang="es-ES" sz="900" b="1" dirty="0">
               <a:latin typeface="Arial" panose="020B0604020202020204" pitchFamily="34" charset="0"/>
               <a:cs typeface="Arial" panose="020B0604020202020204" pitchFamily="34" charset="0"/>
             </a:endParaRPr>
@@ -4072,8 +4056,8 @@
         </p:nvCxnSpPr>
         <p:spPr>
           <a:xfrm rot="16200000" flipH="1">
-            <a:off x="7695013" y="-151344"/>
-            <a:ext cx="273827" cy="3077800"/>
+            <a:off x="5737074" y="340146"/>
+            <a:ext cx="224474" cy="2290319"/>
           </a:xfrm>
           <a:prstGeom prst="bentConnector3">
             <a:avLst/>
@@ -4107,8 +4091,8 @@
         </p:nvSpPr>
         <p:spPr>
           <a:xfrm>
-            <a:off x="8975037" y="7480320"/>
-            <a:ext cx="1118927" cy="353519"/>
+            <a:off x="6731278" y="7324740"/>
+            <a:ext cx="839195" cy="265139"/>
           </a:xfrm>
           <a:prstGeom prst="rect">
             <a:avLst/>
@@ -4142,7 +4126,7 @@
           <a:p>
             <a:pPr algn="ctr"/>
             <a:r>
-              <a:rPr lang="es-ES" sz="900" dirty="0">
+              <a:rPr lang="es-ES" sz="675" dirty="0">
                 <a:solidFill>
                   <a:schemeClr val="tx1"/>
                 </a:solidFill>
@@ -4164,8 +4148,8 @@
         </p:nvCxnSpPr>
         <p:spPr>
           <a:xfrm rot="16200000" flipV="1">
-            <a:off x="9471992" y="7417810"/>
-            <a:ext cx="122687" cy="2332"/>
+            <a:off x="7103995" y="7277858"/>
+            <a:ext cx="92015" cy="1749"/>
           </a:xfrm>
           <a:prstGeom prst="bentConnector3">
             <a:avLst>
@@ -4201,8 +4185,8 @@
         </p:nvSpPr>
         <p:spPr>
           <a:xfrm>
-            <a:off x="633115" y="3009973"/>
-            <a:ext cx="756000" cy="216000"/>
+            <a:off x="376196" y="2751197"/>
+            <a:ext cx="567000" cy="162000"/>
           </a:xfrm>
           <a:prstGeom prst="rect">
             <a:avLst/>
@@ -4238,7 +4222,7 @@
           <a:p>
             <a:pPr algn="ctr"/>
             <a:r>
-              <a:rPr lang="es-ES" sz="900" dirty="0">
+              <a:rPr lang="es-ES" sz="675" dirty="0">
                 <a:solidFill>
                   <a:schemeClr val="tx1"/>
                 </a:solidFill>
@@ -4261,8 +4245,8 @@
         </p:nvCxnSpPr>
         <p:spPr>
           <a:xfrm rot="5400000">
-            <a:off x="1142695" y="2705845"/>
-            <a:ext cx="172548" cy="435708"/>
+            <a:off x="773254" y="2488823"/>
+            <a:ext cx="148817" cy="375931"/>
           </a:xfrm>
           <a:prstGeom prst="bentConnector3">
             <a:avLst>
@@ -4298,8 +4282,8 @@
         </p:nvSpPr>
         <p:spPr>
           <a:xfrm>
-            <a:off x="4436650" y="2104086"/>
-            <a:ext cx="864000" cy="360000"/>
+            <a:off x="3281459" y="2054801"/>
+            <a:ext cx="648000" cy="270000"/>
           </a:xfrm>
           <a:prstGeom prst="rect">
             <a:avLst/>
@@ -4335,7 +4319,7 @@
           <a:p>
             <a:pPr algn="ctr"/>
             <a:r>
-              <a:rPr lang="es-ES" sz="1050" dirty="0">
+              <a:rPr lang="es-ES" sz="788" dirty="0">
                 <a:solidFill>
                   <a:schemeClr val="bg1"/>
                 </a:solidFill>
@@ -4345,7 +4329,7 @@
               <a:t>t</a:t>
             </a:r>
             <a:r>
-              <a:rPr lang="es-ES" sz="1050" dirty="0" smtClean="0">
+              <a:rPr lang="es-ES" sz="788" dirty="0">
                 <a:solidFill>
                   <a:schemeClr val="bg1"/>
                 </a:solidFill>
@@ -4354,7 +4338,50 @@
               </a:rPr>
               <a:t>angente</a:t>
             </a:r>
-            <a:endParaRPr lang="es-ES" sz="1050" dirty="0" smtClean="0">
+          </a:p>
+          <a:p>
+            <a:pPr algn="ctr"/>
+            <a:r>
+              <a:rPr lang="es-ES" sz="788" i="1" dirty="0">
+                <a:solidFill>
+                  <a:schemeClr val="bg1"/>
+                </a:solidFill>
+                <a:latin typeface="Arial" panose="020B0604020202020204" pitchFamily="34" charset="0"/>
+                <a:cs typeface="Arial" panose="020B0604020202020204" pitchFamily="34" charset="0"/>
+              </a:rPr>
+              <a:t>y</a:t>
+            </a:r>
+            <a:r>
+              <a:rPr lang="es-ES" sz="788" dirty="0">
+                <a:solidFill>
+                  <a:schemeClr val="bg1"/>
+                </a:solidFill>
+                <a:latin typeface="Arial" panose="020B0604020202020204" pitchFamily="34" charset="0"/>
+                <a:cs typeface="Arial" panose="020B0604020202020204" pitchFamily="34" charset="0"/>
+              </a:rPr>
+              <a:t> = </a:t>
+            </a:r>
+            <a:r>
+              <a:rPr lang="es-ES" sz="788" dirty="0">
+                <a:solidFill>
+                  <a:schemeClr val="bg1"/>
+                </a:solidFill>
+                <a:latin typeface="Arial" panose="020B0604020202020204" pitchFamily="34" charset="0"/>
+                <a:cs typeface="Arial" panose="020B0604020202020204" pitchFamily="34" charset="0"/>
+              </a:rPr>
+              <a:t>tan </a:t>
+            </a:r>
+            <a:r>
+              <a:rPr lang="es-ES" sz="788" i="1" dirty="0">
+                <a:solidFill>
+                  <a:schemeClr val="bg1"/>
+                </a:solidFill>
+                <a:latin typeface="Arial" panose="020B0604020202020204" pitchFamily="34" charset="0"/>
+                <a:cs typeface="Arial" panose="020B0604020202020204" pitchFamily="34" charset="0"/>
+              </a:rPr>
+              <a:t>x</a:t>
+            </a:r>
+            <a:endParaRPr lang="es-ES" sz="788" i="1" dirty="0">
               <a:solidFill>
                 <a:schemeClr val="bg1"/>
               </a:solidFill>
@@ -4362,56 +4389,6 @@
               <a:cs typeface="Arial" panose="020B0604020202020204" pitchFamily="34" charset="0"/>
             </a:endParaRPr>
           </a:p>
-          <a:p>
-            <a:pPr algn="ctr"/>
-            <a:r>
-              <a:rPr lang="es-ES" sz="1050" i="1" dirty="0">
-                <a:solidFill>
-                  <a:schemeClr val="bg1"/>
-                </a:solidFill>
-                <a:latin typeface="Arial" panose="020B0604020202020204" pitchFamily="34" charset="0"/>
-                <a:cs typeface="Arial" panose="020B0604020202020204" pitchFamily="34" charset="0"/>
-              </a:rPr>
-              <a:t>y</a:t>
-            </a:r>
-            <a:r>
-              <a:rPr lang="es-ES" sz="1050" dirty="0">
-                <a:solidFill>
-                  <a:schemeClr val="bg1"/>
-                </a:solidFill>
-                <a:latin typeface="Arial" panose="020B0604020202020204" pitchFamily="34" charset="0"/>
-                <a:cs typeface="Arial" panose="020B0604020202020204" pitchFamily="34" charset="0"/>
-              </a:rPr>
-              <a:t> = </a:t>
-            </a:r>
-            <a:r>
-              <a:rPr lang="es-ES" sz="1050" dirty="0" smtClean="0">
-                <a:solidFill>
-                  <a:schemeClr val="bg1"/>
-                </a:solidFill>
-                <a:latin typeface="Arial" panose="020B0604020202020204" pitchFamily="34" charset="0"/>
-                <a:cs typeface="Arial" panose="020B0604020202020204" pitchFamily="34" charset="0"/>
-              </a:rPr>
-              <a:t>tan </a:t>
-            </a:r>
-            <a:r>
-              <a:rPr lang="es-ES" sz="1050" i="1" dirty="0" smtClean="0">
-                <a:solidFill>
-                  <a:schemeClr val="bg1"/>
-                </a:solidFill>
-                <a:latin typeface="Arial" panose="020B0604020202020204" pitchFamily="34" charset="0"/>
-                <a:cs typeface="Arial" panose="020B0604020202020204" pitchFamily="34" charset="0"/>
-              </a:rPr>
-              <a:t>x</a:t>
-            </a:r>
-            <a:endParaRPr lang="es-ES" sz="1050" i="1" dirty="0">
-              <a:solidFill>
-                <a:schemeClr val="bg1"/>
-              </a:solidFill>
-              <a:latin typeface="Arial" panose="020B0604020202020204" pitchFamily="34" charset="0"/>
-              <a:cs typeface="Arial" panose="020B0604020202020204" pitchFamily="34" charset="0"/>
-            </a:endParaRPr>
-          </a:p>
         </p:txBody>
       </p:sp>
       <p:sp>
@@ -4422,8 +4399,8 @@
         </p:nvSpPr>
         <p:spPr>
           <a:xfrm>
-            <a:off x="2110696" y="1524470"/>
-            <a:ext cx="2016000" cy="288000"/>
+            <a:off x="1549373" y="1597543"/>
+            <a:ext cx="1512000" cy="216000"/>
           </a:xfrm>
           <a:prstGeom prst="rect">
             <a:avLst/>
@@ -4532,11 +4509,11 @@
           </a:lstStyle>
           <a:p>
             <a:r>
-              <a:rPr lang="es-ES" dirty="0" smtClean="0"/>
+              <a:rPr lang="es-ES" sz="900" dirty="0"/>
               <a:t>Funciones </a:t>
             </a:r>
             <a:r>
-              <a:rPr lang="es-ES" dirty="0"/>
+              <a:rPr lang="es-ES" sz="900" dirty="0"/>
               <a:t>básicas</a:t>
             </a:r>
           </a:p>
@@ -4552,9 +4529,9 @@
           <p:nvPr/>
         </p:nvCxnSpPr>
         <p:spPr>
-          <a:xfrm rot="16200000" flipH="1">
-            <a:off x="2975035" y="1956131"/>
-            <a:ext cx="291616" cy="4294"/>
+          <a:xfrm rot="5400000">
+            <a:off x="2180165" y="1929593"/>
+            <a:ext cx="241258" cy="9159"/>
           </a:xfrm>
           <a:prstGeom prst="bentConnector3">
             <a:avLst>
@@ -4593,8 +4570,8 @@
         </p:nvCxnSpPr>
         <p:spPr>
           <a:xfrm rot="16200000" flipH="1">
-            <a:off x="3847865" y="1083301"/>
-            <a:ext cx="291616" cy="1749954"/>
+            <a:off x="2834787" y="1284129"/>
+            <a:ext cx="241258" cy="1300086"/>
           </a:xfrm>
           <a:prstGeom prst="bentConnector3">
             <a:avLst>
@@ -4630,8 +4607,8 @@
         </p:nvSpPr>
         <p:spPr>
           <a:xfrm>
-            <a:off x="615115" y="3389585"/>
-            <a:ext cx="792000" cy="360000"/>
+            <a:off x="357975" y="3037280"/>
+            <a:ext cx="576000" cy="252000"/>
           </a:xfrm>
           <a:prstGeom prst="rect">
             <a:avLst/>
@@ -4665,7 +4642,7 @@
           <a:p>
             <a:pPr algn="ctr"/>
             <a:r>
-              <a:rPr lang="es-ES" sz="900" dirty="0" smtClean="0">
+              <a:rPr lang="es-ES" sz="675" dirty="0">
                 <a:solidFill>
                   <a:schemeClr val="tx1"/>
                 </a:solidFill>
@@ -4678,7 +4655,7 @@
           <a:p>
             <a:pPr algn="ctr"/>
             <a:r>
-              <a:rPr lang="es-ES" sz="900" i="1" dirty="0">
+              <a:rPr lang="es-ES" sz="675" i="1" dirty="0">
                 <a:solidFill>
                   <a:schemeClr val="tx1"/>
                 </a:solidFill>
@@ -4688,7 +4665,7 @@
               <a:t>y</a:t>
             </a:r>
             <a:r>
-              <a:rPr lang="es-ES" sz="900" dirty="0">
+              <a:rPr lang="es-ES" sz="675" dirty="0">
                 <a:solidFill>
                   <a:schemeClr val="tx1"/>
                 </a:solidFill>
@@ -4698,7 +4675,7 @@
               <a:t> = </a:t>
             </a:r>
             <a:r>
-              <a:rPr lang="es-ES" sz="900" dirty="0" err="1" smtClean="0">
+              <a:rPr lang="es-ES" sz="675" dirty="0" err="1">
                 <a:solidFill>
                   <a:schemeClr val="tx1"/>
                 </a:solidFill>
@@ -4708,7 +4685,7 @@
               <a:t>csc</a:t>
             </a:r>
             <a:r>
-              <a:rPr lang="es-ES" sz="900" dirty="0" smtClean="0">
+              <a:rPr lang="es-ES" sz="675" dirty="0">
                 <a:solidFill>
                   <a:schemeClr val="tx1"/>
                 </a:solidFill>
@@ -4718,7 +4695,7 @@
               <a:t> </a:t>
             </a:r>
             <a:r>
-              <a:rPr lang="es-ES" sz="900" i="1" dirty="0" smtClean="0">
+              <a:rPr lang="es-ES" sz="675" i="1" dirty="0">
                 <a:solidFill>
                   <a:schemeClr val="tx1"/>
                 </a:solidFill>
@@ -4727,7 +4704,7 @@
               </a:rPr>
               <a:t>x</a:t>
             </a:r>
-            <a:endParaRPr lang="es-ES" sz="900" i="1" dirty="0">
+            <a:endParaRPr lang="es-ES" sz="675" i="1" dirty="0">
               <a:solidFill>
                 <a:schemeClr val="tx1"/>
               </a:solidFill>
@@ -4745,8 +4722,8 @@
         </p:nvSpPr>
         <p:spPr>
           <a:xfrm>
-            <a:off x="1432308" y="3389585"/>
-            <a:ext cx="826503" cy="360000"/>
+            <a:off x="962244" y="3037280"/>
+            <a:ext cx="684000" cy="252000"/>
           </a:xfrm>
           <a:prstGeom prst="rect">
             <a:avLst/>
@@ -4780,7 +4757,7 @@
           <a:p>
             <a:pPr algn="ctr"/>
             <a:r>
-              <a:rPr lang="es-ES" sz="900" dirty="0" err="1" smtClean="0">
+              <a:rPr lang="es-ES" sz="675" dirty="0" err="1">
                 <a:solidFill>
                   <a:schemeClr val="tx1"/>
                 </a:solidFill>
@@ -4789,7 +4766,7 @@
               </a:rPr>
               <a:t>arcoseno</a:t>
             </a:r>
-            <a:endParaRPr lang="es-ES" sz="900" dirty="0" smtClean="0">
+            <a:endParaRPr lang="es-ES" sz="675" dirty="0">
               <a:solidFill>
                 <a:schemeClr val="tx1"/>
               </a:solidFill>
@@ -4800,7 +4777,7 @@
           <a:p>
             <a:pPr algn="ctr"/>
             <a:r>
-              <a:rPr lang="es-ES" sz="900" i="1" dirty="0">
+              <a:rPr lang="es-ES" sz="675" i="1" dirty="0">
                 <a:solidFill>
                   <a:schemeClr val="tx1"/>
                 </a:solidFill>
@@ -4810,7 +4787,7 @@
               <a:t>y</a:t>
             </a:r>
             <a:r>
-              <a:rPr lang="es-ES" sz="900" dirty="0">
+              <a:rPr lang="es-ES" sz="675" dirty="0">
                 <a:solidFill>
                   <a:schemeClr val="tx1"/>
                 </a:solidFill>
@@ -4820,7 +4797,7 @@
               <a:t> = </a:t>
             </a:r>
             <a:r>
-              <a:rPr lang="es-ES" sz="900" dirty="0" err="1" smtClean="0">
+              <a:rPr lang="es-ES" sz="675" dirty="0" err="1">
                 <a:solidFill>
                   <a:schemeClr val="tx1"/>
                 </a:solidFill>
@@ -4830,7 +4807,7 @@
               <a:t>arcsen</a:t>
             </a:r>
             <a:r>
-              <a:rPr lang="es-ES" sz="900" dirty="0" smtClean="0">
+              <a:rPr lang="es-ES" sz="675" dirty="0">
                 <a:solidFill>
                   <a:schemeClr val="tx1"/>
                 </a:solidFill>
@@ -4840,7 +4817,7 @@
               <a:t> </a:t>
             </a:r>
             <a:r>
-              <a:rPr lang="es-ES" sz="900" i="1" dirty="0" smtClean="0">
+              <a:rPr lang="es-ES" sz="675" i="1" dirty="0">
                 <a:solidFill>
                   <a:schemeClr val="tx1"/>
                 </a:solidFill>
@@ -4849,7 +4826,7 @@
               </a:rPr>
               <a:t>x</a:t>
             </a:r>
-            <a:endParaRPr lang="es-ES" sz="900" i="1" dirty="0">
+            <a:endParaRPr lang="es-ES" sz="675" i="1" dirty="0">
               <a:solidFill>
                 <a:schemeClr val="tx1"/>
               </a:solidFill>
@@ -4869,9 +4846,9 @@
           <p:nvPr/>
         </p:nvCxnSpPr>
         <p:spPr>
-          <a:xfrm>
-            <a:off x="1011115" y="3225973"/>
-            <a:ext cx="0" cy="163612"/>
+          <a:xfrm flipH="1">
+            <a:off x="645975" y="2913197"/>
+            <a:ext cx="13721" cy="124083"/>
           </a:xfrm>
           <a:prstGeom prst="line">
             <a:avLst/>
@@ -4908,8 +4885,8 @@
         </p:nvCxnSpPr>
         <p:spPr>
           <a:xfrm>
-            <a:off x="1011115" y="3749585"/>
-            <a:ext cx="1" cy="126881"/>
+            <a:off x="645975" y="3289280"/>
+            <a:ext cx="1639" cy="156143"/>
           </a:xfrm>
           <a:prstGeom prst="line">
             <a:avLst/>
@@ -4943,8 +4920,8 @@
         </p:nvSpPr>
         <p:spPr>
           <a:xfrm>
-            <a:off x="449900" y="3876466"/>
-            <a:ext cx="1122431" cy="230832"/>
+            <a:off x="226702" y="3445423"/>
+            <a:ext cx="841823" cy="196208"/>
           </a:xfrm>
           <a:prstGeom prst="rect">
             <a:avLst/>
@@ -4959,13 +4936,13 @@
           <a:p>
             <a:pPr algn="ctr"/>
             <a:r>
-              <a:rPr lang="es-ES" sz="900" dirty="0" smtClean="0">
+              <a:rPr lang="es-ES" sz="675" dirty="0">
                 <a:latin typeface="Arial" panose="020B0604020202020204" pitchFamily="34" charset="0"/>
                 <a:cs typeface="Arial" panose="020B0604020202020204" pitchFamily="34" charset="0"/>
               </a:rPr>
               <a:t>tiene</a:t>
             </a:r>
-            <a:endParaRPr lang="es-ES" sz="900" dirty="0">
+            <a:endParaRPr lang="es-ES" sz="675" dirty="0">
               <a:latin typeface="Arial" panose="020B0604020202020204" pitchFamily="34" charset="0"/>
               <a:cs typeface="Arial" panose="020B0604020202020204" pitchFamily="34" charset="0"/>
             </a:endParaRPr>
@@ -4982,9 +4959,9 @@
           <p:nvPr/>
         </p:nvCxnSpPr>
         <p:spPr>
-          <a:xfrm flipH="1">
-            <a:off x="1845560" y="3225973"/>
-            <a:ext cx="1" cy="163612"/>
+          <a:xfrm>
+            <a:off x="1302783" y="2913197"/>
+            <a:ext cx="1461" cy="124083"/>
           </a:xfrm>
           <a:prstGeom prst="line">
             <a:avLst/>
@@ -5018,8 +4995,8 @@
         </p:nvSpPr>
         <p:spPr>
           <a:xfrm>
-            <a:off x="633115" y="4235138"/>
-            <a:ext cx="756000" cy="216000"/>
+            <a:off x="364113" y="3714427"/>
+            <a:ext cx="567000" cy="162000"/>
           </a:xfrm>
           <a:prstGeom prst="rect">
             <a:avLst/>
@@ -5053,7 +5030,7 @@
           <a:p>
             <a:pPr algn="ctr"/>
             <a:r>
-              <a:rPr lang="es-ES" sz="900" dirty="0">
+              <a:rPr lang="es-ES" sz="675" dirty="0">
                 <a:solidFill>
                   <a:schemeClr val="tx1"/>
                 </a:solidFill>
@@ -5076,8 +5053,8 @@
         </p:nvCxnSpPr>
         <p:spPr>
           <a:xfrm flipH="1">
-            <a:off x="1011115" y="4107298"/>
-            <a:ext cx="1" cy="127840"/>
+            <a:off x="647613" y="3641631"/>
+            <a:ext cx="1" cy="72796"/>
           </a:xfrm>
           <a:prstGeom prst="line">
             <a:avLst/>
@@ -5111,8 +5088,8 @@
         </p:nvSpPr>
         <p:spPr>
           <a:xfrm>
-            <a:off x="543115" y="4616582"/>
-            <a:ext cx="936000" cy="360000"/>
+            <a:off x="251613" y="4000510"/>
+            <a:ext cx="792000" cy="288000"/>
           </a:xfrm>
           <a:prstGeom prst="rect">
             <a:avLst/>
@@ -5146,7 +5123,7 @@
           <a:p>
             <a:pPr algn="ctr"/>
             <a:r>
-              <a:rPr lang="es-ES" sz="900" dirty="0" err="1" smtClean="0">
+              <a:rPr lang="es-ES" sz="675" dirty="0" err="1">
                 <a:solidFill>
                   <a:schemeClr val="tx1"/>
                 </a:solidFill>
@@ -5155,7 +5132,7 @@
               </a:rPr>
               <a:t>arcocosecante</a:t>
             </a:r>
-            <a:endParaRPr lang="es-ES" sz="900" dirty="0" smtClean="0">
+            <a:endParaRPr lang="es-ES" sz="675" dirty="0">
               <a:solidFill>
                 <a:schemeClr val="tx1"/>
               </a:solidFill>
@@ -5166,7 +5143,7 @@
           <a:p>
             <a:pPr algn="ctr"/>
             <a:r>
-              <a:rPr lang="es-ES" sz="900" i="1" dirty="0">
+              <a:rPr lang="es-ES" sz="675" i="1" dirty="0">
                 <a:solidFill>
                   <a:schemeClr val="tx1"/>
                 </a:solidFill>
@@ -5176,7 +5153,7 @@
               <a:t>y</a:t>
             </a:r>
             <a:r>
-              <a:rPr lang="es-ES" sz="900" dirty="0">
+              <a:rPr lang="es-ES" sz="675" dirty="0">
                 <a:solidFill>
                   <a:schemeClr val="tx1"/>
                 </a:solidFill>
@@ -5186,7 +5163,7 @@
               <a:t> = </a:t>
             </a:r>
             <a:r>
-              <a:rPr lang="es-ES" sz="900" dirty="0" err="1" smtClean="0">
+              <a:rPr lang="es-ES" sz="675" dirty="0" err="1">
                 <a:solidFill>
                   <a:schemeClr val="tx1"/>
                 </a:solidFill>
@@ -5196,7 +5173,7 @@
               <a:t>arccsc</a:t>
             </a:r>
             <a:r>
-              <a:rPr lang="es-ES" sz="900" dirty="0" smtClean="0">
+              <a:rPr lang="es-ES" sz="675" dirty="0">
                 <a:solidFill>
                   <a:schemeClr val="tx1"/>
                 </a:solidFill>
@@ -5206,7 +5183,7 @@
               <a:t> </a:t>
             </a:r>
             <a:r>
-              <a:rPr lang="es-ES" sz="900" i="1" dirty="0">
+              <a:rPr lang="es-ES" sz="675" i="1" dirty="0">
                 <a:solidFill>
                   <a:schemeClr val="tx1"/>
                 </a:solidFill>
@@ -5215,7 +5192,7 @@
               </a:rPr>
               <a:t>x</a:t>
             </a:r>
-            <a:endParaRPr lang="es-ES" sz="900" dirty="0">
+            <a:endParaRPr lang="es-ES" sz="675" dirty="0">
               <a:solidFill>
                 <a:schemeClr val="tx1"/>
               </a:solidFill>
@@ -5236,8 +5213,8 @@
         </p:nvCxnSpPr>
         <p:spPr>
           <a:xfrm>
-            <a:off x="1011115" y="4451138"/>
-            <a:ext cx="0" cy="165444"/>
+            <a:off x="647613" y="3876427"/>
+            <a:ext cx="0" cy="124083"/>
           </a:xfrm>
           <a:prstGeom prst="line">
             <a:avLst/>
@@ -5271,8 +5248,8 @@
         </p:nvSpPr>
         <p:spPr>
           <a:xfrm>
-            <a:off x="2562586" y="2608252"/>
-            <a:ext cx="1122431" cy="230832"/>
+            <a:off x="1872449" y="2407416"/>
+            <a:ext cx="841823" cy="196208"/>
           </a:xfrm>
           <a:prstGeom prst="rect">
             <a:avLst/>
@@ -5287,13 +5264,13 @@
           <a:p>
             <a:pPr algn="ctr"/>
             <a:r>
-              <a:rPr lang="es-ES" sz="900" dirty="0" smtClean="0">
+              <a:rPr lang="es-ES" sz="675" dirty="0">
                 <a:latin typeface="Arial" panose="020B0604020202020204" pitchFamily="34" charset="0"/>
                 <a:cs typeface="Arial" panose="020B0604020202020204" pitchFamily="34" charset="0"/>
               </a:rPr>
               <a:t>tiene</a:t>
             </a:r>
-            <a:endParaRPr lang="es-ES" sz="900" dirty="0">
+            <a:endParaRPr lang="es-ES" sz="675" dirty="0">
               <a:latin typeface="Arial" panose="020B0604020202020204" pitchFamily="34" charset="0"/>
               <a:cs typeface="Arial" panose="020B0604020202020204" pitchFamily="34" charset="0"/>
             </a:endParaRPr>
@@ -5310,9 +5287,9 @@
           <p:nvPr/>
         </p:nvCxnSpPr>
         <p:spPr>
-          <a:xfrm rot="16200000" flipH="1">
-            <a:off x="3051313" y="2535763"/>
-            <a:ext cx="144166" cy="812"/>
+          <a:xfrm rot="5400000">
+            <a:off x="2253481" y="2364682"/>
+            <a:ext cx="82615" cy="2853"/>
           </a:xfrm>
           <a:prstGeom prst="bentConnector3">
             <a:avLst>
@@ -5348,8 +5325,8 @@
         </p:nvSpPr>
         <p:spPr>
           <a:xfrm>
-            <a:off x="3179044" y="3011632"/>
-            <a:ext cx="756000" cy="216000"/>
+            <a:off x="2287315" y="2752441"/>
+            <a:ext cx="567000" cy="162000"/>
           </a:xfrm>
           <a:prstGeom prst="rect">
             <a:avLst/>
@@ -5385,7 +5362,7 @@
           <a:p>
             <a:pPr algn="ctr"/>
             <a:r>
-              <a:rPr lang="es-ES" sz="900" dirty="0">
+              <a:rPr lang="es-ES" sz="675" dirty="0">
                 <a:solidFill>
                   <a:schemeClr val="tx1"/>
                 </a:solidFill>
@@ -5408,8 +5385,8 @@
         </p:nvCxnSpPr>
         <p:spPr>
           <a:xfrm rot="16200000" flipH="1">
-            <a:off x="3254149" y="2708737"/>
-            <a:ext cx="172548" cy="433242"/>
+            <a:off x="2357680" y="2539305"/>
+            <a:ext cx="148817" cy="277454"/>
           </a:xfrm>
           <a:prstGeom prst="bentConnector3">
             <a:avLst>
@@ -5445,8 +5422,8 @@
         </p:nvSpPr>
         <p:spPr>
           <a:xfrm>
-            <a:off x="2310094" y="3011632"/>
-            <a:ext cx="756000" cy="216000"/>
+            <a:off x="1654450" y="2752441"/>
+            <a:ext cx="567000" cy="162000"/>
           </a:xfrm>
           <a:prstGeom prst="rect">
             <a:avLst/>
@@ -5482,7 +5459,7 @@
           <a:p>
             <a:pPr algn="ctr"/>
             <a:r>
-              <a:rPr lang="es-ES" sz="900" dirty="0">
+              <a:rPr lang="es-ES" sz="675" dirty="0">
                 <a:solidFill>
                   <a:schemeClr val="tx1"/>
                 </a:solidFill>
@@ -5505,8 +5482,8 @@
         </p:nvCxnSpPr>
         <p:spPr>
           <a:xfrm rot="5400000">
-            <a:off x="2819674" y="2707504"/>
-            <a:ext cx="172548" cy="435708"/>
+            <a:off x="2041248" y="2500327"/>
+            <a:ext cx="148817" cy="355411"/>
           </a:xfrm>
           <a:prstGeom prst="bentConnector3">
             <a:avLst>
@@ -5542,8 +5519,8 @@
         </p:nvSpPr>
         <p:spPr>
           <a:xfrm>
-            <a:off x="2292094" y="3391244"/>
-            <a:ext cx="792000" cy="360000"/>
+            <a:off x="1667950" y="3038524"/>
+            <a:ext cx="540000" cy="252000"/>
           </a:xfrm>
           <a:prstGeom prst="rect">
             <a:avLst/>
@@ -5577,7 +5554,7 @@
           <a:p>
             <a:pPr algn="ctr"/>
             <a:r>
-              <a:rPr lang="es-ES" sz="900" dirty="0" smtClean="0">
+              <a:rPr lang="es-ES" sz="675" dirty="0">
                 <a:solidFill>
                   <a:schemeClr val="tx1"/>
                 </a:solidFill>
@@ -5590,7 +5567,7 @@
           <a:p>
             <a:pPr algn="ctr"/>
             <a:r>
-              <a:rPr lang="es-ES" sz="900" i="1" dirty="0">
+              <a:rPr lang="es-ES" sz="675" i="1" dirty="0">
                 <a:solidFill>
                   <a:schemeClr val="tx1"/>
                 </a:solidFill>
@@ -5600,7 +5577,7 @@
               <a:t>y</a:t>
             </a:r>
             <a:r>
-              <a:rPr lang="es-ES" sz="900" dirty="0">
+              <a:rPr lang="es-ES" sz="675" dirty="0">
                 <a:solidFill>
                   <a:schemeClr val="tx1"/>
                 </a:solidFill>
@@ -5610,7 +5587,7 @@
               <a:t> = </a:t>
             </a:r>
             <a:r>
-              <a:rPr lang="es-ES" sz="900" dirty="0" err="1" smtClean="0">
+              <a:rPr lang="es-ES" sz="675" dirty="0" err="1">
                 <a:solidFill>
                   <a:schemeClr val="tx1"/>
                 </a:solidFill>
@@ -5620,7 +5597,7 @@
               <a:t>sec</a:t>
             </a:r>
             <a:r>
-              <a:rPr lang="es-ES" sz="900" dirty="0" smtClean="0">
+              <a:rPr lang="es-ES" sz="675" dirty="0">
                 <a:solidFill>
                   <a:schemeClr val="tx1"/>
                 </a:solidFill>
@@ -5630,7 +5607,7 @@
               <a:t> </a:t>
             </a:r>
             <a:r>
-              <a:rPr lang="es-ES" sz="900" i="1" dirty="0" smtClean="0">
+              <a:rPr lang="es-ES" sz="675" i="1" dirty="0">
                 <a:solidFill>
                   <a:schemeClr val="tx1"/>
                 </a:solidFill>
@@ -5639,7 +5616,7 @@
               </a:rPr>
               <a:t>x</a:t>
             </a:r>
-            <a:endParaRPr lang="es-ES" sz="900" i="1" dirty="0">
+            <a:endParaRPr lang="es-ES" sz="675" i="1" dirty="0">
               <a:solidFill>
                 <a:schemeClr val="tx1"/>
               </a:solidFill>
@@ -5657,8 +5634,8 @@
         </p:nvSpPr>
         <p:spPr>
           <a:xfrm>
-            <a:off x="3143792" y="3391244"/>
-            <a:ext cx="828000" cy="360000"/>
+            <a:off x="2246815" y="3038524"/>
+            <a:ext cx="648000" cy="252000"/>
           </a:xfrm>
           <a:prstGeom prst="rect">
             <a:avLst/>
@@ -5692,7 +5669,7 @@
           <a:p>
             <a:pPr algn="ctr"/>
             <a:r>
-              <a:rPr lang="es-ES" sz="900" dirty="0" err="1">
+              <a:rPr lang="es-ES" sz="675" dirty="0" err="1">
                 <a:solidFill>
                   <a:schemeClr val="tx1"/>
                 </a:solidFill>
@@ -5702,7 +5679,7 @@
               <a:t>a</a:t>
             </a:r>
             <a:r>
-              <a:rPr lang="es-ES" sz="900" dirty="0" err="1" smtClean="0">
+              <a:rPr lang="es-ES" sz="675" dirty="0" err="1">
                 <a:solidFill>
                   <a:schemeClr val="tx1"/>
                 </a:solidFill>
@@ -5711,7 +5688,7 @@
               </a:rPr>
               <a:t>rcocoseno</a:t>
             </a:r>
-            <a:endParaRPr lang="es-ES" sz="900" dirty="0" smtClean="0">
+            <a:endParaRPr lang="es-ES" sz="675" dirty="0">
               <a:solidFill>
                 <a:schemeClr val="tx1"/>
               </a:solidFill>
@@ -5722,7 +5699,7 @@
           <a:p>
             <a:pPr algn="ctr"/>
             <a:r>
-              <a:rPr lang="es-ES" sz="900" i="1" dirty="0">
+              <a:rPr lang="es-ES" sz="675" i="1" dirty="0">
                 <a:solidFill>
                   <a:schemeClr val="tx1"/>
                 </a:solidFill>
@@ -5732,7 +5709,7 @@
               <a:t>y</a:t>
             </a:r>
             <a:r>
-              <a:rPr lang="es-ES" sz="900" dirty="0">
+              <a:rPr lang="es-ES" sz="675" dirty="0">
                 <a:solidFill>
                   <a:schemeClr val="tx1"/>
                 </a:solidFill>
@@ -5742,7 +5719,7 @@
               <a:t> = </a:t>
             </a:r>
             <a:r>
-              <a:rPr lang="es-ES" sz="900" dirty="0" err="1" smtClean="0">
+              <a:rPr lang="es-ES" sz="675" dirty="0" err="1">
                 <a:solidFill>
                   <a:schemeClr val="tx1"/>
                 </a:solidFill>
@@ -5752,7 +5729,7 @@
               <a:t>arccos</a:t>
             </a:r>
             <a:r>
-              <a:rPr lang="es-ES" sz="900" dirty="0" smtClean="0">
+              <a:rPr lang="es-ES" sz="675" dirty="0">
                 <a:solidFill>
                   <a:schemeClr val="tx1"/>
                 </a:solidFill>
@@ -5762,7 +5739,7 @@
               <a:t> </a:t>
             </a:r>
             <a:r>
-              <a:rPr lang="es-ES" sz="900" i="1" dirty="0">
+              <a:rPr lang="es-ES" sz="675" i="1" dirty="0">
                 <a:solidFill>
                   <a:schemeClr val="tx1"/>
                 </a:solidFill>
@@ -5771,7 +5748,7 @@
               </a:rPr>
               <a:t>x</a:t>
             </a:r>
-            <a:endParaRPr lang="es-ES" sz="900" dirty="0">
+            <a:endParaRPr lang="es-ES" sz="675" dirty="0">
               <a:solidFill>
                 <a:schemeClr val="tx1"/>
               </a:solidFill>
@@ -5792,8 +5769,8 @@
         </p:nvCxnSpPr>
         <p:spPr>
           <a:xfrm>
-            <a:off x="2688094" y="3227632"/>
-            <a:ext cx="0" cy="163612"/>
+            <a:off x="1937950" y="2914441"/>
+            <a:ext cx="0" cy="124083"/>
           </a:xfrm>
           <a:prstGeom prst="line">
             <a:avLst/>
@@ -5829,9 +5806,9 @@
           <p:nvPr/>
         </p:nvCxnSpPr>
         <p:spPr>
-          <a:xfrm flipH="1">
-            <a:off x="2686786" y="3751244"/>
-            <a:ext cx="1308" cy="126329"/>
+          <a:xfrm>
+            <a:off x="1937950" y="3290524"/>
+            <a:ext cx="55" cy="158317"/>
           </a:xfrm>
           <a:prstGeom prst="line">
             <a:avLst/>
@@ -5865,8 +5842,8 @@
         </p:nvSpPr>
         <p:spPr>
           <a:xfrm>
-            <a:off x="2125570" y="3877573"/>
-            <a:ext cx="1122431" cy="230832"/>
+            <a:off x="1517093" y="3448841"/>
+            <a:ext cx="841823" cy="196208"/>
           </a:xfrm>
           <a:prstGeom prst="rect">
             <a:avLst/>
@@ -5881,13 +5858,13 @@
           <a:p>
             <a:pPr algn="ctr"/>
             <a:r>
-              <a:rPr lang="es-ES" sz="900" dirty="0" smtClean="0">
+              <a:rPr lang="es-ES" sz="675" dirty="0">
                 <a:latin typeface="Arial" panose="020B0604020202020204" pitchFamily="34" charset="0"/>
                 <a:cs typeface="Arial" panose="020B0604020202020204" pitchFamily="34" charset="0"/>
               </a:rPr>
               <a:t>tiene</a:t>
             </a:r>
-            <a:endParaRPr lang="es-ES" sz="900" dirty="0">
+            <a:endParaRPr lang="es-ES" sz="675" dirty="0">
               <a:latin typeface="Arial" panose="020B0604020202020204" pitchFamily="34" charset="0"/>
               <a:cs typeface="Arial" panose="020B0604020202020204" pitchFamily="34" charset="0"/>
             </a:endParaRPr>
@@ -5905,8 +5882,8 @@
         </p:nvCxnSpPr>
         <p:spPr>
           <a:xfrm>
-            <a:off x="3557044" y="3227632"/>
-            <a:ext cx="748" cy="163612"/>
+            <a:off x="2570815" y="2914441"/>
+            <a:ext cx="0" cy="124083"/>
           </a:xfrm>
           <a:prstGeom prst="line">
             <a:avLst/>
@@ -5940,8 +5917,8 @@
         </p:nvSpPr>
         <p:spPr>
           <a:xfrm>
-            <a:off x="2310094" y="4236797"/>
-            <a:ext cx="756000" cy="216000"/>
+            <a:off x="1655486" y="3718259"/>
+            <a:ext cx="567000" cy="162000"/>
           </a:xfrm>
           <a:prstGeom prst="rect">
             <a:avLst/>
@@ -5975,7 +5952,7 @@
           <a:p>
             <a:pPr algn="ctr"/>
             <a:r>
-              <a:rPr lang="es-ES" sz="900" dirty="0">
+              <a:rPr lang="es-ES" sz="675" dirty="0">
                 <a:solidFill>
                   <a:schemeClr val="tx1"/>
                 </a:solidFill>
@@ -5998,8 +5975,8 @@
         </p:nvCxnSpPr>
         <p:spPr>
           <a:xfrm>
-            <a:off x="2686786" y="4108405"/>
-            <a:ext cx="1308" cy="128392"/>
+            <a:off x="1938005" y="3645049"/>
+            <a:ext cx="981" cy="73210"/>
           </a:xfrm>
           <a:prstGeom prst="line">
             <a:avLst/>
@@ -6033,8 +6010,8 @@
         </p:nvSpPr>
         <p:spPr>
           <a:xfrm>
-            <a:off x="2220094" y="4618241"/>
-            <a:ext cx="936000" cy="360000"/>
+            <a:off x="1587986" y="4004342"/>
+            <a:ext cx="702000" cy="270000"/>
           </a:xfrm>
           <a:prstGeom prst="rect">
             <a:avLst/>
@@ -6068,7 +6045,7 @@
           <a:p>
             <a:pPr algn="ctr"/>
             <a:r>
-              <a:rPr lang="es-ES" sz="900" dirty="0" err="1" smtClean="0">
+              <a:rPr lang="es-ES" sz="675" dirty="0" err="1">
                 <a:solidFill>
                   <a:schemeClr val="tx1"/>
                 </a:solidFill>
@@ -6077,7 +6054,7 @@
               </a:rPr>
               <a:t>arcosecante</a:t>
             </a:r>
-            <a:endParaRPr lang="es-ES" sz="900" dirty="0" smtClean="0">
+            <a:endParaRPr lang="es-ES" sz="675" dirty="0">
               <a:solidFill>
                 <a:schemeClr val="tx1"/>
               </a:solidFill>
@@ -6088,7 +6065,7 @@
           <a:p>
             <a:pPr algn="ctr"/>
             <a:r>
-              <a:rPr lang="es-ES" sz="900" i="1" dirty="0">
+              <a:rPr lang="es-ES" sz="675" i="1" dirty="0">
                 <a:solidFill>
                   <a:schemeClr val="tx1"/>
                 </a:solidFill>
@@ -6098,7 +6075,7 @@
               <a:t>y</a:t>
             </a:r>
             <a:r>
-              <a:rPr lang="es-ES" sz="900" dirty="0">
+              <a:rPr lang="es-ES" sz="675" dirty="0">
                 <a:solidFill>
                   <a:schemeClr val="tx1"/>
                 </a:solidFill>
@@ -6108,7 +6085,7 @@
               <a:t> = </a:t>
             </a:r>
             <a:r>
-              <a:rPr lang="es-ES" sz="900" dirty="0" err="1" smtClean="0">
+              <a:rPr lang="es-ES" sz="675" dirty="0" err="1">
                 <a:solidFill>
                   <a:schemeClr val="tx1"/>
                 </a:solidFill>
@@ -6118,7 +6095,7 @@
               <a:t>arcsec</a:t>
             </a:r>
             <a:r>
-              <a:rPr lang="es-ES" sz="900" dirty="0" smtClean="0">
+              <a:rPr lang="es-ES" sz="675" dirty="0">
                 <a:solidFill>
                   <a:schemeClr val="tx1"/>
                 </a:solidFill>
@@ -6128,7 +6105,7 @@
               <a:t> </a:t>
             </a:r>
             <a:r>
-              <a:rPr lang="es-ES" sz="900" i="1" dirty="0">
+              <a:rPr lang="es-ES" sz="675" i="1" dirty="0">
                 <a:solidFill>
                   <a:schemeClr val="tx1"/>
                 </a:solidFill>
@@ -6137,7 +6114,7 @@
               </a:rPr>
               <a:t>x</a:t>
             </a:r>
-            <a:endParaRPr lang="es-ES" sz="900" dirty="0">
+            <a:endParaRPr lang="es-ES" sz="675" dirty="0">
               <a:solidFill>
                 <a:schemeClr val="tx1"/>
               </a:solidFill>
@@ -6158,8 +6135,8 @@
         </p:nvCxnSpPr>
         <p:spPr>
           <a:xfrm>
-            <a:off x="2688094" y="4452797"/>
-            <a:ext cx="0" cy="165444"/>
+            <a:off x="1938986" y="3880259"/>
+            <a:ext cx="0" cy="124083"/>
           </a:xfrm>
           <a:prstGeom prst="line">
             <a:avLst/>
@@ -6193,8 +6170,8 @@
         </p:nvSpPr>
         <p:spPr>
           <a:xfrm>
-            <a:off x="4308488" y="2606593"/>
-            <a:ext cx="1122431" cy="230832"/>
+            <a:off x="3181876" y="2406172"/>
+            <a:ext cx="841823" cy="196208"/>
           </a:xfrm>
           <a:prstGeom prst="rect">
             <a:avLst/>
@@ -6209,13 +6186,13 @@
           <a:p>
             <a:pPr algn="ctr"/>
             <a:r>
-              <a:rPr lang="es-ES" sz="900" dirty="0" smtClean="0">
+              <a:rPr lang="es-ES" sz="675" dirty="0">
                 <a:latin typeface="Arial" panose="020B0604020202020204" pitchFamily="34" charset="0"/>
                 <a:cs typeface="Arial" panose="020B0604020202020204" pitchFamily="34" charset="0"/>
               </a:rPr>
               <a:t>tiene</a:t>
             </a:r>
-            <a:endParaRPr lang="es-ES" sz="900" dirty="0">
+            <a:endParaRPr lang="es-ES" sz="675" dirty="0">
               <a:latin typeface="Arial" panose="020B0604020202020204" pitchFamily="34" charset="0"/>
               <a:cs typeface="Arial" panose="020B0604020202020204" pitchFamily="34" charset="0"/>
             </a:endParaRPr>
@@ -6232,9 +6209,9 @@
           <p:nvPr/>
         </p:nvCxnSpPr>
         <p:spPr>
-          <a:xfrm rot="16200000" flipH="1">
-            <a:off x="4797924" y="2534812"/>
-            <a:ext cx="142507" cy="1054"/>
+          <a:xfrm rot="5400000">
+            <a:off x="3563439" y="2364151"/>
+            <a:ext cx="81371" cy="2671"/>
           </a:xfrm>
           <a:prstGeom prst="bentConnector3">
             <a:avLst>
@@ -6270,8 +6247,8 @@
         </p:nvSpPr>
         <p:spPr>
           <a:xfrm>
-            <a:off x="4934722" y="3009973"/>
-            <a:ext cx="756000" cy="216000"/>
+            <a:off x="3652815" y="2751197"/>
+            <a:ext cx="567000" cy="162000"/>
           </a:xfrm>
           <a:prstGeom prst="rect">
             <a:avLst/>
@@ -6307,7 +6284,7 @@
           <a:p>
             <a:pPr algn="ctr"/>
             <a:r>
-              <a:rPr lang="es-ES" sz="900" dirty="0">
+              <a:rPr lang="es-ES" sz="675" dirty="0">
                 <a:solidFill>
                   <a:schemeClr val="tx1"/>
                 </a:solidFill>
@@ -6330,8 +6307,8 @@
         </p:nvCxnSpPr>
         <p:spPr>
           <a:xfrm rot="16200000" flipH="1">
-            <a:off x="5004939" y="2702190"/>
-            <a:ext cx="172548" cy="443018"/>
+            <a:off x="3695143" y="2510024"/>
+            <a:ext cx="148817" cy="333527"/>
           </a:xfrm>
           <a:prstGeom prst="bentConnector3">
             <a:avLst>
@@ -6367,8 +6344,8 @@
         </p:nvSpPr>
         <p:spPr>
           <a:xfrm>
-            <a:off x="4021492" y="3009973"/>
-            <a:ext cx="756000" cy="216000"/>
+            <a:off x="2954741" y="2751197"/>
+            <a:ext cx="567000" cy="162000"/>
           </a:xfrm>
           <a:prstGeom prst="rect">
             <a:avLst/>
@@ -6404,7 +6381,7 @@
           <a:p>
             <a:pPr algn="ctr"/>
             <a:r>
-              <a:rPr lang="es-ES" sz="900" dirty="0">
+              <a:rPr lang="es-ES" sz="675" dirty="0">
                 <a:solidFill>
                   <a:schemeClr val="tx1"/>
                 </a:solidFill>
@@ -6427,8 +6404,8 @@
         </p:nvCxnSpPr>
         <p:spPr>
           <a:xfrm rot="5400000">
-            <a:off x="4548324" y="2688593"/>
-            <a:ext cx="172548" cy="470212"/>
+            <a:off x="3346107" y="2494515"/>
+            <a:ext cx="148817" cy="364547"/>
           </a:xfrm>
           <a:prstGeom prst="bentConnector3">
             <a:avLst>
@@ -6464,8 +6441,8 @@
         </p:nvSpPr>
         <p:spPr>
           <a:xfrm>
-            <a:off x="4003492" y="3389585"/>
-            <a:ext cx="792000" cy="360000"/>
+            <a:off x="2932241" y="3037280"/>
+            <a:ext cx="612000" cy="252000"/>
           </a:xfrm>
           <a:prstGeom prst="rect">
             <a:avLst/>
@@ -6499,7 +6476,7 @@
           <a:p>
             <a:pPr algn="ctr"/>
             <a:r>
-              <a:rPr lang="es-ES" sz="900" dirty="0" smtClean="0">
+              <a:rPr lang="es-ES" sz="675" dirty="0">
                 <a:solidFill>
                   <a:schemeClr val="tx1"/>
                 </a:solidFill>
@@ -6512,7 +6489,7 @@
           <a:p>
             <a:pPr algn="ctr"/>
             <a:r>
-              <a:rPr lang="es-ES" sz="900" i="1" dirty="0">
+              <a:rPr lang="es-ES" sz="675" i="1" dirty="0">
                 <a:solidFill>
                   <a:schemeClr val="tx1"/>
                 </a:solidFill>
@@ -6522,7 +6499,7 @@
               <a:t>y</a:t>
             </a:r>
             <a:r>
-              <a:rPr lang="es-ES" sz="900" dirty="0">
+              <a:rPr lang="es-ES" sz="675" dirty="0">
                 <a:solidFill>
                   <a:schemeClr val="tx1"/>
                 </a:solidFill>
@@ -6532,7 +6509,7 @@
               <a:t> = </a:t>
             </a:r>
             <a:r>
-              <a:rPr lang="es-ES" sz="900" dirty="0" err="1" smtClean="0">
+              <a:rPr lang="es-ES" sz="675" dirty="0" err="1">
                 <a:solidFill>
                   <a:schemeClr val="tx1"/>
                 </a:solidFill>
@@ -6542,7 +6519,7 @@
               <a:t>cot</a:t>
             </a:r>
             <a:r>
-              <a:rPr lang="es-ES" sz="900" dirty="0" smtClean="0">
+              <a:rPr lang="es-ES" sz="675" dirty="0">
                 <a:solidFill>
                   <a:schemeClr val="tx1"/>
                 </a:solidFill>
@@ -6552,7 +6529,7 @@
               <a:t> </a:t>
             </a:r>
             <a:r>
-              <a:rPr lang="es-ES" sz="900" i="1" dirty="0">
+              <a:rPr lang="es-ES" sz="675" i="1" dirty="0">
                 <a:solidFill>
                   <a:schemeClr val="tx1"/>
                 </a:solidFill>
@@ -6561,7 +6538,7 @@
               </a:rPr>
               <a:t>x</a:t>
             </a:r>
-            <a:endParaRPr lang="es-ES" sz="900" dirty="0">
+            <a:endParaRPr lang="es-ES" sz="675" dirty="0">
               <a:solidFill>
                 <a:schemeClr val="tx1"/>
               </a:solidFill>
@@ -6579,8 +6556,8 @@
         </p:nvSpPr>
         <p:spPr>
           <a:xfrm>
-            <a:off x="4826722" y="3389585"/>
-            <a:ext cx="972000" cy="360000"/>
+            <a:off x="3594315" y="3037280"/>
+            <a:ext cx="684000" cy="252000"/>
           </a:xfrm>
           <a:prstGeom prst="rect">
             <a:avLst/>
@@ -6614,7 +6591,7 @@
           <a:p>
             <a:pPr algn="ctr"/>
             <a:r>
-              <a:rPr lang="es-ES" sz="900" dirty="0" err="1" smtClean="0">
+              <a:rPr lang="es-ES" sz="675" dirty="0" err="1">
                 <a:solidFill>
                   <a:schemeClr val="tx1"/>
                 </a:solidFill>
@@ -6623,7 +6600,7 @@
               </a:rPr>
               <a:t>arcotangente</a:t>
             </a:r>
-            <a:endParaRPr lang="es-ES" sz="900" dirty="0" smtClean="0">
+            <a:endParaRPr lang="es-ES" sz="675" dirty="0">
               <a:solidFill>
                 <a:schemeClr val="tx1"/>
               </a:solidFill>
@@ -6634,7 +6611,7 @@
           <a:p>
             <a:pPr algn="ctr"/>
             <a:r>
-              <a:rPr lang="es-ES" sz="900" i="1" dirty="0">
+              <a:rPr lang="es-ES" sz="675" i="1" dirty="0">
                 <a:solidFill>
                   <a:schemeClr val="tx1"/>
                 </a:solidFill>
@@ -6644,7 +6621,7 @@
               <a:t>y</a:t>
             </a:r>
             <a:r>
-              <a:rPr lang="es-ES" sz="900" dirty="0">
+              <a:rPr lang="es-ES" sz="675" dirty="0">
                 <a:solidFill>
                   <a:schemeClr val="tx1"/>
                 </a:solidFill>
@@ -6654,7 +6631,7 @@
               <a:t> = </a:t>
             </a:r>
             <a:r>
-              <a:rPr lang="es-ES" sz="900" dirty="0" err="1" smtClean="0">
+              <a:rPr lang="es-ES" sz="675" dirty="0" err="1">
                 <a:solidFill>
                   <a:schemeClr val="tx1"/>
                 </a:solidFill>
@@ -6664,7 +6641,7 @@
               <a:t>arctan</a:t>
             </a:r>
             <a:r>
-              <a:rPr lang="es-ES" sz="900" dirty="0" smtClean="0">
+              <a:rPr lang="es-ES" sz="675" dirty="0">
                 <a:solidFill>
                   <a:schemeClr val="tx1"/>
                 </a:solidFill>
@@ -6674,7 +6651,7 @@
               <a:t> </a:t>
             </a:r>
             <a:r>
-              <a:rPr lang="es-ES" sz="900" i="1" dirty="0">
+              <a:rPr lang="es-ES" sz="675" i="1" dirty="0">
                 <a:solidFill>
                   <a:schemeClr val="tx1"/>
                 </a:solidFill>
@@ -6683,7 +6660,7 @@
               </a:rPr>
               <a:t>x</a:t>
             </a:r>
-            <a:endParaRPr lang="es-ES" sz="900" dirty="0">
+            <a:endParaRPr lang="es-ES" sz="675" dirty="0">
               <a:solidFill>
                 <a:schemeClr val="tx1"/>
               </a:solidFill>
@@ -6704,8 +6681,8 @@
         </p:nvCxnSpPr>
         <p:spPr>
           <a:xfrm>
-            <a:off x="4399492" y="3225973"/>
-            <a:ext cx="0" cy="163612"/>
+            <a:off x="3238241" y="2913197"/>
+            <a:ext cx="0" cy="124083"/>
           </a:xfrm>
           <a:prstGeom prst="line">
             <a:avLst/>
@@ -6742,8 +6719,8 @@
         </p:nvCxnSpPr>
         <p:spPr>
           <a:xfrm>
-            <a:off x="4399492" y="3749585"/>
-            <a:ext cx="1" cy="126881"/>
+            <a:off x="3238241" y="3289280"/>
+            <a:ext cx="1" cy="197475"/>
           </a:xfrm>
           <a:prstGeom prst="line">
             <a:avLst/>
@@ -6777,8 +6754,8 @@
         </p:nvSpPr>
         <p:spPr>
           <a:xfrm>
-            <a:off x="3838277" y="3876466"/>
-            <a:ext cx="1122431" cy="230832"/>
+            <a:off x="2817330" y="3486755"/>
+            <a:ext cx="841823" cy="196208"/>
           </a:xfrm>
           <a:prstGeom prst="rect">
             <a:avLst/>
@@ -6793,13 +6770,13 @@
           <a:p>
             <a:pPr algn="ctr"/>
             <a:r>
-              <a:rPr lang="es-ES" sz="900" dirty="0" smtClean="0">
+              <a:rPr lang="es-ES" sz="675" dirty="0">
                 <a:latin typeface="Arial" panose="020B0604020202020204" pitchFamily="34" charset="0"/>
                 <a:cs typeface="Arial" panose="020B0604020202020204" pitchFamily="34" charset="0"/>
               </a:rPr>
               <a:t>tiene</a:t>
             </a:r>
-            <a:endParaRPr lang="es-ES" sz="900" dirty="0">
+            <a:endParaRPr lang="es-ES" sz="675" dirty="0">
               <a:latin typeface="Arial" panose="020B0604020202020204" pitchFamily="34" charset="0"/>
               <a:cs typeface="Arial" panose="020B0604020202020204" pitchFamily="34" charset="0"/>
             </a:endParaRPr>
@@ -6817,8 +6794,8 @@
         </p:nvCxnSpPr>
         <p:spPr>
           <a:xfrm>
-            <a:off x="5312722" y="3225973"/>
-            <a:ext cx="0" cy="163612"/>
+            <a:off x="3936315" y="2913197"/>
+            <a:ext cx="0" cy="124083"/>
           </a:xfrm>
           <a:prstGeom prst="line">
             <a:avLst/>
@@ -6852,8 +6829,8 @@
         </p:nvSpPr>
         <p:spPr>
           <a:xfrm>
-            <a:off x="4021492" y="4235138"/>
-            <a:ext cx="756000" cy="216000"/>
+            <a:off x="2954741" y="3755759"/>
+            <a:ext cx="567000" cy="162000"/>
           </a:xfrm>
           <a:prstGeom prst="rect">
             <a:avLst/>
@@ -6887,7 +6864,7 @@
           <a:p>
             <a:pPr algn="ctr"/>
             <a:r>
-              <a:rPr lang="es-ES" sz="900" dirty="0">
+              <a:rPr lang="es-ES" sz="675" dirty="0">
                 <a:solidFill>
                   <a:schemeClr val="tx1"/>
                 </a:solidFill>
@@ -6910,8 +6887,8 @@
         </p:nvCxnSpPr>
         <p:spPr>
           <a:xfrm flipH="1">
-            <a:off x="4399492" y="4107298"/>
-            <a:ext cx="1" cy="127840"/>
+            <a:off x="3238241" y="3682963"/>
+            <a:ext cx="1" cy="72796"/>
           </a:xfrm>
           <a:prstGeom prst="line">
             <a:avLst/>
@@ -6945,8 +6922,8 @@
         </p:nvSpPr>
         <p:spPr>
           <a:xfrm>
-            <a:off x="3914240" y="4616582"/>
-            <a:ext cx="972000" cy="360000"/>
+            <a:off x="2842241" y="4041842"/>
+            <a:ext cx="792000" cy="270000"/>
           </a:xfrm>
           <a:prstGeom prst="rect">
             <a:avLst/>
@@ -6980,7 +6957,7 @@
           <a:p>
             <a:pPr algn="ctr"/>
             <a:r>
-              <a:rPr lang="es-ES" sz="900" dirty="0" err="1" smtClean="0">
+              <a:rPr lang="es-ES" sz="675" dirty="0" err="1">
                 <a:solidFill>
                   <a:schemeClr val="tx1"/>
                 </a:solidFill>
@@ -6989,7 +6966,7 @@
               </a:rPr>
               <a:t>arcocotangente</a:t>
             </a:r>
-            <a:endParaRPr lang="es-ES" sz="900" dirty="0" smtClean="0">
+            <a:endParaRPr lang="es-ES" sz="675" dirty="0">
               <a:solidFill>
                 <a:schemeClr val="tx1"/>
               </a:solidFill>
@@ -7000,7 +6977,7 @@
           <a:p>
             <a:pPr algn="ctr"/>
             <a:r>
-              <a:rPr lang="es-ES" sz="900" i="1" dirty="0">
+              <a:rPr lang="es-ES" sz="675" i="1" dirty="0">
                 <a:solidFill>
                   <a:schemeClr val="tx1"/>
                 </a:solidFill>
@@ -7010,7 +6987,7 @@
               <a:t>y</a:t>
             </a:r>
             <a:r>
-              <a:rPr lang="es-ES" sz="900" dirty="0">
+              <a:rPr lang="es-ES" sz="675" dirty="0">
                 <a:solidFill>
                   <a:schemeClr val="tx1"/>
                 </a:solidFill>
@@ -7020,7 +6997,7 @@
               <a:t> = </a:t>
             </a:r>
             <a:r>
-              <a:rPr lang="es-ES" sz="900" dirty="0" err="1" smtClean="0">
+              <a:rPr lang="es-ES" sz="675" dirty="0" err="1">
                 <a:solidFill>
                   <a:schemeClr val="tx1"/>
                 </a:solidFill>
@@ -7030,7 +7007,7 @@
               <a:t>arccot</a:t>
             </a:r>
             <a:r>
-              <a:rPr lang="es-ES" sz="900" dirty="0" smtClean="0">
+              <a:rPr lang="es-ES" sz="675" dirty="0">
                 <a:solidFill>
                   <a:schemeClr val="tx1"/>
                 </a:solidFill>
@@ -7040,7 +7017,7 @@
               <a:t> </a:t>
             </a:r>
             <a:r>
-              <a:rPr lang="es-ES" sz="900" i="1" dirty="0">
+              <a:rPr lang="es-ES" sz="675" i="1" dirty="0">
                 <a:solidFill>
                   <a:schemeClr val="tx1"/>
                 </a:solidFill>
@@ -7049,7 +7026,7 @@
               </a:rPr>
               <a:t>x</a:t>
             </a:r>
-            <a:endParaRPr lang="es-ES" sz="900" dirty="0">
+            <a:endParaRPr lang="es-ES" sz="675" dirty="0">
               <a:solidFill>
                 <a:schemeClr val="tx1"/>
               </a:solidFill>
@@ -7070,8 +7047,8 @@
         </p:nvCxnSpPr>
         <p:spPr>
           <a:xfrm>
-            <a:off x="4399492" y="4451138"/>
-            <a:ext cx="748" cy="165444"/>
+            <a:off x="3238241" y="3917759"/>
+            <a:ext cx="0" cy="124083"/>
           </a:xfrm>
           <a:prstGeom prst="line">
             <a:avLst/>
@@ -7105,8 +7082,8 @@
         </p:nvSpPr>
         <p:spPr>
           <a:xfrm>
-            <a:off x="6169986" y="2175337"/>
-            <a:ext cx="900000" cy="252000"/>
+            <a:off x="4581390" y="2054801"/>
+            <a:ext cx="675000" cy="189000"/>
           </a:xfrm>
           <a:prstGeom prst="rect">
             <a:avLst/>
@@ -7142,7 +7119,7 @@
           <a:p>
             <a:pPr algn="ctr"/>
             <a:r>
-              <a:rPr lang="es-ES" sz="1050" dirty="0">
+              <a:rPr lang="es-ES" sz="788" dirty="0">
                 <a:solidFill>
                   <a:schemeClr val="bg1"/>
                 </a:solidFill>
@@ -7152,7 +7129,7 @@
               <a:t>t</a:t>
             </a:r>
             <a:r>
-              <a:rPr lang="es-ES" sz="1050" dirty="0" smtClean="0">
+              <a:rPr lang="es-ES" sz="788" dirty="0">
                 <a:solidFill>
                   <a:schemeClr val="bg1"/>
                 </a:solidFill>
@@ -7161,7 +7138,7 @@
               </a:rPr>
               <a:t>ranslación</a:t>
             </a:r>
-            <a:endParaRPr lang="es-ES" sz="1050" dirty="0">
+            <a:endParaRPr lang="es-ES" sz="788" dirty="0">
               <a:solidFill>
                 <a:schemeClr val="bg1"/>
               </a:solidFill>
@@ -7179,8 +7156,8 @@
         </p:nvSpPr>
         <p:spPr>
           <a:xfrm>
-            <a:off x="7412475" y="2175337"/>
-            <a:ext cx="756000" cy="252000"/>
+            <a:off x="5550654" y="2054801"/>
+            <a:ext cx="567000" cy="189000"/>
           </a:xfrm>
           <a:prstGeom prst="rect">
             <a:avLst/>
@@ -7216,7 +7193,7 @@
           <a:p>
             <a:pPr algn="ctr"/>
             <a:r>
-              <a:rPr lang="es-ES" sz="1050" dirty="0">
+              <a:rPr lang="es-ES" sz="788" dirty="0">
                 <a:solidFill>
                   <a:schemeClr val="bg1"/>
                 </a:solidFill>
@@ -7226,7 +7203,7 @@
               <a:t>r</a:t>
             </a:r>
             <a:r>
-              <a:rPr lang="es-ES" sz="1050" dirty="0" smtClean="0">
+              <a:rPr lang="es-ES" sz="788" dirty="0">
                 <a:solidFill>
                   <a:schemeClr val="bg1"/>
                 </a:solidFill>
@@ -7235,7 +7212,7 @@
               </a:rPr>
               <a:t>eflexión</a:t>
             </a:r>
-            <a:endParaRPr lang="es-ES" sz="1050" dirty="0">
+            <a:endParaRPr lang="es-ES" sz="788" dirty="0">
               <a:solidFill>
                 <a:schemeClr val="bg1"/>
               </a:solidFill>
@@ -7253,8 +7230,8 @@
         </p:nvSpPr>
         <p:spPr>
           <a:xfrm>
-            <a:off x="8571351" y="2121337"/>
-            <a:ext cx="972000" cy="360000"/>
+            <a:off x="6394007" y="2054801"/>
+            <a:ext cx="792000" cy="270000"/>
           </a:xfrm>
           <a:prstGeom prst="rect">
             <a:avLst/>
@@ -7290,7 +7267,7 @@
           <a:p>
             <a:pPr algn="ctr"/>
             <a:r>
-              <a:rPr lang="es-ES" sz="1050" dirty="0">
+              <a:rPr lang="es-ES" sz="788" dirty="0">
                 <a:solidFill>
                   <a:schemeClr val="bg1"/>
                 </a:solidFill>
@@ -7300,7 +7277,7 @@
               <a:t>c</a:t>
             </a:r>
             <a:r>
-              <a:rPr lang="es-ES" sz="1050" dirty="0" smtClean="0">
+              <a:rPr lang="es-ES" sz="788" dirty="0">
                 <a:solidFill>
                   <a:schemeClr val="bg1"/>
                 </a:solidFill>
@@ -7309,7 +7286,30 @@
               </a:rPr>
               <a:t>ompresión</a:t>
             </a:r>
-            <a:endParaRPr lang="es-ES" sz="1050" dirty="0" smtClean="0">
+          </a:p>
+          <a:p>
+            <a:pPr algn="ctr"/>
+            <a:r>
+              <a:rPr lang="es-ES" sz="788" dirty="0">
+                <a:solidFill>
+                  <a:schemeClr val="bg1"/>
+                </a:solidFill>
+                <a:latin typeface="Arial" panose="020B0604020202020204" pitchFamily="34" charset="0"/>
+                <a:cs typeface="Arial" panose="020B0604020202020204" pitchFamily="34" charset="0"/>
+              </a:rPr>
+              <a:t>a</a:t>
+            </a:r>
+            <a:r>
+              <a:rPr lang="es-ES" sz="788" dirty="0">
+                <a:solidFill>
+                  <a:schemeClr val="bg1"/>
+                </a:solidFill>
+                <a:latin typeface="Arial" panose="020B0604020202020204" pitchFamily="34" charset="0"/>
+                <a:cs typeface="Arial" panose="020B0604020202020204" pitchFamily="34" charset="0"/>
+              </a:rPr>
+              <a:t>largamiento</a:t>
+            </a:r>
+            <a:endParaRPr lang="es-ES" sz="788" dirty="0">
               <a:solidFill>
                 <a:schemeClr val="bg1"/>
               </a:solidFill>
@@ -7317,36 +7317,6 @@
               <a:cs typeface="Arial" panose="020B0604020202020204" pitchFamily="34" charset="0"/>
             </a:endParaRPr>
           </a:p>
-          <a:p>
-            <a:pPr algn="ctr"/>
-            <a:r>
-              <a:rPr lang="es-ES" sz="1050" dirty="0">
-                <a:solidFill>
-                  <a:schemeClr val="bg1"/>
-                </a:solidFill>
-                <a:latin typeface="Arial" panose="020B0604020202020204" pitchFamily="34" charset="0"/>
-                <a:cs typeface="Arial" panose="020B0604020202020204" pitchFamily="34" charset="0"/>
-              </a:rPr>
-              <a:t>a</a:t>
-            </a:r>
-            <a:r>
-              <a:rPr lang="es-ES" sz="1050" dirty="0" smtClean="0">
-                <a:solidFill>
-                  <a:schemeClr val="bg1"/>
-                </a:solidFill>
-                <a:latin typeface="Arial" panose="020B0604020202020204" pitchFamily="34" charset="0"/>
-                <a:cs typeface="Arial" panose="020B0604020202020204" pitchFamily="34" charset="0"/>
-              </a:rPr>
-              <a:t>largamiento</a:t>
-            </a:r>
-            <a:endParaRPr lang="es-ES" sz="1050" dirty="0">
-              <a:solidFill>
-                <a:schemeClr val="bg1"/>
-              </a:solidFill>
-              <a:latin typeface="Arial" panose="020B0604020202020204" pitchFamily="34" charset="0"/>
-              <a:cs typeface="Arial" panose="020B0604020202020204" pitchFamily="34" charset="0"/>
-            </a:endParaRPr>
-          </a:p>
         </p:txBody>
       </p:sp>
       <p:sp>
@@ -7357,8 +7327,8 @@
         </p:nvSpPr>
         <p:spPr>
           <a:xfrm>
-            <a:off x="9782323" y="2175337"/>
-            <a:ext cx="720000" cy="252000"/>
+            <a:off x="7309083" y="2054801"/>
+            <a:ext cx="576000" cy="189000"/>
           </a:xfrm>
           <a:prstGeom prst="rect">
             <a:avLst/>
@@ -7394,7 +7364,7 @@
           <a:p>
             <a:pPr algn="ctr"/>
             <a:r>
-              <a:rPr lang="es-ES" sz="1050" dirty="0">
+              <a:rPr lang="es-ES" sz="788" dirty="0">
                 <a:solidFill>
                   <a:schemeClr val="bg1"/>
                 </a:solidFill>
@@ -7404,7 +7374,7 @@
               <a:t>a</a:t>
             </a:r>
             <a:r>
-              <a:rPr lang="es-ES" sz="1050" dirty="0" smtClean="0">
+              <a:rPr lang="es-ES" sz="788" dirty="0">
                 <a:solidFill>
                   <a:schemeClr val="bg1"/>
                 </a:solidFill>
@@ -7413,7 +7383,7 @@
               </a:rPr>
               <a:t>mplitud</a:t>
             </a:r>
-            <a:endParaRPr lang="es-ES" sz="1050" dirty="0">
+            <a:endParaRPr lang="es-ES" sz="788" dirty="0">
               <a:solidFill>
                 <a:schemeClr val="bg1"/>
               </a:solidFill>
@@ -7431,8 +7401,8 @@
         </p:nvSpPr>
         <p:spPr>
           <a:xfrm>
-            <a:off x="10637788" y="2175337"/>
-            <a:ext cx="648000" cy="252000"/>
+            <a:off x="7956587" y="2054801"/>
+            <a:ext cx="540000" cy="189000"/>
           </a:xfrm>
           <a:prstGeom prst="rect">
             <a:avLst/>
@@ -7468,7 +7438,7 @@
           <a:p>
             <a:pPr algn="ctr"/>
             <a:r>
-              <a:rPr lang="es-ES" sz="1050" dirty="0" smtClean="0">
+              <a:rPr lang="es-ES" sz="788" dirty="0">
                 <a:solidFill>
                   <a:schemeClr val="bg1"/>
                 </a:solidFill>
@@ -7477,7 +7447,7 @@
               </a:rPr>
               <a:t>periodo</a:t>
             </a:r>
-            <a:endParaRPr lang="es-ES" sz="1050" dirty="0">
+            <a:endParaRPr lang="es-ES" sz="788" dirty="0">
               <a:solidFill>
                 <a:schemeClr val="bg1"/>
               </a:solidFill>
@@ -7495,8 +7465,8 @@
         </p:nvSpPr>
         <p:spPr>
           <a:xfrm>
-            <a:off x="11414362" y="2175337"/>
-            <a:ext cx="684000" cy="252000"/>
+            <a:off x="8528516" y="2054801"/>
+            <a:ext cx="540000" cy="189000"/>
           </a:xfrm>
           <a:prstGeom prst="rect">
             <a:avLst/>
@@ -7532,7 +7502,7 @@
           <a:p>
             <a:pPr algn="ctr"/>
             <a:r>
-              <a:rPr lang="es-ES" sz="1050" dirty="0">
+              <a:rPr lang="es-ES" sz="788" dirty="0">
                 <a:solidFill>
                   <a:schemeClr val="bg1"/>
                 </a:solidFill>
@@ -7542,7 +7512,7 @@
               <a:t>d</a:t>
             </a:r>
             <a:r>
-              <a:rPr lang="es-ES" sz="1050" dirty="0" smtClean="0">
+              <a:rPr lang="es-ES" sz="788" dirty="0">
                 <a:solidFill>
                   <a:schemeClr val="bg1"/>
                 </a:solidFill>
@@ -7551,7 +7521,7 @@
               </a:rPr>
               <a:t>esfase</a:t>
             </a:r>
-            <a:endParaRPr lang="es-ES" sz="1050" dirty="0">
+            <a:endParaRPr lang="es-ES" sz="788" dirty="0">
               <a:solidFill>
                 <a:schemeClr val="bg1"/>
               </a:solidFill>
@@ -7572,8 +7542,8 @@
         </p:nvCxnSpPr>
         <p:spPr>
           <a:xfrm rot="5400000">
-            <a:off x="7813973" y="618483"/>
-            <a:ext cx="362867" cy="2750840"/>
+            <a:off x="5836052" y="896382"/>
+            <a:ext cx="241258" cy="2075581"/>
           </a:xfrm>
           <a:prstGeom prst="bentConnector3">
             <a:avLst>
@@ -7612,8 +7582,8 @@
         </p:nvCxnSpPr>
         <p:spPr>
           <a:xfrm rot="5400000">
-            <a:off x="8399218" y="1203728"/>
-            <a:ext cx="362867" cy="1580351"/>
+            <a:off x="6293684" y="1354014"/>
+            <a:ext cx="241258" cy="1160317"/>
           </a:xfrm>
           <a:prstGeom prst="bentConnector3">
             <a:avLst>
@@ -7652,12 +7622,12 @@
         </p:nvCxnSpPr>
         <p:spPr>
           <a:xfrm rot="5400000">
-            <a:off x="9059656" y="1810166"/>
-            <a:ext cx="308867" cy="313475"/>
+            <a:off x="6771610" y="1831940"/>
+            <a:ext cx="241258" cy="204464"/>
           </a:xfrm>
           <a:prstGeom prst="bentConnector3">
             <a:avLst>
-              <a:gd name="adj1" fmla="val 58379"/>
+              <a:gd name="adj1" fmla="val 50000"/>
             </a:avLst>
           </a:prstGeom>
           <a:ln w="12700">
@@ -7692,8 +7662,8 @@
         </p:nvCxnSpPr>
         <p:spPr>
           <a:xfrm rot="16200000" flipH="1">
-            <a:off x="9575141" y="1608154"/>
-            <a:ext cx="362867" cy="771497"/>
+            <a:off x="7175148" y="1632866"/>
+            <a:ext cx="241258" cy="602612"/>
           </a:xfrm>
           <a:prstGeom prst="bentConnector3">
             <a:avLst>
@@ -7732,8 +7702,8 @@
         </p:nvCxnSpPr>
         <p:spPr>
           <a:xfrm rot="16200000" flipH="1">
-            <a:off x="9984874" y="1198422"/>
-            <a:ext cx="362867" cy="1590962"/>
+            <a:off x="7489900" y="1318114"/>
+            <a:ext cx="241258" cy="1232116"/>
           </a:xfrm>
           <a:prstGeom prst="bentConnector3">
             <a:avLst>
@@ -7772,8 +7742,8 @@
         </p:nvCxnSpPr>
         <p:spPr>
           <a:xfrm rot="16200000" flipH="1">
-            <a:off x="10382161" y="801135"/>
-            <a:ext cx="362867" cy="2385536"/>
+            <a:off x="7775864" y="1032149"/>
+            <a:ext cx="241258" cy="1804045"/>
           </a:xfrm>
           <a:prstGeom prst="bentConnector3">
             <a:avLst>
@@ -7809,8 +7779,8 @@
         </p:nvSpPr>
         <p:spPr>
           <a:xfrm>
-            <a:off x="5920326" y="2793973"/>
-            <a:ext cx="684000" cy="216000"/>
+            <a:off x="4250466" y="2443779"/>
+            <a:ext cx="576000" cy="162000"/>
           </a:xfrm>
           <a:prstGeom prst="rect">
             <a:avLst/>
@@ -7846,7 +7816,7 @@
           <a:p>
             <a:pPr algn="ctr"/>
             <a:r>
-              <a:rPr lang="es-ES" sz="900" dirty="0" smtClean="0">
+              <a:rPr lang="es-ES" sz="675" dirty="0">
                 <a:solidFill>
                   <a:schemeClr val="tx1"/>
                 </a:solidFill>
@@ -7855,7 +7825,7 @@
               </a:rPr>
               <a:t>horizontal</a:t>
             </a:r>
-            <a:endParaRPr lang="es-ES" sz="900" dirty="0">
+            <a:endParaRPr lang="es-ES" sz="675" dirty="0">
               <a:solidFill>
                 <a:schemeClr val="tx1"/>
               </a:solidFill>
@@ -7873,8 +7843,8 @@
         </p:nvSpPr>
         <p:spPr>
           <a:xfrm>
-            <a:off x="6670839" y="2793973"/>
-            <a:ext cx="576000" cy="216000"/>
+            <a:off x="4977249" y="2443779"/>
+            <a:ext cx="468000" cy="162000"/>
           </a:xfrm>
           <a:prstGeom prst="rect">
             <a:avLst/>
@@ -7910,7 +7880,7 @@
           <a:p>
             <a:pPr algn="ctr"/>
             <a:r>
-              <a:rPr lang="es-ES" sz="900" dirty="0" smtClean="0">
+              <a:rPr lang="es-ES" sz="675" dirty="0">
                 <a:solidFill>
                   <a:schemeClr val="tx1"/>
                 </a:solidFill>
@@ -7919,7 +7889,7 @@
               </a:rPr>
               <a:t>vertical</a:t>
             </a:r>
-            <a:endParaRPr lang="es-ES" sz="900" dirty="0">
+            <a:endParaRPr lang="es-ES" sz="675" dirty="0">
               <a:solidFill>
                 <a:schemeClr val="tx1"/>
               </a:solidFill>
@@ -7940,8 +7910,8 @@
         </p:nvCxnSpPr>
         <p:spPr>
           <a:xfrm rot="5400000">
-            <a:off x="6257838" y="2431825"/>
-            <a:ext cx="366636" cy="357660"/>
+            <a:off x="4628689" y="2153578"/>
+            <a:ext cx="199978" cy="380424"/>
           </a:xfrm>
           <a:prstGeom prst="bentConnector3">
             <a:avLst>
@@ -7980,8 +7950,8 @@
         </p:nvCxnSpPr>
         <p:spPr>
           <a:xfrm rot="16200000" flipH="1">
-            <a:off x="6606094" y="2441228"/>
-            <a:ext cx="366636" cy="338853"/>
+            <a:off x="4965080" y="2197610"/>
+            <a:ext cx="199978" cy="292359"/>
           </a:xfrm>
           <a:prstGeom prst="bentConnector3">
             <a:avLst>
@@ -8017,8 +7987,8 @@
         </p:nvSpPr>
         <p:spPr>
           <a:xfrm>
-            <a:off x="5956326" y="3197967"/>
-            <a:ext cx="612000" cy="252000"/>
+            <a:off x="4286466" y="2746774"/>
+            <a:ext cx="504000" cy="189000"/>
           </a:xfrm>
           <a:prstGeom prst="rect">
             <a:avLst/>
@@ -8052,7 +8022,7 @@
           <a:p>
             <a:pPr algn="ctr"/>
             <a:r>
-              <a:rPr lang="es-ES" sz="900" i="1" dirty="0" smtClean="0">
+              <a:rPr lang="es-ES" sz="675" i="1" dirty="0">
                 <a:solidFill>
                   <a:schemeClr val="tx1"/>
                 </a:solidFill>
@@ -8062,7 +8032,7 @@
               <a:t>f</a:t>
             </a:r>
             <a:r>
-              <a:rPr lang="es-ES" sz="900" dirty="0" smtClean="0">
+              <a:rPr lang="es-ES" sz="675" dirty="0">
                 <a:solidFill>
                   <a:schemeClr val="tx1"/>
                 </a:solidFill>
@@ -8072,7 +8042,7 @@
               <a:t> (</a:t>
             </a:r>
             <a:r>
-              <a:rPr lang="es-ES" sz="900" i="1" dirty="0" smtClean="0">
+              <a:rPr lang="es-ES" sz="675" i="1" dirty="0">
                 <a:solidFill>
                   <a:schemeClr val="tx1"/>
                 </a:solidFill>
@@ -8082,7 +8052,7 @@
               <a:t>x</a:t>
             </a:r>
             <a:r>
-              <a:rPr lang="es-ES" sz="900" dirty="0" smtClean="0">
+              <a:rPr lang="es-ES" sz="675" dirty="0">
                 <a:solidFill>
                   <a:schemeClr val="tx1"/>
                 </a:solidFill>
@@ -8092,7 +8062,7 @@
               <a:t> + </a:t>
             </a:r>
             <a:r>
-              <a:rPr lang="es-ES" sz="900" i="1" dirty="0" smtClean="0">
+              <a:rPr lang="es-ES" sz="675" i="1" dirty="0">
                 <a:solidFill>
                   <a:schemeClr val="tx1"/>
                 </a:solidFill>
@@ -8102,7 +8072,7 @@
               <a:t>D</a:t>
             </a:r>
             <a:r>
-              <a:rPr lang="es-ES" sz="900" dirty="0" smtClean="0">
+              <a:rPr lang="es-ES" sz="675" dirty="0">
                 <a:solidFill>
                   <a:schemeClr val="tx1"/>
                 </a:solidFill>
@@ -8111,7 +8081,7 @@
               </a:rPr>
               <a:t>)</a:t>
             </a:r>
-            <a:endParaRPr lang="es-ES" sz="900" i="1" dirty="0">
+            <a:endParaRPr lang="es-ES" sz="675" i="1" dirty="0">
               <a:solidFill>
                 <a:schemeClr val="tx1"/>
               </a:solidFill>
@@ -8129,8 +8099,8 @@
         </p:nvSpPr>
         <p:spPr>
           <a:xfrm>
-            <a:off x="6652839" y="3194808"/>
-            <a:ext cx="612000" cy="252000"/>
+            <a:off x="4963749" y="2744405"/>
+            <a:ext cx="504000" cy="189000"/>
           </a:xfrm>
           <a:prstGeom prst="rect">
             <a:avLst/>
@@ -8164,7 +8134,7 @@
           <a:p>
             <a:pPr algn="ctr"/>
             <a:r>
-              <a:rPr lang="es-ES" sz="900" i="1" dirty="0" smtClean="0">
+              <a:rPr lang="es-ES" sz="675" i="1" dirty="0">
                 <a:solidFill>
                   <a:schemeClr val="tx1"/>
                 </a:solidFill>
@@ -8174,7 +8144,7 @@
               <a:t>f</a:t>
             </a:r>
             <a:r>
-              <a:rPr lang="es-ES" sz="900" dirty="0" smtClean="0">
+              <a:rPr lang="es-ES" sz="675" dirty="0">
                 <a:solidFill>
                   <a:schemeClr val="tx1"/>
                 </a:solidFill>
@@ -8184,7 +8154,7 @@
               <a:t> (</a:t>
             </a:r>
             <a:r>
-              <a:rPr lang="es-ES" sz="900" i="1" dirty="0" smtClean="0">
+              <a:rPr lang="es-ES" sz="675" i="1" dirty="0">
                 <a:solidFill>
                   <a:schemeClr val="tx1"/>
                 </a:solidFill>
@@ -8194,7 +8164,7 @@
               <a:t>x</a:t>
             </a:r>
             <a:r>
-              <a:rPr lang="es-ES" sz="900" dirty="0" smtClean="0">
+              <a:rPr lang="es-ES" sz="675" dirty="0">
                 <a:solidFill>
                   <a:schemeClr val="tx1"/>
                 </a:solidFill>
@@ -8204,7 +8174,7 @@
               <a:t>) + </a:t>
             </a:r>
             <a:r>
-              <a:rPr lang="es-ES" sz="900" i="1" dirty="0" smtClean="0">
+              <a:rPr lang="es-ES" sz="675" i="1" dirty="0">
                 <a:solidFill>
                   <a:schemeClr val="tx1"/>
                 </a:solidFill>
@@ -8213,7 +8183,7 @@
               </a:rPr>
               <a:t>C</a:t>
             </a:r>
-            <a:endParaRPr lang="es-ES" sz="900" i="1" dirty="0">
+            <a:endParaRPr lang="es-ES" sz="675" i="1" dirty="0">
               <a:solidFill>
                 <a:schemeClr val="tx1"/>
               </a:solidFill>
@@ -8234,8 +8204,8 @@
         </p:nvCxnSpPr>
         <p:spPr>
           <a:xfrm>
-            <a:off x="6262326" y="3009973"/>
-            <a:ext cx="0" cy="187994"/>
+            <a:off x="4538466" y="2605779"/>
+            <a:ext cx="0" cy="140995"/>
           </a:xfrm>
           <a:prstGeom prst="line">
             <a:avLst/>
@@ -8272,8 +8242,8 @@
         </p:nvCxnSpPr>
         <p:spPr>
           <a:xfrm>
-            <a:off x="6958839" y="3009973"/>
-            <a:ext cx="0" cy="184835"/>
+            <a:off x="5211249" y="2605779"/>
+            <a:ext cx="4500" cy="138626"/>
           </a:xfrm>
           <a:prstGeom prst="line">
             <a:avLst/>
@@ -8307,8 +8277,8 @@
         </p:nvSpPr>
         <p:spPr>
           <a:xfrm>
-            <a:off x="7383605" y="3230808"/>
-            <a:ext cx="252000" cy="216000"/>
+            <a:off x="5508446" y="3090580"/>
+            <a:ext cx="189000" cy="162000"/>
           </a:xfrm>
           <a:prstGeom prst="rect">
             <a:avLst/>
@@ -8344,7 +8314,7 @@
           <a:p>
             <a:pPr algn="ctr"/>
             <a:r>
-              <a:rPr lang="es-ES" sz="900" dirty="0" smtClean="0">
+              <a:rPr lang="es-ES" sz="675" dirty="0">
                 <a:solidFill>
                   <a:schemeClr val="tx1"/>
                 </a:solidFill>
@@ -8353,7 +8323,7 @@
               </a:rPr>
               <a:t>X</a:t>
             </a:r>
-            <a:endParaRPr lang="es-ES" sz="900" dirty="0">
+            <a:endParaRPr lang="es-ES" sz="675" dirty="0">
               <a:solidFill>
                 <a:schemeClr val="tx1"/>
               </a:solidFill>
@@ -8371,8 +8341,8 @@
         </p:nvSpPr>
         <p:spPr>
           <a:xfrm>
-            <a:off x="7357689" y="2651305"/>
-            <a:ext cx="865572" cy="369332"/>
+            <a:off x="5509639" y="2388532"/>
+            <a:ext cx="649179" cy="403957"/>
           </a:xfrm>
           <a:prstGeom prst="rect">
             <a:avLst/>
@@ -8387,13 +8357,13 @@
           <a:p>
             <a:pPr algn="ctr"/>
             <a:r>
-              <a:rPr lang="es-ES" sz="900" dirty="0" smtClean="0">
+              <a:rPr lang="es-ES" sz="675" dirty="0">
                 <a:latin typeface="Arial" panose="020B0604020202020204" pitchFamily="34" charset="0"/>
                 <a:cs typeface="Arial" panose="020B0604020202020204" pitchFamily="34" charset="0"/>
               </a:rPr>
               <a:t>con respecto al eje</a:t>
             </a:r>
-            <a:endParaRPr lang="es-ES" sz="900" dirty="0">
+            <a:endParaRPr lang="es-ES" sz="675" dirty="0">
               <a:latin typeface="Arial" panose="020B0604020202020204" pitchFamily="34" charset="0"/>
               <a:cs typeface="Arial" panose="020B0604020202020204" pitchFamily="34" charset="0"/>
             </a:endParaRPr>
@@ -8411,8 +8381,8 @@
         </p:nvCxnSpPr>
         <p:spPr>
           <a:xfrm>
-            <a:off x="7790475" y="2427337"/>
-            <a:ext cx="0" cy="223968"/>
+            <a:off x="5834154" y="2243801"/>
+            <a:ext cx="75" cy="144731"/>
           </a:xfrm>
           <a:prstGeom prst="line">
             <a:avLst/>
@@ -8446,8 +8416,8 @@
         </p:nvSpPr>
         <p:spPr>
           <a:xfrm>
-            <a:off x="7943007" y="3230808"/>
-            <a:ext cx="252000" cy="216000"/>
+            <a:off x="5927997" y="3090580"/>
+            <a:ext cx="189000" cy="162000"/>
           </a:xfrm>
           <a:prstGeom prst="rect">
             <a:avLst/>
@@ -8483,7 +8453,7 @@
           <a:p>
             <a:pPr algn="ctr"/>
             <a:r>
-              <a:rPr lang="es-ES" sz="900" dirty="0" smtClean="0">
+              <a:rPr lang="es-ES" sz="675" dirty="0">
                 <a:solidFill>
                   <a:schemeClr val="tx1"/>
                 </a:solidFill>
@@ -8492,7 +8462,7 @@
               </a:rPr>
               <a:t>Y</a:t>
             </a:r>
-            <a:endParaRPr lang="es-ES" sz="900" dirty="0">
+            <a:endParaRPr lang="es-ES" sz="675" dirty="0">
               <a:solidFill>
                 <a:schemeClr val="tx1"/>
               </a:solidFill>
@@ -8513,8 +8483,8 @@
         </p:nvCxnSpPr>
         <p:spPr>
           <a:xfrm rot="16200000" flipH="1">
-            <a:off x="7824656" y="2986456"/>
-            <a:ext cx="210171" cy="278532"/>
+            <a:off x="5779318" y="2847400"/>
+            <a:ext cx="298091" cy="188268"/>
           </a:xfrm>
           <a:prstGeom prst="bentConnector3">
             <a:avLst>
@@ -8553,8 +8523,8 @@
         </p:nvCxnSpPr>
         <p:spPr>
           <a:xfrm rot="5400000">
-            <a:off x="7544955" y="2985287"/>
-            <a:ext cx="210171" cy="280870"/>
+            <a:off x="5569543" y="2825893"/>
+            <a:ext cx="298091" cy="231283"/>
           </a:xfrm>
           <a:prstGeom prst="bentConnector3">
             <a:avLst>
@@ -8590,8 +8560,8 @@
         </p:nvSpPr>
         <p:spPr>
           <a:xfrm>
-            <a:off x="7275605" y="3670474"/>
-            <a:ext cx="468000" cy="252000"/>
+            <a:off x="5404946" y="3420330"/>
+            <a:ext cx="396000" cy="189000"/>
           </a:xfrm>
           <a:prstGeom prst="rect">
             <a:avLst/>
@@ -8625,7 +8595,7 @@
           <a:p>
             <a:pPr algn="ctr"/>
             <a:r>
-              <a:rPr lang="es-ES" sz="900" i="1" dirty="0" smtClean="0">
+              <a:rPr lang="es-ES" sz="675" i="1" dirty="0">
                 <a:solidFill>
                   <a:schemeClr val="tx1"/>
                 </a:solidFill>
@@ -8635,7 +8605,7 @@
               <a:t>f</a:t>
             </a:r>
             <a:r>
-              <a:rPr lang="es-ES" sz="900" dirty="0" smtClean="0">
+              <a:rPr lang="es-ES" sz="675" dirty="0">
                 <a:solidFill>
                   <a:schemeClr val="tx1"/>
                 </a:solidFill>
@@ -8645,11 +8615,11 @@
               <a:t> (</a:t>
             </a:r>
             <a:r>
-              <a:rPr lang="es-CO" sz="900" dirty="0"/>
+              <a:rPr lang="es-CO" sz="675" dirty="0"/>
               <a:t>– </a:t>
             </a:r>
             <a:r>
-              <a:rPr lang="es-ES" sz="900" i="1" dirty="0" smtClean="0">
+              <a:rPr lang="es-ES" sz="675" i="1" dirty="0">
                 <a:solidFill>
                   <a:schemeClr val="tx1"/>
                 </a:solidFill>
@@ -8659,7 +8629,7 @@
               <a:t>x</a:t>
             </a:r>
             <a:r>
-              <a:rPr lang="es-ES" sz="900" dirty="0" smtClean="0">
+              <a:rPr lang="es-ES" sz="675" dirty="0">
                 <a:solidFill>
                   <a:schemeClr val="tx1"/>
                 </a:solidFill>
@@ -8668,7 +8638,7 @@
               </a:rPr>
               <a:t>)</a:t>
             </a:r>
-            <a:endParaRPr lang="es-ES" sz="900" i="1" dirty="0">
+            <a:endParaRPr lang="es-ES" sz="675" i="1" dirty="0">
               <a:solidFill>
                 <a:schemeClr val="tx1"/>
               </a:solidFill>
@@ -8689,8 +8659,8 @@
         </p:nvCxnSpPr>
         <p:spPr>
           <a:xfrm>
-            <a:off x="7509605" y="3446808"/>
-            <a:ext cx="0" cy="223666"/>
+            <a:off x="5602946" y="3252580"/>
+            <a:ext cx="0" cy="167750"/>
           </a:xfrm>
           <a:prstGeom prst="line">
             <a:avLst/>
@@ -8724,8 +8694,8 @@
         </p:nvSpPr>
         <p:spPr>
           <a:xfrm>
-            <a:off x="7835007" y="3670474"/>
-            <a:ext cx="468000" cy="252000"/>
+            <a:off x="5824497" y="3420330"/>
+            <a:ext cx="396000" cy="189000"/>
           </a:xfrm>
           <a:prstGeom prst="rect">
             <a:avLst/>
@@ -8759,11 +8729,11 @@
           <a:p>
             <a:pPr algn="ctr"/>
             <a:r>
-              <a:rPr lang="es-CO" sz="900" dirty="0"/>
+              <a:rPr lang="es-CO" sz="675" dirty="0"/>
               <a:t>– </a:t>
             </a:r>
             <a:r>
-              <a:rPr lang="es-ES" sz="900" i="1" dirty="0" smtClean="0">
+              <a:rPr lang="es-ES" sz="675" i="1" dirty="0">
                 <a:solidFill>
                   <a:schemeClr val="tx1"/>
                 </a:solidFill>
@@ -8773,7 +8743,7 @@
               <a:t>f</a:t>
             </a:r>
             <a:r>
-              <a:rPr lang="es-ES" sz="900" dirty="0" smtClean="0">
+              <a:rPr lang="es-ES" sz="675" dirty="0">
                 <a:solidFill>
                   <a:schemeClr val="tx1"/>
                 </a:solidFill>
@@ -8783,7 +8753,7 @@
               <a:t> (</a:t>
             </a:r>
             <a:r>
-              <a:rPr lang="es-ES" sz="900" i="1" dirty="0" smtClean="0">
+              <a:rPr lang="es-ES" sz="675" i="1" dirty="0">
                 <a:solidFill>
                   <a:schemeClr val="tx1"/>
                 </a:solidFill>
@@ -8793,7 +8763,7 @@
               <a:t>x</a:t>
             </a:r>
             <a:r>
-              <a:rPr lang="es-ES" sz="900" dirty="0" smtClean="0">
+              <a:rPr lang="es-ES" sz="675" dirty="0">
                 <a:solidFill>
                   <a:schemeClr val="tx1"/>
                 </a:solidFill>
@@ -8802,7 +8772,7 @@
               </a:rPr>
               <a:t>)</a:t>
             </a:r>
-            <a:endParaRPr lang="es-ES" sz="900" i="1" dirty="0">
+            <a:endParaRPr lang="es-ES" sz="675" i="1" dirty="0">
               <a:solidFill>
                 <a:schemeClr val="tx1"/>
               </a:solidFill>
@@ -8823,8 +8793,8 @@
         </p:nvCxnSpPr>
         <p:spPr>
           <a:xfrm>
-            <a:off x="8069007" y="3446808"/>
-            <a:ext cx="0" cy="223666"/>
+            <a:off x="6022497" y="3252580"/>
+            <a:ext cx="0" cy="167750"/>
           </a:xfrm>
           <a:prstGeom prst="line">
             <a:avLst/>
@@ -8858,8 +8828,8 @@
         </p:nvSpPr>
         <p:spPr>
           <a:xfrm>
-            <a:off x="8355103" y="2876095"/>
-            <a:ext cx="684000" cy="216000"/>
+            <a:off x="6188691" y="2479490"/>
+            <a:ext cx="576000" cy="162000"/>
           </a:xfrm>
           <a:prstGeom prst="rect">
             <a:avLst/>
@@ -8895,7 +8865,7 @@
           <a:p>
             <a:pPr algn="ctr"/>
             <a:r>
-              <a:rPr lang="es-ES" sz="900" dirty="0" smtClean="0">
+              <a:rPr lang="es-ES" sz="675" dirty="0">
                 <a:solidFill>
                   <a:schemeClr val="tx1"/>
                 </a:solidFill>
@@ -8904,7 +8874,7 @@
               </a:rPr>
               <a:t>horizontal</a:t>
             </a:r>
-            <a:endParaRPr lang="es-ES" sz="900" dirty="0">
+            <a:endParaRPr lang="es-ES" sz="675" dirty="0">
               <a:solidFill>
                 <a:schemeClr val="tx1"/>
               </a:solidFill>
@@ -8922,8 +8892,8 @@
         </p:nvSpPr>
         <p:spPr>
           <a:xfrm>
-            <a:off x="9105616" y="2876095"/>
-            <a:ext cx="576000" cy="216000"/>
+            <a:off x="6787956" y="2479490"/>
+            <a:ext cx="468000" cy="162000"/>
           </a:xfrm>
           <a:prstGeom prst="rect">
             <a:avLst/>
@@ -8959,7 +8929,7 @@
           <a:p>
             <a:pPr algn="ctr"/>
             <a:r>
-              <a:rPr lang="es-ES" sz="900" dirty="0" smtClean="0">
+              <a:rPr lang="es-ES" sz="675" dirty="0">
                 <a:solidFill>
                   <a:schemeClr val="tx1"/>
                 </a:solidFill>
@@ -8968,7 +8938,7 @@
               </a:rPr>
               <a:t>vertical</a:t>
             </a:r>
-            <a:endParaRPr lang="es-ES" sz="900" dirty="0">
+            <a:endParaRPr lang="es-ES" sz="675" dirty="0">
               <a:solidFill>
                 <a:schemeClr val="tx1"/>
               </a:solidFill>
@@ -8989,8 +8959,8 @@
         </p:nvCxnSpPr>
         <p:spPr>
           <a:xfrm rot="5400000">
-            <a:off x="8679848" y="2498592"/>
-            <a:ext cx="394758" cy="360248"/>
+            <a:off x="6556005" y="2245487"/>
+            <a:ext cx="154689" cy="313316"/>
           </a:xfrm>
           <a:prstGeom prst="bentConnector3">
             <a:avLst>
@@ -9029,8 +8999,8 @@
         </p:nvCxnSpPr>
         <p:spPr>
           <a:xfrm rot="16200000" flipH="1">
-            <a:off x="9028104" y="2510583"/>
-            <a:ext cx="394758" cy="336265"/>
+            <a:off x="6828637" y="2286170"/>
+            <a:ext cx="154689" cy="231949"/>
           </a:xfrm>
           <a:prstGeom prst="bentConnector3">
             <a:avLst>
@@ -9066,8 +9036,8 @@
         </p:nvSpPr>
         <p:spPr>
           <a:xfrm>
-            <a:off x="8391103" y="3280089"/>
-            <a:ext cx="612000" cy="252000"/>
+            <a:off x="6247191" y="2782486"/>
+            <a:ext cx="459000" cy="189000"/>
           </a:xfrm>
           <a:prstGeom prst="rect">
             <a:avLst/>
@@ -9101,7 +9071,7 @@
           <a:p>
             <a:pPr algn="ctr"/>
             <a:r>
-              <a:rPr lang="es-ES" sz="900" i="1" dirty="0" smtClean="0">
+              <a:rPr lang="es-ES" sz="675" i="1" dirty="0">
                 <a:solidFill>
                   <a:schemeClr val="tx1"/>
                 </a:solidFill>
@@ -9111,7 +9081,7 @@
               <a:t>f</a:t>
             </a:r>
             <a:r>
-              <a:rPr lang="es-ES" sz="900" dirty="0" smtClean="0">
+              <a:rPr lang="es-ES" sz="675" dirty="0">
                 <a:solidFill>
                   <a:schemeClr val="tx1"/>
                 </a:solidFill>
@@ -9121,7 +9091,7 @@
               <a:t> (</a:t>
             </a:r>
             <a:r>
-              <a:rPr lang="es-ES" sz="900" i="1" dirty="0" err="1" smtClean="0">
+              <a:rPr lang="es-ES" sz="675" i="1" dirty="0" err="1">
                 <a:solidFill>
                   <a:schemeClr val="tx1"/>
                 </a:solidFill>
@@ -9131,7 +9101,7 @@
               <a:t>Ax</a:t>
             </a:r>
             <a:r>
-              <a:rPr lang="es-ES" sz="900" dirty="0" smtClean="0">
+              <a:rPr lang="es-ES" sz="675" dirty="0">
                 <a:solidFill>
                   <a:schemeClr val="tx1"/>
                 </a:solidFill>
@@ -9140,7 +9110,7 @@
               </a:rPr>
               <a:t>)</a:t>
             </a:r>
-            <a:endParaRPr lang="es-ES" sz="900" i="1" dirty="0">
+            <a:endParaRPr lang="es-ES" sz="675" i="1" dirty="0">
               <a:solidFill>
                 <a:schemeClr val="tx1"/>
               </a:solidFill>
@@ -9158,8 +9128,8 @@
         </p:nvSpPr>
         <p:spPr>
           <a:xfrm>
-            <a:off x="9087616" y="3276930"/>
-            <a:ext cx="612000" cy="252000"/>
+            <a:off x="6792456" y="2780117"/>
+            <a:ext cx="459000" cy="189000"/>
           </a:xfrm>
           <a:prstGeom prst="rect">
             <a:avLst/>
@@ -9193,7 +9163,7 @@
           <a:p>
             <a:pPr algn="ctr"/>
             <a:r>
-              <a:rPr lang="es-ES" sz="900" i="1" dirty="0" err="1" smtClean="0">
+              <a:rPr lang="es-ES" sz="675" i="1" dirty="0" err="1">
                 <a:solidFill>
                   <a:schemeClr val="tx1"/>
                 </a:solidFill>
@@ -9203,7 +9173,7 @@
               <a:t>Bf</a:t>
             </a:r>
             <a:r>
-              <a:rPr lang="es-ES" sz="900" dirty="0" smtClean="0">
+              <a:rPr lang="es-ES" sz="675" dirty="0">
                 <a:solidFill>
                   <a:schemeClr val="tx1"/>
                 </a:solidFill>
@@ -9213,7 +9183,7 @@
               <a:t> (</a:t>
             </a:r>
             <a:r>
-              <a:rPr lang="es-ES" sz="900" i="1" dirty="0" smtClean="0">
+              <a:rPr lang="es-ES" sz="675" i="1" dirty="0">
                 <a:solidFill>
                   <a:schemeClr val="tx1"/>
                 </a:solidFill>
@@ -9223,7 +9193,7 @@
               <a:t>x</a:t>
             </a:r>
             <a:r>
-              <a:rPr lang="es-ES" sz="900" dirty="0" smtClean="0">
+              <a:rPr lang="es-ES" sz="675" dirty="0">
                 <a:solidFill>
                   <a:schemeClr val="tx1"/>
                 </a:solidFill>
@@ -9232,7 +9202,7 @@
               </a:rPr>
               <a:t>)</a:t>
             </a:r>
-            <a:endParaRPr lang="es-ES" sz="900" i="1" dirty="0">
+            <a:endParaRPr lang="es-ES" sz="675" i="1" dirty="0">
               <a:solidFill>
                 <a:schemeClr val="tx1"/>
               </a:solidFill>
@@ -9245,13 +9215,16 @@
       <p:cxnSp>
         <p:nvCxnSpPr>
           <p:cNvPr id="201" name="Conector recto 200"/>
-          <p:cNvCxnSpPr/>
+          <p:cNvCxnSpPr>
+            <a:stCxn id="195" idx="2"/>
+            <a:endCxn id="199" idx="0"/>
+          </p:cNvCxnSpPr>
           <p:nvPr/>
         </p:nvCxnSpPr>
         <p:spPr>
           <a:xfrm>
-            <a:off x="8757485" y="3092095"/>
-            <a:ext cx="0" cy="187994"/>
+            <a:off x="6476691" y="2641490"/>
+            <a:ext cx="0" cy="140996"/>
           </a:xfrm>
           <a:prstGeom prst="line">
             <a:avLst/>
@@ -9288,8 +9261,8 @@
         </p:nvCxnSpPr>
         <p:spPr>
           <a:xfrm>
-            <a:off x="9393616" y="3092095"/>
-            <a:ext cx="0" cy="184835"/>
+            <a:off x="7021956" y="2641490"/>
+            <a:ext cx="0" cy="138627"/>
           </a:xfrm>
           <a:prstGeom prst="line">
             <a:avLst/>
@@ -9323,8 +9296,8 @@
         </p:nvSpPr>
         <p:spPr>
           <a:xfrm>
-            <a:off x="9782323" y="2727970"/>
-            <a:ext cx="720000" cy="942503"/>
+            <a:off x="7291083" y="2429047"/>
+            <a:ext cx="612000" cy="706877"/>
           </a:xfrm>
           <a:prstGeom prst="rect">
             <a:avLst/>
@@ -9360,7 +9333,7 @@
           <a:p>
             <a:pPr algn="ctr"/>
             <a:r>
-              <a:rPr lang="es-ES" sz="900" dirty="0" smtClean="0">
+              <a:rPr lang="es-ES" sz="675" dirty="0">
                 <a:solidFill>
                   <a:schemeClr val="tx1"/>
                 </a:solidFill>
@@ -9369,7 +9342,7 @@
               </a:rPr>
               <a:t>magnitud de oscilación o amplitud de una curva</a:t>
             </a:r>
-            <a:endParaRPr lang="es-ES" sz="900" dirty="0">
+            <a:endParaRPr lang="es-ES" sz="675" dirty="0">
               <a:solidFill>
                 <a:schemeClr val="tx1"/>
               </a:solidFill>
@@ -9390,8 +9363,8 @@
         </p:nvCxnSpPr>
         <p:spPr>
           <a:xfrm>
-            <a:off x="10142323" y="2427337"/>
-            <a:ext cx="0" cy="300633"/>
+            <a:off x="7597083" y="2243801"/>
+            <a:ext cx="0" cy="185246"/>
           </a:xfrm>
           <a:prstGeom prst="line">
             <a:avLst/>
@@ -9425,8 +9398,8 @@
         </p:nvSpPr>
         <p:spPr>
           <a:xfrm>
-            <a:off x="10601789" y="2733866"/>
-            <a:ext cx="720000" cy="1076134"/>
+            <a:off x="7956587" y="2433468"/>
+            <a:ext cx="540000" cy="807101"/>
           </a:xfrm>
           <a:prstGeom prst="rect">
             <a:avLst/>
@@ -9462,7 +9435,7 @@
           <a:p>
             <a:pPr algn="ctr"/>
             <a:r>
-              <a:rPr lang="es-ES" sz="900" dirty="0" smtClean="0">
+              <a:rPr lang="es-ES" sz="675" dirty="0">
                 <a:solidFill>
                   <a:schemeClr val="tx1"/>
                 </a:solidFill>
@@ -9471,7 +9444,7 @@
               </a:rPr>
               <a:t>intervalo en el que se repite la porción principal de la gráfica</a:t>
             </a:r>
-            <a:endParaRPr lang="es-ES" sz="900" dirty="0">
+            <a:endParaRPr lang="es-ES" sz="675" dirty="0">
               <a:solidFill>
                 <a:schemeClr val="tx1"/>
               </a:solidFill>
@@ -9492,8 +9465,8 @@
         </p:nvCxnSpPr>
         <p:spPr>
           <a:xfrm>
-            <a:off x="10961788" y="2427337"/>
-            <a:ext cx="1" cy="306529"/>
+            <a:off x="8226587" y="2243801"/>
+            <a:ext cx="0" cy="189667"/>
           </a:xfrm>
           <a:prstGeom prst="line">
             <a:avLst/>
@@ -9527,8 +9500,8 @@
         </p:nvSpPr>
         <p:spPr>
           <a:xfrm>
-            <a:off x="11396362" y="2727971"/>
-            <a:ext cx="720000" cy="800960"/>
+            <a:off x="8528516" y="2429047"/>
+            <a:ext cx="540000" cy="600720"/>
           </a:xfrm>
           <a:prstGeom prst="rect">
             <a:avLst/>
@@ -9564,7 +9537,7 @@
           <a:p>
             <a:pPr algn="ctr"/>
             <a:r>
-              <a:rPr lang="es-ES" sz="900" dirty="0" smtClean="0">
+              <a:rPr lang="es-ES" sz="675" dirty="0">
                 <a:solidFill>
                   <a:schemeClr val="tx1"/>
                 </a:solidFill>
@@ -9573,7 +9546,7 @@
               </a:rPr>
               <a:t>qué tanto está corrido el inicio de la gráfica  </a:t>
             </a:r>
-            <a:endParaRPr lang="es-ES" sz="900" dirty="0">
+            <a:endParaRPr lang="es-ES" sz="675" dirty="0">
               <a:solidFill>
                 <a:schemeClr val="tx1"/>
               </a:solidFill>
@@ -9594,8 +9567,8 @@
         </p:nvCxnSpPr>
         <p:spPr>
           <a:xfrm>
-            <a:off x="11756362" y="2427337"/>
-            <a:ext cx="0" cy="300634"/>
+            <a:off x="8798516" y="2243801"/>
+            <a:ext cx="0" cy="185246"/>
           </a:xfrm>
           <a:prstGeom prst="line">
             <a:avLst/>
@@ -9629,8 +9602,8 @@
         </p:nvSpPr>
         <p:spPr>
           <a:xfrm>
-            <a:off x="9296984" y="3886473"/>
-            <a:ext cx="1690677" cy="360332"/>
+            <a:off x="6963079" y="3388017"/>
+            <a:ext cx="1268008" cy="270249"/>
           </a:xfrm>
           <a:prstGeom prst="rect">
             <a:avLst/>
@@ -9664,16 +9637,16 @@
           <a:p>
             <a:pPr algn="ctr"/>
             <a:r>
-              <a:rPr lang="es-CO" sz="900" dirty="0" smtClean="0">
+              <a:rPr lang="es-CO" sz="675" dirty="0">
                 <a:latin typeface="Calibri (Cuerpo)"/>
               </a:rPr>
               <a:t>|Valor máx. – Valor mín.| </a:t>
             </a:r>
             <a:r>
-              <a:rPr lang="es-ES" sz="900" dirty="0" smtClean="0"/>
+              <a:rPr lang="es-ES" sz="675" dirty="0"/>
               <a:t>÷2</a:t>
             </a:r>
-            <a:endParaRPr lang="es-ES" sz="900" dirty="0">
+            <a:endParaRPr lang="es-ES" sz="675" dirty="0">
               <a:solidFill>
                 <a:schemeClr val="tx1"/>
               </a:solidFill>
@@ -9694,8 +9667,8 @@
         </p:nvCxnSpPr>
         <p:spPr>
           <a:xfrm>
-            <a:off x="10142323" y="3670473"/>
-            <a:ext cx="0" cy="216000"/>
+            <a:off x="7597083" y="3135924"/>
+            <a:ext cx="0" cy="252093"/>
           </a:xfrm>
           <a:prstGeom prst="line">
             <a:avLst/>

</xml_diff>

<commit_message>
Ajustes de revisión Mapa y Competencial
</commit_message>
<xml_diff>
--- a/fuentes/contenidos/grado10/guion03/MA_10_03_CO_MapaConceptual.pptx
+++ b/fuentes/contenidos/grado10/guion03/MA_10_03_CO_MapaConceptual.pptx
@@ -243,7 +243,7 @@
           <a:p>
             <a:fld id="{C764DE79-268F-4C1A-8933-263129D2AF90}" type="datetimeFigureOut">
               <a:rPr lang="en-US" smtClean="0"/>
-              <a:t>6/15/2016</a:t>
+              <a:t>6/24/2016</a:t>
             </a:fld>
             <a:endParaRPr lang="en-US" dirty="0"/>
           </a:p>
@@ -413,7 +413,7 @@
           <a:p>
             <a:fld id="{C764DE79-268F-4C1A-8933-263129D2AF90}" type="datetimeFigureOut">
               <a:rPr lang="en-US" smtClean="0"/>
-              <a:t>6/15/2016</a:t>
+              <a:t>6/24/2016</a:t>
             </a:fld>
             <a:endParaRPr lang="en-US" dirty="0"/>
           </a:p>
@@ -593,7 +593,7 @@
           <a:p>
             <a:fld id="{C764DE79-268F-4C1A-8933-263129D2AF90}" type="datetimeFigureOut">
               <a:rPr lang="en-US" smtClean="0"/>
-              <a:t>6/15/2016</a:t>
+              <a:t>6/24/2016</a:t>
             </a:fld>
             <a:endParaRPr lang="en-US" dirty="0"/>
           </a:p>
@@ -1059,7 +1059,7 @@
           <a:p>
             <a:fld id="{C764DE79-268F-4C1A-8933-263129D2AF90}" type="datetimeFigureOut">
               <a:rPr lang="en-US" smtClean="0"/>
-              <a:t>6/15/2016</a:t>
+              <a:t>6/24/2016</a:t>
             </a:fld>
             <a:endParaRPr lang="en-US" dirty="0"/>
           </a:p>
@@ -1377,7 +1377,7 @@
           <a:p>
             <a:fld id="{C764DE79-268F-4C1A-8933-263129D2AF90}" type="datetimeFigureOut">
               <a:rPr lang="en-US" smtClean="0"/>
-              <a:t>6/15/2016</a:t>
+              <a:t>6/24/2016</a:t>
             </a:fld>
             <a:endParaRPr lang="en-US" dirty="0"/>
           </a:p>
@@ -1609,7 +1609,7 @@
           <a:p>
             <a:fld id="{C764DE79-268F-4C1A-8933-263129D2AF90}" type="datetimeFigureOut">
               <a:rPr lang="en-US" smtClean="0"/>
-              <a:t>6/15/2016</a:t>
+              <a:t>6/24/2016</a:t>
             </a:fld>
             <a:endParaRPr lang="en-US" dirty="0"/>
           </a:p>
@@ -1976,7 +1976,7 @@
           <a:p>
             <a:fld id="{C764DE79-268F-4C1A-8933-263129D2AF90}" type="datetimeFigureOut">
               <a:rPr lang="en-US" smtClean="0"/>
-              <a:t>6/15/2016</a:t>
+              <a:t>6/24/2016</a:t>
             </a:fld>
             <a:endParaRPr lang="en-US" dirty="0"/>
           </a:p>
@@ -2094,7 +2094,7 @@
           <a:p>
             <a:fld id="{C764DE79-268F-4C1A-8933-263129D2AF90}" type="datetimeFigureOut">
               <a:rPr lang="en-US" smtClean="0"/>
-              <a:t>6/15/2016</a:t>
+              <a:t>6/24/2016</a:t>
             </a:fld>
             <a:endParaRPr lang="en-US" dirty="0"/>
           </a:p>
@@ -2189,7 +2189,7 @@
           <a:p>
             <a:fld id="{5001C876-01F7-4317-94B9-1AE222133113}" type="datetimeFigureOut">
               <a:rPr lang="es-ES" smtClean="0"/>
-              <a:t>15/06/2016</a:t>
+              <a:t>24/06/2016</a:t>
             </a:fld>
             <a:endParaRPr lang="es-ES"/>
           </a:p>
@@ -2466,7 +2466,7 @@
           <a:p>
             <a:fld id="{C764DE79-268F-4C1A-8933-263129D2AF90}" type="datetimeFigureOut">
               <a:rPr lang="en-US" smtClean="0"/>
-              <a:t>6/15/2016</a:t>
+              <a:t>6/24/2016</a:t>
             </a:fld>
             <a:endParaRPr lang="en-US" dirty="0"/>
           </a:p>
@@ -2723,7 +2723,7 @@
           <a:p>
             <a:fld id="{C764DE79-268F-4C1A-8933-263129D2AF90}" type="datetimeFigureOut">
               <a:rPr lang="en-US" smtClean="0"/>
-              <a:t>6/15/2016</a:t>
+              <a:t>6/24/2016</a:t>
             </a:fld>
             <a:endParaRPr lang="en-US" dirty="0"/>
           </a:p>
@@ -2936,7 +2936,7 @@
           <a:p>
             <a:fld id="{C764DE79-268F-4C1A-8933-263129D2AF90}" type="datetimeFigureOut">
               <a:rPr lang="en-US" smtClean="0"/>
-              <a:t>6/15/2016</a:t>
+              <a:t>6/24/2016</a:t>
             </a:fld>
             <a:endParaRPr lang="en-US" dirty="0"/>
           </a:p>
@@ -3467,10 +3467,6 @@
               </a:rPr>
               <a:t>Las funciones trigonométricas</a:t>
             </a:r>
-            <a:endParaRPr lang="es-ES" sz="1200" dirty="0">
-              <a:latin typeface="Arial" panose="020B0604020202020204" pitchFamily="34" charset="0"/>
-              <a:cs typeface="Arial" panose="020B0604020202020204" pitchFamily="34" charset="0"/>
-            </a:endParaRPr>
           </a:p>
         </p:txBody>
       </p:sp>
@@ -3526,7 +3522,20 @@
                 <a:latin typeface="Arial" panose="020B0604020202020204" pitchFamily="34" charset="0"/>
                 <a:cs typeface="Arial" panose="020B0604020202020204" pitchFamily="34" charset="0"/>
               </a:rPr>
-              <a:t>s</a:t>
+              <a:t>seno</a:t>
+            </a:r>
+          </a:p>
+          <a:p>
+            <a:pPr algn="ctr"/>
+            <a:r>
+              <a:rPr lang="es-ES" sz="788" i="1" dirty="0">
+                <a:solidFill>
+                  <a:schemeClr val="bg1"/>
+                </a:solidFill>
+                <a:latin typeface="Arial" panose="020B0604020202020204" pitchFamily="34" charset="0"/>
+                <a:cs typeface="Arial" panose="020B0604020202020204" pitchFamily="34" charset="0"/>
+              </a:rPr>
+              <a:t>y</a:t>
             </a:r>
             <a:r>
               <a:rPr lang="es-ES" sz="788" dirty="0">
@@ -3536,11 +3545,28 @@
                 <a:latin typeface="Arial" panose="020B0604020202020204" pitchFamily="34" charset="0"/>
                 <a:cs typeface="Arial" panose="020B0604020202020204" pitchFamily="34" charset="0"/>
               </a:rPr>
-              <a:t>eno</a:t>
-            </a:r>
-          </a:p>
-          <a:p>
-            <a:pPr algn="ctr"/>
+              <a:t> = </a:t>
+            </a:r>
+            <a:r>
+              <a:rPr lang="es-ES" sz="788" dirty="0" err="1">
+                <a:solidFill>
+                  <a:schemeClr val="bg1"/>
+                </a:solidFill>
+                <a:latin typeface="Arial" panose="020B0604020202020204" pitchFamily="34" charset="0"/>
+                <a:cs typeface="Arial" panose="020B0604020202020204" pitchFamily="34" charset="0"/>
+              </a:rPr>
+              <a:t>sen</a:t>
+            </a:r>
+            <a:r>
+              <a:rPr lang="es-ES" sz="788" dirty="0">
+                <a:solidFill>
+                  <a:schemeClr val="bg1"/>
+                </a:solidFill>
+                <a:latin typeface="Arial" panose="020B0604020202020204" pitchFamily="34" charset="0"/>
+                <a:cs typeface="Arial" panose="020B0604020202020204" pitchFamily="34" charset="0"/>
+              </a:rPr>
+              <a:t> </a:t>
+            </a:r>
             <a:r>
               <a:rPr lang="es-ES" sz="788" i="1" dirty="0">
                 <a:solidFill>
@@ -3549,55 +3575,8 @@
                 <a:latin typeface="Arial" panose="020B0604020202020204" pitchFamily="34" charset="0"/>
                 <a:cs typeface="Arial" panose="020B0604020202020204" pitchFamily="34" charset="0"/>
               </a:rPr>
-              <a:t>y</a:t>
-            </a:r>
-            <a:r>
-              <a:rPr lang="es-ES" sz="788" dirty="0">
-                <a:solidFill>
-                  <a:schemeClr val="bg1"/>
-                </a:solidFill>
-                <a:latin typeface="Arial" panose="020B0604020202020204" pitchFamily="34" charset="0"/>
-                <a:cs typeface="Arial" panose="020B0604020202020204" pitchFamily="34" charset="0"/>
-              </a:rPr>
-              <a:t> = </a:t>
-            </a:r>
-            <a:r>
-              <a:rPr lang="es-ES" sz="788" dirty="0" err="1">
-                <a:solidFill>
-                  <a:schemeClr val="bg1"/>
-                </a:solidFill>
-                <a:latin typeface="Arial" panose="020B0604020202020204" pitchFamily="34" charset="0"/>
-                <a:cs typeface="Arial" panose="020B0604020202020204" pitchFamily="34" charset="0"/>
-              </a:rPr>
-              <a:t>sen</a:t>
-            </a:r>
-            <a:r>
-              <a:rPr lang="es-ES" sz="788" dirty="0">
-                <a:solidFill>
-                  <a:schemeClr val="bg1"/>
-                </a:solidFill>
-                <a:latin typeface="Arial" panose="020B0604020202020204" pitchFamily="34" charset="0"/>
-                <a:cs typeface="Arial" panose="020B0604020202020204" pitchFamily="34" charset="0"/>
-              </a:rPr>
-              <a:t> </a:t>
-            </a:r>
-            <a:r>
-              <a:rPr lang="es-ES" sz="788" i="1" dirty="0">
-                <a:solidFill>
-                  <a:schemeClr val="bg1"/>
-                </a:solidFill>
-                <a:latin typeface="Arial" panose="020B0604020202020204" pitchFamily="34" charset="0"/>
-                <a:cs typeface="Arial" panose="020B0604020202020204" pitchFamily="34" charset="0"/>
-              </a:rPr>
               <a:t>x</a:t>
             </a:r>
-            <a:endParaRPr lang="es-ES" sz="788" i="1" dirty="0">
-              <a:solidFill>
-                <a:schemeClr val="bg1"/>
-              </a:solidFill>
-              <a:latin typeface="Arial" panose="020B0604020202020204" pitchFamily="34" charset="0"/>
-              <a:cs typeface="Arial" panose="020B0604020202020204" pitchFamily="34" charset="0"/>
-            </a:endParaRPr>
           </a:p>
         </p:txBody>
       </p:sp>
@@ -3671,10 +3650,6 @@
               </a:rPr>
               <a:t>tiene</a:t>
             </a:r>
-            <a:endParaRPr lang="es-ES" sz="675" dirty="0">
-              <a:latin typeface="Arial" panose="020B0604020202020204" pitchFamily="34" charset="0"/>
-              <a:cs typeface="Arial" panose="020B0604020202020204" pitchFamily="34" charset="0"/>
-            </a:endParaRPr>
           </a:p>
         </p:txBody>
       </p:sp>
@@ -3867,7 +3842,20 @@
                 <a:latin typeface="Arial" panose="020B0604020202020204" pitchFamily="34" charset="0"/>
                 <a:cs typeface="Arial" panose="020B0604020202020204" pitchFamily="34" charset="0"/>
               </a:rPr>
-              <a:t>c</a:t>
+              <a:t>coseno</a:t>
+            </a:r>
+          </a:p>
+          <a:p>
+            <a:pPr algn="ctr"/>
+            <a:r>
+              <a:rPr lang="es-ES" sz="788" i="1" dirty="0">
+                <a:solidFill>
+                  <a:schemeClr val="bg1"/>
+                </a:solidFill>
+                <a:latin typeface="Arial" panose="020B0604020202020204" pitchFamily="34" charset="0"/>
+                <a:cs typeface="Arial" panose="020B0604020202020204" pitchFamily="34" charset="0"/>
+              </a:rPr>
+              <a:t>y</a:t>
             </a:r>
             <a:r>
               <a:rPr lang="es-ES" sz="788" dirty="0">
@@ -3877,11 +3865,28 @@
                 <a:latin typeface="Arial" panose="020B0604020202020204" pitchFamily="34" charset="0"/>
                 <a:cs typeface="Arial" panose="020B0604020202020204" pitchFamily="34" charset="0"/>
               </a:rPr>
-              <a:t>oseno</a:t>
-            </a:r>
-          </a:p>
-          <a:p>
-            <a:pPr algn="ctr"/>
+              <a:t> = </a:t>
+            </a:r>
+            <a:r>
+              <a:rPr lang="es-ES" sz="788" dirty="0" err="1">
+                <a:solidFill>
+                  <a:schemeClr val="bg1"/>
+                </a:solidFill>
+                <a:latin typeface="Arial" panose="020B0604020202020204" pitchFamily="34" charset="0"/>
+                <a:cs typeface="Arial" panose="020B0604020202020204" pitchFamily="34" charset="0"/>
+              </a:rPr>
+              <a:t>cos</a:t>
+            </a:r>
+            <a:r>
+              <a:rPr lang="es-ES" sz="788" dirty="0">
+                <a:solidFill>
+                  <a:schemeClr val="bg1"/>
+                </a:solidFill>
+                <a:latin typeface="Arial" panose="020B0604020202020204" pitchFamily="34" charset="0"/>
+                <a:cs typeface="Arial" panose="020B0604020202020204" pitchFamily="34" charset="0"/>
+              </a:rPr>
+              <a:t> </a:t>
+            </a:r>
             <a:r>
               <a:rPr lang="es-ES" sz="788" i="1" dirty="0">
                 <a:solidFill>
@@ -3890,55 +3895,8 @@
                 <a:latin typeface="Arial" panose="020B0604020202020204" pitchFamily="34" charset="0"/>
                 <a:cs typeface="Arial" panose="020B0604020202020204" pitchFamily="34" charset="0"/>
               </a:rPr>
-              <a:t>y</a:t>
-            </a:r>
-            <a:r>
-              <a:rPr lang="es-ES" sz="788" dirty="0">
-                <a:solidFill>
-                  <a:schemeClr val="bg1"/>
-                </a:solidFill>
-                <a:latin typeface="Arial" panose="020B0604020202020204" pitchFamily="34" charset="0"/>
-                <a:cs typeface="Arial" panose="020B0604020202020204" pitchFamily="34" charset="0"/>
-              </a:rPr>
-              <a:t> = </a:t>
-            </a:r>
-            <a:r>
-              <a:rPr lang="es-ES" sz="788" dirty="0" err="1">
-                <a:solidFill>
-                  <a:schemeClr val="bg1"/>
-                </a:solidFill>
-                <a:latin typeface="Arial" panose="020B0604020202020204" pitchFamily="34" charset="0"/>
-                <a:cs typeface="Arial" panose="020B0604020202020204" pitchFamily="34" charset="0"/>
-              </a:rPr>
-              <a:t>cos</a:t>
-            </a:r>
-            <a:r>
-              <a:rPr lang="es-ES" sz="788" dirty="0">
-                <a:solidFill>
-                  <a:schemeClr val="bg1"/>
-                </a:solidFill>
-                <a:latin typeface="Arial" panose="020B0604020202020204" pitchFamily="34" charset="0"/>
-                <a:cs typeface="Arial" panose="020B0604020202020204" pitchFamily="34" charset="0"/>
-              </a:rPr>
-              <a:t> </a:t>
-            </a:r>
-            <a:r>
-              <a:rPr lang="es-ES" sz="788" i="1" dirty="0">
-                <a:solidFill>
-                  <a:schemeClr val="bg1"/>
-                </a:solidFill>
-                <a:latin typeface="Arial" panose="020B0604020202020204" pitchFamily="34" charset="0"/>
-                <a:cs typeface="Arial" panose="020B0604020202020204" pitchFamily="34" charset="0"/>
-              </a:rPr>
               <a:t>x</a:t>
             </a:r>
-            <a:endParaRPr lang="es-ES" sz="788" i="1" dirty="0">
-              <a:solidFill>
-                <a:schemeClr val="bg1"/>
-              </a:solidFill>
-              <a:latin typeface="Arial" panose="020B0604020202020204" pitchFamily="34" charset="0"/>
-              <a:cs typeface="Arial" panose="020B0604020202020204" pitchFamily="34" charset="0"/>
-            </a:endParaRPr>
           </a:p>
         </p:txBody>
       </p:sp>
@@ -4038,10 +3996,6 @@
               </a:rPr>
               <a:t>Análisis de gráficas</a:t>
             </a:r>
-            <a:endParaRPr lang="es-ES" sz="900" b="1" dirty="0">
-              <a:latin typeface="Arial" panose="020B0604020202020204" pitchFamily="34" charset="0"/>
-              <a:cs typeface="Arial" panose="020B0604020202020204" pitchFamily="34" charset="0"/>
-            </a:endParaRPr>
           </a:p>
         </p:txBody>
       </p:sp>
@@ -4326,7 +4280,20 @@
                 <a:latin typeface="Arial" panose="020B0604020202020204" pitchFamily="34" charset="0"/>
                 <a:cs typeface="Arial" panose="020B0604020202020204" pitchFamily="34" charset="0"/>
               </a:rPr>
-              <a:t>t</a:t>
+              <a:t>tangente</a:t>
+            </a:r>
+          </a:p>
+          <a:p>
+            <a:pPr algn="ctr"/>
+            <a:r>
+              <a:rPr lang="es-ES" sz="788" i="1" dirty="0">
+                <a:solidFill>
+                  <a:schemeClr val="bg1"/>
+                </a:solidFill>
+                <a:latin typeface="Arial" panose="020B0604020202020204" pitchFamily="34" charset="0"/>
+                <a:cs typeface="Arial" panose="020B0604020202020204" pitchFamily="34" charset="0"/>
+              </a:rPr>
+              <a:t>y</a:t>
             </a:r>
             <a:r>
               <a:rPr lang="es-ES" sz="788" dirty="0">
@@ -4336,11 +4303,8 @@
                 <a:latin typeface="Arial" panose="020B0604020202020204" pitchFamily="34" charset="0"/>
                 <a:cs typeface="Arial" panose="020B0604020202020204" pitchFamily="34" charset="0"/>
               </a:rPr>
-              <a:t>angente</a:t>
-            </a:r>
-          </a:p>
-          <a:p>
-            <a:pPr algn="ctr"/>
+              <a:t> = tan </a:t>
+            </a:r>
             <a:r>
               <a:rPr lang="es-ES" sz="788" i="1" dirty="0">
                 <a:solidFill>
@@ -4349,45 +4313,8 @@
                 <a:latin typeface="Arial" panose="020B0604020202020204" pitchFamily="34" charset="0"/>
                 <a:cs typeface="Arial" panose="020B0604020202020204" pitchFamily="34" charset="0"/>
               </a:rPr>
-              <a:t>y</a:t>
-            </a:r>
-            <a:r>
-              <a:rPr lang="es-ES" sz="788" dirty="0">
-                <a:solidFill>
-                  <a:schemeClr val="bg1"/>
-                </a:solidFill>
-                <a:latin typeface="Arial" panose="020B0604020202020204" pitchFamily="34" charset="0"/>
-                <a:cs typeface="Arial" panose="020B0604020202020204" pitchFamily="34" charset="0"/>
-              </a:rPr>
-              <a:t> = </a:t>
-            </a:r>
-            <a:r>
-              <a:rPr lang="es-ES" sz="788" dirty="0">
-                <a:solidFill>
-                  <a:schemeClr val="bg1"/>
-                </a:solidFill>
-                <a:latin typeface="Arial" panose="020B0604020202020204" pitchFamily="34" charset="0"/>
-                <a:cs typeface="Arial" panose="020B0604020202020204" pitchFamily="34" charset="0"/>
-              </a:rPr>
-              <a:t>tan </a:t>
-            </a:r>
-            <a:r>
-              <a:rPr lang="es-ES" sz="788" i="1" dirty="0">
-                <a:solidFill>
-                  <a:schemeClr val="bg1"/>
-                </a:solidFill>
-                <a:latin typeface="Arial" panose="020B0604020202020204" pitchFamily="34" charset="0"/>
-                <a:cs typeface="Arial" panose="020B0604020202020204" pitchFamily="34" charset="0"/>
-              </a:rPr>
               <a:t>x</a:t>
             </a:r>
-            <a:endParaRPr lang="es-ES" sz="788" i="1" dirty="0">
-              <a:solidFill>
-                <a:schemeClr val="bg1"/>
-              </a:solidFill>
-              <a:latin typeface="Arial" panose="020B0604020202020204" pitchFamily="34" charset="0"/>
-              <a:cs typeface="Arial" panose="020B0604020202020204" pitchFamily="34" charset="0"/>
-            </a:endParaRPr>
           </a:p>
         </p:txBody>
       </p:sp>
@@ -4510,11 +4437,7 @@
           <a:p>
             <a:r>
               <a:rPr lang="es-ES" sz="900" dirty="0"/>
-              <a:t>Funciones </a:t>
-            </a:r>
-            <a:r>
-              <a:rPr lang="es-ES" sz="900" dirty="0"/>
-              <a:t>básicas</a:t>
+              <a:t>Funciones básicas</a:t>
             </a:r>
           </a:p>
         </p:txBody>
@@ -4704,13 +4627,6 @@
               </a:rPr>
               <a:t>x</a:t>
             </a:r>
-            <a:endParaRPr lang="es-ES" sz="675" i="1" dirty="0">
-              <a:solidFill>
-                <a:schemeClr val="tx1"/>
-              </a:solidFill>
-              <a:latin typeface="Arial" panose="020B0604020202020204" pitchFamily="34" charset="0"/>
-              <a:cs typeface="Arial" panose="020B0604020202020204" pitchFamily="34" charset="0"/>
-            </a:endParaRPr>
           </a:p>
         </p:txBody>
       </p:sp>
@@ -4826,13 +4742,6 @@
               </a:rPr>
               <a:t>x</a:t>
             </a:r>
-            <a:endParaRPr lang="es-ES" sz="675" i="1" dirty="0">
-              <a:solidFill>
-                <a:schemeClr val="tx1"/>
-              </a:solidFill>
-              <a:latin typeface="Arial" panose="020B0604020202020204" pitchFamily="34" charset="0"/>
-              <a:cs typeface="Arial" panose="020B0604020202020204" pitchFamily="34" charset="0"/>
-            </a:endParaRPr>
           </a:p>
         </p:txBody>
       </p:sp>
@@ -4942,10 +4851,6 @@
               </a:rPr>
               <a:t>tiene</a:t>
             </a:r>
-            <a:endParaRPr lang="es-ES" sz="675" dirty="0">
-              <a:latin typeface="Arial" panose="020B0604020202020204" pitchFamily="34" charset="0"/>
-              <a:cs typeface="Arial" panose="020B0604020202020204" pitchFamily="34" charset="0"/>
-            </a:endParaRPr>
           </a:p>
         </p:txBody>
       </p:sp>
@@ -5270,10 +5175,6 @@
               </a:rPr>
               <a:t>tiene</a:t>
             </a:r>
-            <a:endParaRPr lang="es-ES" sz="675" dirty="0">
-              <a:latin typeface="Arial" panose="020B0604020202020204" pitchFamily="34" charset="0"/>
-              <a:cs typeface="Arial" panose="020B0604020202020204" pitchFamily="34" charset="0"/>
-            </a:endParaRPr>
           </a:p>
         </p:txBody>
       </p:sp>
@@ -5616,13 +5517,6 @@
               </a:rPr>
               <a:t>x</a:t>
             </a:r>
-            <a:endParaRPr lang="es-ES" sz="675" i="1" dirty="0">
-              <a:solidFill>
-                <a:schemeClr val="tx1"/>
-              </a:solidFill>
-              <a:latin typeface="Arial" panose="020B0604020202020204" pitchFamily="34" charset="0"/>
-              <a:cs typeface="Arial" panose="020B0604020202020204" pitchFamily="34" charset="0"/>
-            </a:endParaRPr>
           </a:p>
         </p:txBody>
       </p:sp>
@@ -5676,17 +5570,7 @@
                 <a:latin typeface="Arial" panose="020B0604020202020204" pitchFamily="34" charset="0"/>
                 <a:cs typeface="Arial" panose="020B0604020202020204" pitchFamily="34" charset="0"/>
               </a:rPr>
-              <a:t>a</a:t>
-            </a:r>
-            <a:r>
-              <a:rPr lang="es-ES" sz="675" dirty="0" err="1">
-                <a:solidFill>
-                  <a:schemeClr val="tx1"/>
-                </a:solidFill>
-                <a:latin typeface="Arial" panose="020B0604020202020204" pitchFamily="34" charset="0"/>
-                <a:cs typeface="Arial" panose="020B0604020202020204" pitchFamily="34" charset="0"/>
-              </a:rPr>
-              <a:t>rcocoseno</a:t>
+              <a:t>arcocoseno</a:t>
             </a:r>
             <a:endParaRPr lang="es-ES" sz="675" dirty="0">
               <a:solidFill>
@@ -5864,10 +5748,6 @@
               </a:rPr>
               <a:t>tiene</a:t>
             </a:r>
-            <a:endParaRPr lang="es-ES" sz="675" dirty="0">
-              <a:latin typeface="Arial" panose="020B0604020202020204" pitchFamily="34" charset="0"/>
-              <a:cs typeface="Arial" panose="020B0604020202020204" pitchFamily="34" charset="0"/>
-            </a:endParaRPr>
           </a:p>
         </p:txBody>
       </p:sp>
@@ -6192,10 +6072,6 @@
               </a:rPr>
               <a:t>tiene</a:t>
             </a:r>
-            <a:endParaRPr lang="es-ES" sz="675" dirty="0">
-              <a:latin typeface="Arial" panose="020B0604020202020204" pitchFamily="34" charset="0"/>
-              <a:cs typeface="Arial" panose="020B0604020202020204" pitchFamily="34" charset="0"/>
-            </a:endParaRPr>
           </a:p>
         </p:txBody>
       </p:sp>
@@ -6776,10 +6652,6 @@
               </a:rPr>
               <a:t>tiene</a:t>
             </a:r>
-            <a:endParaRPr lang="es-ES" sz="675" dirty="0">
-              <a:latin typeface="Arial" panose="020B0604020202020204" pitchFamily="34" charset="0"/>
-              <a:cs typeface="Arial" panose="020B0604020202020204" pitchFamily="34" charset="0"/>
-            </a:endParaRPr>
           </a:p>
         </p:txBody>
       </p:sp>
@@ -7119,24 +6991,14 @@
           <a:p>
             <a:pPr algn="ctr"/>
             <a:r>
-              <a:rPr lang="es-ES" sz="788" dirty="0">
+              <a:rPr lang="es-ES" sz="788" smtClean="0">
                 <a:solidFill>
                   <a:schemeClr val="bg1"/>
                 </a:solidFill>
                 <a:latin typeface="Arial" panose="020B0604020202020204" pitchFamily="34" charset="0"/>
                 <a:cs typeface="Arial" panose="020B0604020202020204" pitchFamily="34" charset="0"/>
               </a:rPr>
-              <a:t>t</a:t>
-            </a:r>
-            <a:r>
-              <a:rPr lang="es-ES" sz="788" dirty="0">
-                <a:solidFill>
-                  <a:schemeClr val="bg1"/>
-                </a:solidFill>
-                <a:latin typeface="Arial" panose="020B0604020202020204" pitchFamily="34" charset="0"/>
-                <a:cs typeface="Arial" panose="020B0604020202020204" pitchFamily="34" charset="0"/>
-              </a:rPr>
-              <a:t>ranslación</a:t>
+              <a:t>traslación</a:t>
             </a:r>
             <a:endParaRPr lang="es-ES" sz="788" dirty="0">
               <a:solidFill>
@@ -7200,25 +7062,8 @@
                 <a:latin typeface="Arial" panose="020B0604020202020204" pitchFamily="34" charset="0"/>
                 <a:cs typeface="Arial" panose="020B0604020202020204" pitchFamily="34" charset="0"/>
               </a:rPr>
-              <a:t>r</a:t>
-            </a:r>
-            <a:r>
-              <a:rPr lang="es-ES" sz="788" dirty="0">
-                <a:solidFill>
-                  <a:schemeClr val="bg1"/>
-                </a:solidFill>
-                <a:latin typeface="Arial" panose="020B0604020202020204" pitchFamily="34" charset="0"/>
-                <a:cs typeface="Arial" panose="020B0604020202020204" pitchFamily="34" charset="0"/>
-              </a:rPr>
-              <a:t>eflexión</a:t>
-            </a:r>
-            <a:endParaRPr lang="es-ES" sz="788" dirty="0">
-              <a:solidFill>
-                <a:schemeClr val="bg1"/>
-              </a:solidFill>
-              <a:latin typeface="Arial" panose="020B0604020202020204" pitchFamily="34" charset="0"/>
-              <a:cs typeface="Arial" panose="020B0604020202020204" pitchFamily="34" charset="0"/>
-            </a:endParaRPr>
+              <a:t>reflexión</a:t>
+            </a:r>
           </a:p>
         </p:txBody>
       </p:sp>
@@ -7274,8 +7119,11 @@
                 <a:latin typeface="Arial" panose="020B0604020202020204" pitchFamily="34" charset="0"/>
                 <a:cs typeface="Arial" panose="020B0604020202020204" pitchFamily="34" charset="0"/>
               </a:rPr>
-              <a:t>c</a:t>
-            </a:r>
+              <a:t>compresión</a:t>
+            </a:r>
+          </a:p>
+          <a:p>
+            <a:pPr algn="ctr"/>
             <a:r>
               <a:rPr lang="es-ES" sz="788" dirty="0">
                 <a:solidFill>
@@ -7284,38 +7132,8 @@
                 <a:latin typeface="Arial" panose="020B0604020202020204" pitchFamily="34" charset="0"/>
                 <a:cs typeface="Arial" panose="020B0604020202020204" pitchFamily="34" charset="0"/>
               </a:rPr>
-              <a:t>ompresión</a:t>
-            </a:r>
-          </a:p>
-          <a:p>
-            <a:pPr algn="ctr"/>
-            <a:r>
-              <a:rPr lang="es-ES" sz="788" dirty="0">
-                <a:solidFill>
-                  <a:schemeClr val="bg1"/>
-                </a:solidFill>
-                <a:latin typeface="Arial" panose="020B0604020202020204" pitchFamily="34" charset="0"/>
-                <a:cs typeface="Arial" panose="020B0604020202020204" pitchFamily="34" charset="0"/>
-              </a:rPr>
-              <a:t>a</a:t>
-            </a:r>
-            <a:r>
-              <a:rPr lang="es-ES" sz="788" dirty="0">
-                <a:solidFill>
-                  <a:schemeClr val="bg1"/>
-                </a:solidFill>
-                <a:latin typeface="Arial" panose="020B0604020202020204" pitchFamily="34" charset="0"/>
-                <a:cs typeface="Arial" panose="020B0604020202020204" pitchFamily="34" charset="0"/>
-              </a:rPr>
-              <a:t>largamiento</a:t>
-            </a:r>
-            <a:endParaRPr lang="es-ES" sz="788" dirty="0">
-              <a:solidFill>
-                <a:schemeClr val="bg1"/>
-              </a:solidFill>
-              <a:latin typeface="Arial" panose="020B0604020202020204" pitchFamily="34" charset="0"/>
-              <a:cs typeface="Arial" panose="020B0604020202020204" pitchFamily="34" charset="0"/>
-            </a:endParaRPr>
+              <a:t>alargamiento</a:t>
+            </a:r>
           </a:p>
         </p:txBody>
       </p:sp>
@@ -7371,25 +7189,8 @@
                 <a:latin typeface="Arial" panose="020B0604020202020204" pitchFamily="34" charset="0"/>
                 <a:cs typeface="Arial" panose="020B0604020202020204" pitchFamily="34" charset="0"/>
               </a:rPr>
-              <a:t>a</a:t>
-            </a:r>
-            <a:r>
-              <a:rPr lang="es-ES" sz="788" dirty="0">
-                <a:solidFill>
-                  <a:schemeClr val="bg1"/>
-                </a:solidFill>
-                <a:latin typeface="Arial" panose="020B0604020202020204" pitchFamily="34" charset="0"/>
-                <a:cs typeface="Arial" panose="020B0604020202020204" pitchFamily="34" charset="0"/>
-              </a:rPr>
-              <a:t>mplitud</a:t>
-            </a:r>
-            <a:endParaRPr lang="es-ES" sz="788" dirty="0">
-              <a:solidFill>
-                <a:schemeClr val="bg1"/>
-              </a:solidFill>
-              <a:latin typeface="Arial" panose="020B0604020202020204" pitchFamily="34" charset="0"/>
-              <a:cs typeface="Arial" panose="020B0604020202020204" pitchFamily="34" charset="0"/>
-            </a:endParaRPr>
+              <a:t>amplitud</a:t>
+            </a:r>
           </a:p>
         </p:txBody>
       </p:sp>
@@ -7447,13 +7248,6 @@
               </a:rPr>
               <a:t>periodo</a:t>
             </a:r>
-            <a:endParaRPr lang="es-ES" sz="788" dirty="0">
-              <a:solidFill>
-                <a:schemeClr val="bg1"/>
-              </a:solidFill>
-              <a:latin typeface="Arial" panose="020B0604020202020204" pitchFamily="34" charset="0"/>
-              <a:cs typeface="Arial" panose="020B0604020202020204" pitchFamily="34" charset="0"/>
-            </a:endParaRPr>
           </a:p>
         </p:txBody>
       </p:sp>
@@ -7509,25 +7303,8 @@
                 <a:latin typeface="Arial" panose="020B0604020202020204" pitchFamily="34" charset="0"/>
                 <a:cs typeface="Arial" panose="020B0604020202020204" pitchFamily="34" charset="0"/>
               </a:rPr>
-              <a:t>d</a:t>
-            </a:r>
-            <a:r>
-              <a:rPr lang="es-ES" sz="788" dirty="0">
-                <a:solidFill>
-                  <a:schemeClr val="bg1"/>
-                </a:solidFill>
-                <a:latin typeface="Arial" panose="020B0604020202020204" pitchFamily="34" charset="0"/>
-                <a:cs typeface="Arial" panose="020B0604020202020204" pitchFamily="34" charset="0"/>
-              </a:rPr>
-              <a:t>esfase</a:t>
-            </a:r>
-            <a:endParaRPr lang="es-ES" sz="788" dirty="0">
-              <a:solidFill>
-                <a:schemeClr val="bg1"/>
-              </a:solidFill>
-              <a:latin typeface="Arial" panose="020B0604020202020204" pitchFamily="34" charset="0"/>
-              <a:cs typeface="Arial" panose="020B0604020202020204" pitchFamily="34" charset="0"/>
-            </a:endParaRPr>
+              <a:t>desfase</a:t>
+            </a:r>
           </a:p>
         </p:txBody>
       </p:sp>
@@ -7825,13 +7602,6 @@
               </a:rPr>
               <a:t>horizontal</a:t>
             </a:r>
-            <a:endParaRPr lang="es-ES" sz="675" dirty="0">
-              <a:solidFill>
-                <a:schemeClr val="tx1"/>
-              </a:solidFill>
-              <a:latin typeface="Arial" panose="020B0604020202020204" pitchFamily="34" charset="0"/>
-              <a:cs typeface="Arial" panose="020B0604020202020204" pitchFamily="34" charset="0"/>
-            </a:endParaRPr>
           </a:p>
         </p:txBody>
       </p:sp>
@@ -7889,13 +7659,6 @@
               </a:rPr>
               <a:t>vertical</a:t>
             </a:r>
-            <a:endParaRPr lang="es-ES" sz="675" dirty="0">
-              <a:solidFill>
-                <a:schemeClr val="tx1"/>
-              </a:solidFill>
-              <a:latin typeface="Arial" panose="020B0604020202020204" pitchFamily="34" charset="0"/>
-              <a:cs typeface="Arial" panose="020B0604020202020204" pitchFamily="34" charset="0"/>
-            </a:endParaRPr>
           </a:p>
         </p:txBody>
       </p:sp>
@@ -8183,13 +7946,6 @@
               </a:rPr>
               <a:t>C</a:t>
             </a:r>
-            <a:endParaRPr lang="es-ES" sz="675" i="1" dirty="0">
-              <a:solidFill>
-                <a:schemeClr val="tx1"/>
-              </a:solidFill>
-              <a:latin typeface="Arial" panose="020B0604020202020204" pitchFamily="34" charset="0"/>
-              <a:cs typeface="Arial" panose="020B0604020202020204" pitchFamily="34" charset="0"/>
-            </a:endParaRPr>
           </a:p>
         </p:txBody>
       </p:sp>
@@ -8323,13 +8079,6 @@
               </a:rPr>
               <a:t>X</a:t>
             </a:r>
-            <a:endParaRPr lang="es-ES" sz="675" dirty="0">
-              <a:solidFill>
-                <a:schemeClr val="tx1"/>
-              </a:solidFill>
-              <a:latin typeface="Arial" panose="020B0604020202020204" pitchFamily="34" charset="0"/>
-              <a:cs typeface="Arial" panose="020B0604020202020204" pitchFamily="34" charset="0"/>
-            </a:endParaRPr>
           </a:p>
         </p:txBody>
       </p:sp>
@@ -8363,10 +8112,6 @@
               </a:rPr>
               <a:t>con respecto al eje</a:t>
             </a:r>
-            <a:endParaRPr lang="es-ES" sz="675" dirty="0">
-              <a:latin typeface="Arial" panose="020B0604020202020204" pitchFamily="34" charset="0"/>
-              <a:cs typeface="Arial" panose="020B0604020202020204" pitchFamily="34" charset="0"/>
-            </a:endParaRPr>
           </a:p>
         </p:txBody>
       </p:sp>
@@ -8462,13 +8207,6 @@
               </a:rPr>
               <a:t>Y</a:t>
             </a:r>
-            <a:endParaRPr lang="es-ES" sz="675" dirty="0">
-              <a:solidFill>
-                <a:schemeClr val="tx1"/>
-              </a:solidFill>
-              <a:latin typeface="Arial" panose="020B0604020202020204" pitchFamily="34" charset="0"/>
-              <a:cs typeface="Arial" panose="020B0604020202020204" pitchFamily="34" charset="0"/>
-            </a:endParaRPr>
           </a:p>
         </p:txBody>
       </p:sp>
@@ -8874,13 +8612,6 @@
               </a:rPr>
               <a:t>horizontal</a:t>
             </a:r>
-            <a:endParaRPr lang="es-ES" sz="675" dirty="0">
-              <a:solidFill>
-                <a:schemeClr val="tx1"/>
-              </a:solidFill>
-              <a:latin typeface="Arial" panose="020B0604020202020204" pitchFamily="34" charset="0"/>
-              <a:cs typeface="Arial" panose="020B0604020202020204" pitchFamily="34" charset="0"/>
-            </a:endParaRPr>
           </a:p>
         </p:txBody>
       </p:sp>
@@ -8938,13 +8669,6 @@
               </a:rPr>
               <a:t>vertical</a:t>
             </a:r>
-            <a:endParaRPr lang="es-ES" sz="675" dirty="0">
-              <a:solidFill>
-                <a:schemeClr val="tx1"/>
-              </a:solidFill>
-              <a:latin typeface="Arial" panose="020B0604020202020204" pitchFamily="34" charset="0"/>
-              <a:cs typeface="Arial" panose="020B0604020202020204" pitchFamily="34" charset="0"/>
-            </a:endParaRPr>
           </a:p>
         </p:txBody>
       </p:sp>
@@ -9342,13 +9066,6 @@
               </a:rPr>
               <a:t>magnitud de oscilación o amplitud de una curva</a:t>
             </a:r>
-            <a:endParaRPr lang="es-ES" sz="675" dirty="0">
-              <a:solidFill>
-                <a:schemeClr val="tx1"/>
-              </a:solidFill>
-              <a:latin typeface="Arial" panose="020B0604020202020204" pitchFamily="34" charset="0"/>
-              <a:cs typeface="Arial" panose="020B0604020202020204" pitchFamily="34" charset="0"/>
-            </a:endParaRPr>
           </a:p>
         </p:txBody>
       </p:sp>
@@ -9444,13 +9161,6 @@
               </a:rPr>
               <a:t>intervalo en el que se repite la porción principal de la gráfica</a:t>
             </a:r>
-            <a:endParaRPr lang="es-ES" sz="675" dirty="0">
-              <a:solidFill>
-                <a:schemeClr val="tx1"/>
-              </a:solidFill>
-              <a:latin typeface="Arial" panose="020B0604020202020204" pitchFamily="34" charset="0"/>
-              <a:cs typeface="Arial" panose="020B0604020202020204" pitchFamily="34" charset="0"/>
-            </a:endParaRPr>
           </a:p>
         </p:txBody>
       </p:sp>
@@ -9546,13 +9256,6 @@
               </a:rPr>
               <a:t>qué tanto está corrido el inicio de la gráfica  </a:t>
             </a:r>
-            <a:endParaRPr lang="es-ES" sz="675" dirty="0">
-              <a:solidFill>
-                <a:schemeClr val="tx1"/>
-              </a:solidFill>
-              <a:latin typeface="Arial" panose="020B0604020202020204" pitchFamily="34" charset="0"/>
-              <a:cs typeface="Arial" panose="020B0604020202020204" pitchFamily="34" charset="0"/>
-            </a:endParaRPr>
           </a:p>
         </p:txBody>
       </p:sp>

</xml_diff>

<commit_message>
MA_10_03_CO CE - MC
Ajustes solicitados por Lizzie
</commit_message>
<xml_diff>
--- a/fuentes/contenidos/grado10/guion03/MA_10_03_CO_MapaConceptual.pptx
+++ b/fuentes/contenidos/grado10/guion03/MA_10_03_CO_MapaConceptual.pptx
@@ -8,7 +8,7 @@
     <p:sldId id="256" r:id="rId2"/>
   </p:sldIdLst>
   <p:sldSz cx="9144000" cy="6858000" type="screen4x3"/>
-  <p:notesSz cx="6794500" cy="9918700"/>
+  <p:notesSz cx="7315200" cy="9601200"/>
   <p:defaultTextStyle>
     <a:defPPr>
       <a:defRPr lang="es-ES"/>
@@ -154,7 +154,7 @@
           </a:lstStyle>
           <a:p>
             <a:r>
-              <a:rPr lang="es-ES" smtClean="0"/>
+              <a:rPr lang="es-ES"/>
               <a:t>Haga clic para modificar el estilo de título del patrón</a:t>
             </a:r>
             <a:endParaRPr lang="en-US" dirty="0"/>
@@ -219,7 +219,7 @@
           </a:lstStyle>
           <a:p>
             <a:r>
-              <a:rPr lang="es-ES" smtClean="0"/>
+              <a:rPr lang="es-ES"/>
               <a:t>Haga clic para modificar el estilo de subtítulo del patrón</a:t>
             </a:r>
             <a:endParaRPr lang="en-US" dirty="0"/>
@@ -243,7 +243,7 @@
           <a:p>
             <a:fld id="{C764DE79-268F-4C1A-8933-263129D2AF90}" type="datetimeFigureOut">
               <a:rPr lang="en-US" smtClean="0"/>
-              <a:t>6/24/2016</a:t>
+              <a:t>6/29/2016</a:t>
             </a:fld>
             <a:endParaRPr lang="en-US" dirty="0"/>
           </a:p>
@@ -337,7 +337,7 @@
           <a:lstStyle/>
           <a:p>
             <a:r>
-              <a:rPr lang="es-ES" smtClean="0"/>
+              <a:rPr lang="es-ES"/>
               <a:t>Haga clic para modificar el estilo de título del patrón</a:t>
             </a:r>
             <a:endParaRPr lang="en-US" dirty="0"/>
@@ -361,35 +361,35 @@
           <a:p>
             <a:pPr lvl="0"/>
             <a:r>
-              <a:rPr lang="es-ES" smtClean="0"/>
+              <a:rPr lang="es-ES"/>
               <a:t>Haga clic para modificar el estilo de texto del patrón</a:t>
             </a:r>
           </a:p>
           <a:p>
             <a:pPr lvl="1"/>
             <a:r>
-              <a:rPr lang="es-ES" smtClean="0"/>
+              <a:rPr lang="es-ES"/>
               <a:t>Segundo nivel</a:t>
             </a:r>
           </a:p>
           <a:p>
             <a:pPr lvl="2"/>
             <a:r>
-              <a:rPr lang="es-ES" smtClean="0"/>
+              <a:rPr lang="es-ES"/>
               <a:t>Tercer nivel</a:t>
             </a:r>
           </a:p>
           <a:p>
             <a:pPr lvl="3"/>
             <a:r>
-              <a:rPr lang="es-ES" smtClean="0"/>
+              <a:rPr lang="es-ES"/>
               <a:t>Cuarto nivel</a:t>
             </a:r>
           </a:p>
           <a:p>
             <a:pPr lvl="4"/>
             <a:r>
-              <a:rPr lang="es-ES" smtClean="0"/>
+              <a:rPr lang="es-ES"/>
               <a:t>Quinto nivel</a:t>
             </a:r>
             <a:endParaRPr lang="en-US" dirty="0"/>
@@ -413,7 +413,7 @@
           <a:p>
             <a:fld id="{C764DE79-268F-4C1A-8933-263129D2AF90}" type="datetimeFigureOut">
               <a:rPr lang="en-US" smtClean="0"/>
-              <a:t>6/24/2016</a:t>
+              <a:t>6/29/2016</a:t>
             </a:fld>
             <a:endParaRPr lang="en-US" dirty="0"/>
           </a:p>
@@ -512,7 +512,7 @@
           <a:lstStyle/>
           <a:p>
             <a:r>
-              <a:rPr lang="es-ES" smtClean="0"/>
+              <a:rPr lang="es-ES"/>
               <a:t>Haga clic para modificar el estilo de título del patrón</a:t>
             </a:r>
             <a:endParaRPr lang="en-US" dirty="0"/>
@@ -541,35 +541,35 @@
           <a:p>
             <a:pPr lvl="0"/>
             <a:r>
-              <a:rPr lang="es-ES" smtClean="0"/>
+              <a:rPr lang="es-ES"/>
               <a:t>Haga clic para modificar el estilo de texto del patrón</a:t>
             </a:r>
           </a:p>
           <a:p>
             <a:pPr lvl="1"/>
             <a:r>
-              <a:rPr lang="es-ES" smtClean="0"/>
+              <a:rPr lang="es-ES"/>
               <a:t>Segundo nivel</a:t>
             </a:r>
           </a:p>
           <a:p>
             <a:pPr lvl="2"/>
             <a:r>
-              <a:rPr lang="es-ES" smtClean="0"/>
+              <a:rPr lang="es-ES"/>
               <a:t>Tercer nivel</a:t>
             </a:r>
           </a:p>
           <a:p>
             <a:pPr lvl="3"/>
             <a:r>
-              <a:rPr lang="es-ES" smtClean="0"/>
+              <a:rPr lang="es-ES"/>
               <a:t>Cuarto nivel</a:t>
             </a:r>
           </a:p>
           <a:p>
             <a:pPr lvl="4"/>
             <a:r>
-              <a:rPr lang="es-ES" smtClean="0"/>
+              <a:rPr lang="es-ES"/>
               <a:t>Quinto nivel</a:t>
             </a:r>
             <a:endParaRPr lang="en-US" dirty="0"/>
@@ -593,7 +593,7 @@
           <a:p>
             <a:fld id="{C764DE79-268F-4C1A-8933-263129D2AF90}" type="datetimeFigureOut">
               <a:rPr lang="en-US" smtClean="0"/>
-              <a:t>6/24/2016</a:t>
+              <a:t>6/29/2016</a:t>
             </a:fld>
             <a:endParaRPr lang="en-US" dirty="0"/>
           </a:p>
@@ -681,13 +681,6 @@
   <p:clrMapOvr>
     <a:masterClrMapping/>
   </p:clrMapOvr>
-  <p:timing>
-    <p:tnLst>
-      <p:par>
-        <p:cTn id="1" dur="indefinite" restart="never" nodeType="tmRoot"/>
-      </p:par>
-    </p:tnLst>
-  </p:timing>
 </p:sldLayout>
 </file>
 
@@ -718,13 +711,6 @@
   <p:clrMapOvr>
     <a:masterClrMapping/>
   </p:clrMapOvr>
-  <p:timing>
-    <p:tnLst>
-      <p:par>
-        <p:cTn id="1" dur="indefinite" restart="never" nodeType="tmRoot"/>
-      </p:par>
-    </p:tnLst>
-  </p:timing>
 </p:sldLayout>
 </file>
 
@@ -755,13 +741,6 @@
   <p:clrMapOvr>
     <a:masterClrMapping/>
   </p:clrMapOvr>
-  <p:timing>
-    <p:tnLst>
-      <p:par>
-        <p:cTn id="1" dur="indefinite" restart="never" nodeType="tmRoot"/>
-      </p:par>
-    </p:tnLst>
-  </p:timing>
 </p:sldLayout>
 </file>
 
@@ -792,13 +771,6 @@
   <p:clrMapOvr>
     <a:masterClrMapping/>
   </p:clrMapOvr>
-  <p:timing>
-    <p:tnLst>
-      <p:par>
-        <p:cTn id="1" dur="indefinite" restart="never" nodeType="tmRoot"/>
-      </p:par>
-    </p:tnLst>
-  </p:timing>
 </p:sldLayout>
 </file>
 
@@ -829,13 +801,6 @@
   <p:clrMapOvr>
     <a:masterClrMapping/>
   </p:clrMapOvr>
-  <p:timing>
-    <p:tnLst>
-      <p:par>
-        <p:cTn id="1" dur="indefinite" restart="never" nodeType="tmRoot"/>
-      </p:par>
-    </p:tnLst>
-  </p:timing>
 </p:sldLayout>
 </file>
 
@@ -866,13 +831,6 @@
   <p:clrMapOvr>
     <a:masterClrMapping/>
   </p:clrMapOvr>
-  <p:timing>
-    <p:tnLst>
-      <p:par>
-        <p:cTn id="1" dur="indefinite" restart="never" nodeType="tmRoot"/>
-      </p:par>
-    </p:tnLst>
-  </p:timing>
 </p:sldLayout>
 </file>
 
@@ -903,13 +861,6 @@
   <p:clrMapOvr>
     <a:masterClrMapping/>
   </p:clrMapOvr>
-  <p:timing>
-    <p:tnLst>
-      <p:par>
-        <p:cTn id="1" dur="indefinite" restart="never" nodeType="tmRoot"/>
-      </p:par>
-    </p:tnLst>
-  </p:timing>
 </p:sldLayout>
 </file>
 
@@ -940,13 +891,6 @@
   <p:clrMapOvr>
     <a:masterClrMapping/>
   </p:clrMapOvr>
-  <p:timing>
-    <p:tnLst>
-      <p:par>
-        <p:cTn id="1" dur="indefinite" restart="never" nodeType="tmRoot"/>
-      </p:par>
-    </p:tnLst>
-  </p:timing>
 </p:sldLayout>
 </file>
 
@@ -983,7 +927,7 @@
           <a:lstStyle/>
           <a:p>
             <a:r>
-              <a:rPr lang="es-ES" smtClean="0"/>
+              <a:rPr lang="es-ES"/>
               <a:t>Haga clic para modificar el estilo de título del patrón</a:t>
             </a:r>
             <a:endParaRPr lang="en-US" dirty="0"/>
@@ -1007,35 +951,35 @@
           <a:p>
             <a:pPr lvl="0"/>
             <a:r>
-              <a:rPr lang="es-ES" smtClean="0"/>
+              <a:rPr lang="es-ES"/>
               <a:t>Haga clic para modificar el estilo de texto del patrón</a:t>
             </a:r>
           </a:p>
           <a:p>
             <a:pPr lvl="1"/>
             <a:r>
-              <a:rPr lang="es-ES" smtClean="0"/>
+              <a:rPr lang="es-ES"/>
               <a:t>Segundo nivel</a:t>
             </a:r>
           </a:p>
           <a:p>
             <a:pPr lvl="2"/>
             <a:r>
-              <a:rPr lang="es-ES" smtClean="0"/>
+              <a:rPr lang="es-ES"/>
               <a:t>Tercer nivel</a:t>
             </a:r>
           </a:p>
           <a:p>
             <a:pPr lvl="3"/>
             <a:r>
-              <a:rPr lang="es-ES" smtClean="0"/>
+              <a:rPr lang="es-ES"/>
               <a:t>Cuarto nivel</a:t>
             </a:r>
           </a:p>
           <a:p>
             <a:pPr lvl="4"/>
             <a:r>
-              <a:rPr lang="es-ES" smtClean="0"/>
+              <a:rPr lang="es-ES"/>
               <a:t>Quinto nivel</a:t>
             </a:r>
             <a:endParaRPr lang="en-US" dirty="0"/>
@@ -1059,7 +1003,7 @@
           <a:p>
             <a:fld id="{C764DE79-268F-4C1A-8933-263129D2AF90}" type="datetimeFigureOut">
               <a:rPr lang="en-US" smtClean="0"/>
-              <a:t>6/24/2016</a:t>
+              <a:t>6/29/2016</a:t>
             </a:fld>
             <a:endParaRPr lang="en-US" dirty="0"/>
           </a:p>
@@ -1147,13 +1091,6 @@
   <p:clrMapOvr>
     <a:masterClrMapping/>
   </p:clrMapOvr>
-  <p:timing>
-    <p:tnLst>
-      <p:par>
-        <p:cTn id="1" dur="indefinite" restart="never" nodeType="tmRoot"/>
-      </p:par>
-    </p:tnLst>
-  </p:timing>
 </p:sldLayout>
 </file>
 
@@ -1184,13 +1121,6 @@
   <p:clrMapOvr>
     <a:masterClrMapping/>
   </p:clrMapOvr>
-  <p:timing>
-    <p:tnLst>
-      <p:par>
-        <p:cTn id="1" dur="indefinite" restart="never" nodeType="tmRoot"/>
-      </p:par>
-    </p:tnLst>
-  </p:timing>
 </p:sldLayout>
 </file>
 
@@ -1236,7 +1166,7 @@
           </a:lstStyle>
           <a:p>
             <a:r>
-              <a:rPr lang="es-ES" smtClean="0"/>
+              <a:rPr lang="es-ES"/>
               <a:t>Haga clic para modificar el estilo de título del patrón</a:t>
             </a:r>
             <a:endParaRPr lang="en-US" dirty="0"/>
@@ -1354,7 +1284,7 @@
           <a:p>
             <a:pPr lvl="0"/>
             <a:r>
-              <a:rPr lang="es-ES" smtClean="0"/>
+              <a:rPr lang="es-ES"/>
               <a:t>Haga clic para modificar el estilo de texto del patrón</a:t>
             </a:r>
           </a:p>
@@ -1377,7 +1307,7 @@
           <a:p>
             <a:fld id="{C764DE79-268F-4C1A-8933-263129D2AF90}" type="datetimeFigureOut">
               <a:rPr lang="en-US" smtClean="0"/>
-              <a:t>6/24/2016</a:t>
+              <a:t>6/29/2016</a:t>
             </a:fld>
             <a:endParaRPr lang="en-US" dirty="0"/>
           </a:p>
@@ -1471,7 +1401,7 @@
           <a:lstStyle/>
           <a:p>
             <a:r>
-              <a:rPr lang="es-ES" smtClean="0"/>
+              <a:rPr lang="es-ES"/>
               <a:t>Haga clic para modificar el estilo de título del patrón</a:t>
             </a:r>
             <a:endParaRPr lang="en-US" dirty="0"/>
@@ -1500,35 +1430,35 @@
           <a:p>
             <a:pPr lvl="0"/>
             <a:r>
-              <a:rPr lang="es-ES" smtClean="0"/>
+              <a:rPr lang="es-ES"/>
               <a:t>Haga clic para modificar el estilo de texto del patrón</a:t>
             </a:r>
           </a:p>
           <a:p>
             <a:pPr lvl="1"/>
             <a:r>
-              <a:rPr lang="es-ES" smtClean="0"/>
+              <a:rPr lang="es-ES"/>
               <a:t>Segundo nivel</a:t>
             </a:r>
           </a:p>
           <a:p>
             <a:pPr lvl="2"/>
             <a:r>
-              <a:rPr lang="es-ES" smtClean="0"/>
+              <a:rPr lang="es-ES"/>
               <a:t>Tercer nivel</a:t>
             </a:r>
           </a:p>
           <a:p>
             <a:pPr lvl="3"/>
             <a:r>
-              <a:rPr lang="es-ES" smtClean="0"/>
+              <a:rPr lang="es-ES"/>
               <a:t>Cuarto nivel</a:t>
             </a:r>
           </a:p>
           <a:p>
             <a:pPr lvl="4"/>
             <a:r>
-              <a:rPr lang="es-ES" smtClean="0"/>
+              <a:rPr lang="es-ES"/>
               <a:t>Quinto nivel</a:t>
             </a:r>
             <a:endParaRPr lang="en-US" dirty="0"/>
@@ -1557,35 +1487,35 @@
           <a:p>
             <a:pPr lvl="0"/>
             <a:r>
-              <a:rPr lang="es-ES" smtClean="0"/>
+              <a:rPr lang="es-ES"/>
               <a:t>Haga clic para modificar el estilo de texto del patrón</a:t>
             </a:r>
           </a:p>
           <a:p>
             <a:pPr lvl="1"/>
             <a:r>
-              <a:rPr lang="es-ES" smtClean="0"/>
+              <a:rPr lang="es-ES"/>
               <a:t>Segundo nivel</a:t>
             </a:r>
           </a:p>
           <a:p>
             <a:pPr lvl="2"/>
             <a:r>
-              <a:rPr lang="es-ES" smtClean="0"/>
+              <a:rPr lang="es-ES"/>
               <a:t>Tercer nivel</a:t>
             </a:r>
           </a:p>
           <a:p>
             <a:pPr lvl="3"/>
             <a:r>
-              <a:rPr lang="es-ES" smtClean="0"/>
+              <a:rPr lang="es-ES"/>
               <a:t>Cuarto nivel</a:t>
             </a:r>
           </a:p>
           <a:p>
             <a:pPr lvl="4"/>
             <a:r>
-              <a:rPr lang="es-ES" smtClean="0"/>
+              <a:rPr lang="es-ES"/>
               <a:t>Quinto nivel</a:t>
             </a:r>
             <a:endParaRPr lang="en-US" dirty="0"/>
@@ -1609,7 +1539,7 @@
           <a:p>
             <a:fld id="{C764DE79-268F-4C1A-8933-263129D2AF90}" type="datetimeFigureOut">
               <a:rPr lang="en-US" smtClean="0"/>
-              <a:t>6/24/2016</a:t>
+              <a:t>6/29/2016</a:t>
             </a:fld>
             <a:endParaRPr lang="en-US" dirty="0"/>
           </a:p>
@@ -1708,7 +1638,7 @@
           <a:lstStyle/>
           <a:p>
             <a:r>
-              <a:rPr lang="es-ES" smtClean="0"/>
+              <a:rPr lang="es-ES"/>
               <a:t>Haga clic para modificar el estilo de título del patrón</a:t>
             </a:r>
             <a:endParaRPr lang="en-US" dirty="0"/>
@@ -1774,7 +1704,7 @@
           <a:p>
             <a:pPr lvl="0"/>
             <a:r>
-              <a:rPr lang="es-ES" smtClean="0"/>
+              <a:rPr lang="es-ES"/>
               <a:t>Haga clic para modificar el estilo de texto del patrón</a:t>
             </a:r>
           </a:p>
@@ -1802,35 +1732,35 @@
           <a:p>
             <a:pPr lvl="0"/>
             <a:r>
-              <a:rPr lang="es-ES" smtClean="0"/>
+              <a:rPr lang="es-ES"/>
               <a:t>Haga clic para modificar el estilo de texto del patrón</a:t>
             </a:r>
           </a:p>
           <a:p>
             <a:pPr lvl="1"/>
             <a:r>
-              <a:rPr lang="es-ES" smtClean="0"/>
+              <a:rPr lang="es-ES"/>
               <a:t>Segundo nivel</a:t>
             </a:r>
           </a:p>
           <a:p>
             <a:pPr lvl="2"/>
             <a:r>
-              <a:rPr lang="es-ES" smtClean="0"/>
+              <a:rPr lang="es-ES"/>
               <a:t>Tercer nivel</a:t>
             </a:r>
           </a:p>
           <a:p>
             <a:pPr lvl="3"/>
             <a:r>
-              <a:rPr lang="es-ES" smtClean="0"/>
+              <a:rPr lang="es-ES"/>
               <a:t>Cuarto nivel</a:t>
             </a:r>
           </a:p>
           <a:p>
             <a:pPr lvl="4"/>
             <a:r>
-              <a:rPr lang="es-ES" smtClean="0"/>
+              <a:rPr lang="es-ES"/>
               <a:t>Quinto nivel</a:t>
             </a:r>
             <a:endParaRPr lang="en-US" dirty="0"/>
@@ -1896,7 +1826,7 @@
           <a:p>
             <a:pPr lvl="0"/>
             <a:r>
-              <a:rPr lang="es-ES" smtClean="0"/>
+              <a:rPr lang="es-ES"/>
               <a:t>Haga clic para modificar el estilo de texto del patrón</a:t>
             </a:r>
           </a:p>
@@ -1924,35 +1854,35 @@
           <a:p>
             <a:pPr lvl="0"/>
             <a:r>
-              <a:rPr lang="es-ES" smtClean="0"/>
+              <a:rPr lang="es-ES"/>
               <a:t>Haga clic para modificar el estilo de texto del patrón</a:t>
             </a:r>
           </a:p>
           <a:p>
             <a:pPr lvl="1"/>
             <a:r>
-              <a:rPr lang="es-ES" smtClean="0"/>
+              <a:rPr lang="es-ES"/>
               <a:t>Segundo nivel</a:t>
             </a:r>
           </a:p>
           <a:p>
             <a:pPr lvl="2"/>
             <a:r>
-              <a:rPr lang="es-ES" smtClean="0"/>
+              <a:rPr lang="es-ES"/>
               <a:t>Tercer nivel</a:t>
             </a:r>
           </a:p>
           <a:p>
             <a:pPr lvl="3"/>
             <a:r>
-              <a:rPr lang="es-ES" smtClean="0"/>
+              <a:rPr lang="es-ES"/>
               <a:t>Cuarto nivel</a:t>
             </a:r>
           </a:p>
           <a:p>
             <a:pPr lvl="4"/>
             <a:r>
-              <a:rPr lang="es-ES" smtClean="0"/>
+              <a:rPr lang="es-ES"/>
               <a:t>Quinto nivel</a:t>
             </a:r>
             <a:endParaRPr lang="en-US" dirty="0"/>
@@ -1976,7 +1906,7 @@
           <a:p>
             <a:fld id="{C764DE79-268F-4C1A-8933-263129D2AF90}" type="datetimeFigureOut">
               <a:rPr lang="en-US" smtClean="0"/>
-              <a:t>6/24/2016</a:t>
+              <a:t>6/29/2016</a:t>
             </a:fld>
             <a:endParaRPr lang="en-US" dirty="0"/>
           </a:p>
@@ -2070,7 +2000,7 @@
           <a:lstStyle/>
           <a:p>
             <a:r>
-              <a:rPr lang="es-ES" smtClean="0"/>
+              <a:rPr lang="es-ES"/>
               <a:t>Haga clic para modificar el estilo de título del patrón</a:t>
             </a:r>
             <a:endParaRPr lang="en-US" dirty="0"/>
@@ -2094,7 +2024,7 @@
           <a:p>
             <a:fld id="{C764DE79-268F-4C1A-8933-263129D2AF90}" type="datetimeFigureOut">
               <a:rPr lang="en-US" smtClean="0"/>
-              <a:t>6/24/2016</a:t>
+              <a:t>6/29/2016</a:t>
             </a:fld>
             <a:endParaRPr lang="en-US" dirty="0"/>
           </a:p>
@@ -2189,7 +2119,7 @@
           <a:p>
             <a:fld id="{5001C876-01F7-4317-94B9-1AE222133113}" type="datetimeFigureOut">
               <a:rPr lang="es-ES" smtClean="0"/>
-              <a:t>24/06/2016</a:t>
+              <a:t>29/06/2016</a:t>
             </a:fld>
             <a:endParaRPr lang="es-ES"/>
           </a:p>
@@ -2292,7 +2222,7 @@
           </a:lstStyle>
           <a:p>
             <a:r>
-              <a:rPr lang="es-ES" smtClean="0"/>
+              <a:rPr lang="es-ES"/>
               <a:t>Haga clic para modificar el estilo de título del patrón</a:t>
             </a:r>
             <a:endParaRPr lang="en-US" dirty="0"/>
@@ -2349,35 +2279,35 @@
           <a:p>
             <a:pPr lvl="0"/>
             <a:r>
-              <a:rPr lang="es-ES" smtClean="0"/>
+              <a:rPr lang="es-ES"/>
               <a:t>Haga clic para modificar el estilo de texto del patrón</a:t>
             </a:r>
           </a:p>
           <a:p>
             <a:pPr lvl="1"/>
             <a:r>
-              <a:rPr lang="es-ES" smtClean="0"/>
+              <a:rPr lang="es-ES"/>
               <a:t>Segundo nivel</a:t>
             </a:r>
           </a:p>
           <a:p>
             <a:pPr lvl="2"/>
             <a:r>
-              <a:rPr lang="es-ES" smtClean="0"/>
+              <a:rPr lang="es-ES"/>
               <a:t>Tercer nivel</a:t>
             </a:r>
           </a:p>
           <a:p>
             <a:pPr lvl="3"/>
             <a:r>
-              <a:rPr lang="es-ES" smtClean="0"/>
+              <a:rPr lang="es-ES"/>
               <a:t>Cuarto nivel</a:t>
             </a:r>
           </a:p>
           <a:p>
             <a:pPr lvl="4"/>
             <a:r>
-              <a:rPr lang="es-ES" smtClean="0"/>
+              <a:rPr lang="es-ES"/>
               <a:t>Quinto nivel</a:t>
             </a:r>
             <a:endParaRPr lang="en-US" dirty="0"/>
@@ -2443,7 +2373,7 @@
           <a:p>
             <a:pPr lvl="0"/>
             <a:r>
-              <a:rPr lang="es-ES" smtClean="0"/>
+              <a:rPr lang="es-ES"/>
               <a:t>Haga clic para modificar el estilo de texto del patrón</a:t>
             </a:r>
           </a:p>
@@ -2466,7 +2396,7 @@
           <a:p>
             <a:fld id="{C764DE79-268F-4C1A-8933-263129D2AF90}" type="datetimeFigureOut">
               <a:rPr lang="en-US" smtClean="0"/>
-              <a:t>6/24/2016</a:t>
+              <a:t>6/29/2016</a:t>
             </a:fld>
             <a:endParaRPr lang="en-US" dirty="0"/>
           </a:p>
@@ -2569,7 +2499,7 @@
           </a:lstStyle>
           <a:p>
             <a:r>
-              <a:rPr lang="es-ES" smtClean="0"/>
+              <a:rPr lang="es-ES"/>
               <a:t>Haga clic para modificar el estilo de título del patrón</a:t>
             </a:r>
             <a:endParaRPr lang="en-US" dirty="0"/>
@@ -2634,7 +2564,7 @@
           </a:lstStyle>
           <a:p>
             <a:r>
-              <a:rPr lang="es-ES" smtClean="0"/>
+              <a:rPr lang="es-ES"/>
               <a:t>Haga clic en el icono para agregar una imagen</a:t>
             </a:r>
             <a:endParaRPr lang="en-US" dirty="0"/>
@@ -2700,7 +2630,7 @@
           <a:p>
             <a:pPr lvl="0"/>
             <a:r>
-              <a:rPr lang="es-ES" smtClean="0"/>
+              <a:rPr lang="es-ES"/>
               <a:t>Haga clic para modificar el estilo de texto del patrón</a:t>
             </a:r>
           </a:p>
@@ -2723,7 +2653,7 @@
           <a:p>
             <a:fld id="{C764DE79-268F-4C1A-8933-263129D2AF90}" type="datetimeFigureOut">
               <a:rPr lang="en-US" smtClean="0"/>
-              <a:t>6/24/2016</a:t>
+              <a:t>6/29/2016</a:t>
             </a:fld>
             <a:endParaRPr lang="en-US" dirty="0"/>
           </a:p>
@@ -2832,7 +2762,7 @@
           <a:lstStyle/>
           <a:p>
             <a:r>
-              <a:rPr lang="es-ES" smtClean="0"/>
+              <a:rPr lang="es-ES"/>
               <a:t>Haga clic para modificar el estilo de título del patrón</a:t>
             </a:r>
             <a:endParaRPr lang="en-US" dirty="0"/>
@@ -2866,35 +2796,35 @@
           <a:p>
             <a:pPr lvl="0"/>
             <a:r>
-              <a:rPr lang="es-ES" smtClean="0"/>
+              <a:rPr lang="es-ES"/>
               <a:t>Haga clic para modificar el estilo de texto del patrón</a:t>
             </a:r>
           </a:p>
           <a:p>
             <a:pPr lvl="1"/>
             <a:r>
-              <a:rPr lang="es-ES" smtClean="0"/>
+              <a:rPr lang="es-ES"/>
               <a:t>Segundo nivel</a:t>
             </a:r>
           </a:p>
           <a:p>
             <a:pPr lvl="2"/>
             <a:r>
-              <a:rPr lang="es-ES" smtClean="0"/>
+              <a:rPr lang="es-ES"/>
               <a:t>Tercer nivel</a:t>
             </a:r>
           </a:p>
           <a:p>
             <a:pPr lvl="3"/>
             <a:r>
-              <a:rPr lang="es-ES" smtClean="0"/>
+              <a:rPr lang="es-ES"/>
               <a:t>Cuarto nivel</a:t>
             </a:r>
           </a:p>
           <a:p>
             <a:pPr lvl="4"/>
             <a:r>
-              <a:rPr lang="es-ES" smtClean="0"/>
+              <a:rPr lang="es-ES"/>
               <a:t>Quinto nivel</a:t>
             </a:r>
             <a:endParaRPr lang="en-US" dirty="0"/>
@@ -2936,7 +2866,7 @@
           <a:p>
             <a:fld id="{C764DE79-268F-4C1A-8933-263129D2AF90}" type="datetimeFigureOut">
               <a:rPr lang="en-US" smtClean="0"/>
-              <a:t>6/24/2016</a:t>
+              <a:t>6/29/2016</a:t>
             </a:fld>
             <a:endParaRPr lang="en-US" dirty="0"/>
           </a:p>
@@ -3028,7 +2958,7 @@
         </p:nvSpPr>
         <p:spPr>
           <a:xfrm rot="16200000">
-            <a:off x="-914178" y="1733488"/>
+            <a:off x="-914178" y="1495744"/>
             <a:ext cx="2392000" cy="230832"/>
           </a:xfrm>
           <a:prstGeom prst="rect">
@@ -3044,16 +2974,12 @@
           <a:p>
             <a:pPr algn="ctr"/>
             <a:r>
-              <a:rPr lang="es-ES" sz="900" dirty="0" smtClean="0">
+              <a:rPr lang="es-ES" sz="900" dirty="0">
                 <a:latin typeface="Arial" panose="020B0604020202020204" pitchFamily="34" charset="0"/>
                 <a:cs typeface="Arial" panose="020B0604020202020204" pitchFamily="34" charset="0"/>
               </a:rPr>
               <a:t>© Editorial Planeta Colombiana S.A., 2016.</a:t>
             </a:r>
-            <a:endParaRPr lang="es-ES" sz="900" dirty="0">
-              <a:latin typeface="Arial" panose="020B0604020202020204" pitchFamily="34" charset="0"/>
-              <a:cs typeface="Arial" panose="020B0604020202020204" pitchFamily="34" charset="0"/>
-            </a:endParaRPr>
           </a:p>
         </p:txBody>
       </p:sp>
@@ -4139,7 +4065,7 @@
         </p:nvSpPr>
         <p:spPr>
           <a:xfrm>
-            <a:off x="376196" y="2751197"/>
+            <a:off x="364004" y="2751197"/>
             <a:ext cx="567000" cy="162000"/>
           </a:xfrm>
           <a:prstGeom prst="rect">
@@ -4199,8 +4125,8 @@
         </p:nvCxnSpPr>
         <p:spPr>
           <a:xfrm rot="5400000">
-            <a:off x="773254" y="2488823"/>
-            <a:ext cx="148817" cy="375931"/>
+            <a:off x="767158" y="2482727"/>
+            <a:ext cx="148817" cy="388123"/>
           </a:xfrm>
           <a:prstGeom prst="bentConnector3">
             <a:avLst>
@@ -4757,7 +4683,7 @@
         <p:spPr>
           <a:xfrm flipH="1">
             <a:off x="645975" y="2913197"/>
-            <a:ext cx="13721" cy="124083"/>
+            <a:ext cx="1529" cy="124083"/>
           </a:xfrm>
           <a:prstGeom prst="line">
             <a:avLst/>
@@ -6991,7 +6917,7 @@
           <a:p>
             <a:pPr algn="ctr"/>
             <a:r>
-              <a:rPr lang="es-ES" sz="788" smtClean="0">
+              <a:rPr lang="es-ES" sz="788">
                 <a:solidFill>
                   <a:schemeClr val="bg1"/>
                 </a:solidFill>
@@ -9020,8 +8946,8 @@
         </p:nvSpPr>
         <p:spPr>
           <a:xfrm>
-            <a:off x="7291083" y="2429047"/>
-            <a:ext cx="612000" cy="706877"/>
+            <a:off x="7307339" y="2429047"/>
+            <a:ext cx="577744" cy="860232"/>
           </a:xfrm>
           <a:prstGeom prst="rect">
             <a:avLst/>
@@ -9079,9 +9005,9 @@
           <p:nvPr/>
         </p:nvCxnSpPr>
         <p:spPr>
-          <a:xfrm>
-            <a:off x="7597083" y="2243801"/>
-            <a:ext cx="0" cy="185246"/>
+          <a:xfrm flipH="1">
+            <a:off x="7596211" y="2243801"/>
+            <a:ext cx="872" cy="185246"/>
           </a:xfrm>
           <a:prstGeom prst="line">
             <a:avLst/>
@@ -9116,7 +9042,7 @@
         <p:spPr>
           <a:xfrm>
             <a:off x="7956587" y="2433468"/>
-            <a:ext cx="540000" cy="807101"/>
+            <a:ext cx="540000" cy="855812"/>
           </a:xfrm>
           <a:prstGeom prst="rect">
             <a:avLst/>
@@ -9210,8 +9136,8 @@
         </p:nvSpPr>
         <p:spPr>
           <a:xfrm>
-            <a:off x="8528516" y="2429047"/>
-            <a:ext cx="540000" cy="600720"/>
+            <a:off x="8528516" y="2429046"/>
+            <a:ext cx="540000" cy="860233"/>
           </a:xfrm>
           <a:prstGeom prst="rect">
             <a:avLst/>
@@ -9271,7 +9197,7 @@
         <p:spPr>
           <a:xfrm>
             <a:off x="8798516" y="2243801"/>
-            <a:ext cx="0" cy="185246"/>
+            <a:ext cx="0" cy="185245"/>
           </a:xfrm>
           <a:prstGeom prst="line">
             <a:avLst/>
@@ -9306,7 +9232,7 @@
         <p:spPr>
           <a:xfrm>
             <a:off x="6963079" y="3388017"/>
-            <a:ext cx="1268008" cy="270249"/>
+            <a:ext cx="1268009" cy="270249"/>
           </a:xfrm>
           <a:prstGeom prst="rect">
             <a:avLst/>
@@ -9370,8 +9296,8 @@
         </p:nvCxnSpPr>
         <p:spPr>
           <a:xfrm>
-            <a:off x="7597083" y="3135924"/>
-            <a:ext cx="0" cy="252093"/>
+            <a:off x="7596211" y="3289279"/>
+            <a:ext cx="873" cy="98738"/>
           </a:xfrm>
           <a:prstGeom prst="line">
             <a:avLst/>
@@ -9407,13 +9333,6 @@
   <p:clrMapOvr>
     <a:masterClrMapping/>
   </p:clrMapOvr>
-  <p:timing>
-    <p:tnLst>
-      <p:par>
-        <p:cTn id="1" dur="indefinite" restart="never" nodeType="tmRoot"/>
-      </p:par>
-    </p:tnLst>
-  </p:timing>
 </p:sld>
 </file>
 

</xml_diff>